<commit_message>
Updated team presentation after discussion
</commit_message>
<xml_diff>
--- a/Victoria Crime Data Visualization3.pptx
+++ b/Victoria Crime Data Visualization3.pptx
@@ -10,6 +10,9 @@
     <p:sldId id="258" r:id="rId4"/>
     <p:sldId id="257" r:id="rId5"/>
     <p:sldId id="262" r:id="rId6"/>
+    <p:sldId id="263" r:id="rId7"/>
+    <p:sldId id="264" r:id="rId8"/>
+    <p:sldId id="265" r:id="rId9"/>
   </p:sldIdLst>
   <p:sldSz cx="12192000" cy="6858000"/>
   <p:notesSz cx="6858000" cy="9144000"/>
@@ -114,6 +117,1371 @@
     </p:ext>
   </p:extLst>
 </p:presentation>
+</file>
+
+<file path=ppt/revisionInfo.xml><?xml version="1.0" encoding="utf-8"?>
+<p1510:revInfo xmlns:a="http://schemas.openxmlformats.org/drawingml/2006/main" xmlns:r="http://schemas.openxmlformats.org/officeDocument/2006/relationships" xmlns:p1510="http://schemas.microsoft.com/office/powerpoint/2015/10/main">
+  <p1510:revLst>
+    <p1510:client id="{FA0CB607-D8BE-48CD-9258-DB1B832A96BD}" v="19" dt="2022-09-11T05:08:35.236"/>
+  </p1510:revLst>
+</p1510:revInfo>
+</file>
+
+<file path=ppt/changesInfos/changesInfo1.xml><?xml version="1.0" encoding="utf-8"?>
+<pc:chgInfo xmlns:a="http://schemas.openxmlformats.org/drawingml/2006/main" xmlns:r="http://schemas.openxmlformats.org/officeDocument/2006/relationships" xmlns:ac="http://schemas.microsoft.com/office/drawing/2013/main/command" xmlns:pc="http://schemas.microsoft.com/office/powerpoint/2013/main/command">
+  <pc:docChgLst>
+    <pc:chgData name="Berta Devenyi" userId="99c6308e8d81b7b6" providerId="LiveId" clId="{FA0CB607-D8BE-48CD-9258-DB1B832A96BD}"/>
+    <pc:docChg chg="undo custSel addSld delSld modSld">
+      <pc:chgData name="Berta Devenyi" userId="99c6308e8d81b7b6" providerId="LiveId" clId="{FA0CB607-D8BE-48CD-9258-DB1B832A96BD}" dt="2022-09-11T05:13:15.110" v="718" actId="2711"/>
+      <pc:docMkLst>
+        <pc:docMk/>
+      </pc:docMkLst>
+      <pc:sldChg chg="modSp mod">
+        <pc:chgData name="Berta Devenyi" userId="99c6308e8d81b7b6" providerId="LiveId" clId="{FA0CB607-D8BE-48CD-9258-DB1B832A96BD}" dt="2022-09-11T05:08:35.236" v="648" actId="20577"/>
+        <pc:sldMkLst>
+          <pc:docMk/>
+          <pc:sldMk cId="3831519368" sldId="256"/>
+        </pc:sldMkLst>
+        <pc:spChg chg="mod">
+          <ac:chgData name="Berta Devenyi" userId="99c6308e8d81b7b6" providerId="LiveId" clId="{FA0CB607-D8BE-48CD-9258-DB1B832A96BD}" dt="2022-09-11T05:08:35.236" v="648" actId="20577"/>
+          <ac:spMkLst>
+            <pc:docMk/>
+            <pc:sldMk cId="3831519368" sldId="256"/>
+            <ac:spMk id="2" creationId="{8DCFAE3C-E50D-2441-5373-F8722CBE50FE}"/>
+          </ac:spMkLst>
+        </pc:spChg>
+      </pc:sldChg>
+      <pc:sldChg chg="modSp mod">
+        <pc:chgData name="Berta Devenyi" userId="99c6308e8d81b7b6" providerId="LiveId" clId="{FA0CB607-D8BE-48CD-9258-DB1B832A96BD}" dt="2022-09-11T05:11:15.715" v="665" actId="20577"/>
+        <pc:sldMkLst>
+          <pc:docMk/>
+          <pc:sldMk cId="1016780739" sldId="258"/>
+        </pc:sldMkLst>
+        <pc:spChg chg="mod">
+          <ac:chgData name="Berta Devenyi" userId="99c6308e8d81b7b6" providerId="LiveId" clId="{FA0CB607-D8BE-48CD-9258-DB1B832A96BD}" dt="2022-09-11T05:11:15.715" v="665" actId="20577"/>
+          <ac:spMkLst>
+            <pc:docMk/>
+            <pc:sldMk cId="1016780739" sldId="258"/>
+            <ac:spMk id="3" creationId="{6FF5BB63-C258-3658-7877-F23D9E4E5F42}"/>
+          </ac:spMkLst>
+        </pc:spChg>
+      </pc:sldChg>
+      <pc:sldChg chg="modSp mod">
+        <pc:chgData name="Berta Devenyi" userId="99c6308e8d81b7b6" providerId="LiveId" clId="{FA0CB607-D8BE-48CD-9258-DB1B832A96BD}" dt="2022-09-11T04:56:12.640" v="641" actId="20577"/>
+        <pc:sldMkLst>
+          <pc:docMk/>
+          <pc:sldMk cId="407982498" sldId="260"/>
+        </pc:sldMkLst>
+        <pc:spChg chg="mod">
+          <ac:chgData name="Berta Devenyi" userId="99c6308e8d81b7b6" providerId="LiveId" clId="{FA0CB607-D8BE-48CD-9258-DB1B832A96BD}" dt="2022-09-11T04:08:10.114" v="471" actId="20577"/>
+          <ac:spMkLst>
+            <pc:docMk/>
+            <pc:sldMk cId="407982498" sldId="260"/>
+            <ac:spMk id="2" creationId="{815D31FF-706B-AEAA-7E84-B19D87E96458}"/>
+          </ac:spMkLst>
+        </pc:spChg>
+        <pc:spChg chg="mod">
+          <ac:chgData name="Berta Devenyi" userId="99c6308e8d81b7b6" providerId="LiveId" clId="{FA0CB607-D8BE-48CD-9258-DB1B832A96BD}" dt="2022-09-11T04:56:12.640" v="641" actId="20577"/>
+          <ac:spMkLst>
+            <pc:docMk/>
+            <pc:sldMk cId="407982498" sldId="260"/>
+            <ac:spMk id="3" creationId="{B3AD4E39-D26F-5154-42A8-7DEB5A17B2D0}"/>
+          </ac:spMkLst>
+        </pc:spChg>
+      </pc:sldChg>
+      <pc:sldChg chg="modSp mod">
+        <pc:chgData name="Berta Devenyi" userId="99c6308e8d81b7b6" providerId="LiveId" clId="{FA0CB607-D8BE-48CD-9258-DB1B832A96BD}" dt="2022-09-11T04:05:25.761" v="450" actId="33524"/>
+        <pc:sldMkLst>
+          <pc:docMk/>
+          <pc:sldMk cId="1114990967" sldId="262"/>
+        </pc:sldMkLst>
+        <pc:spChg chg="mod">
+          <ac:chgData name="Berta Devenyi" userId="99c6308e8d81b7b6" providerId="LiveId" clId="{FA0CB607-D8BE-48CD-9258-DB1B832A96BD}" dt="2022-09-11T04:05:25.761" v="450" actId="33524"/>
+          <ac:spMkLst>
+            <pc:docMk/>
+            <pc:sldMk cId="1114990967" sldId="262"/>
+            <ac:spMk id="2" creationId="{75A5A951-1B12-FC62-4875-59A74BDA964F}"/>
+          </ac:spMkLst>
+        </pc:spChg>
+        <pc:spChg chg="mod">
+          <ac:chgData name="Berta Devenyi" userId="99c6308e8d81b7b6" providerId="LiveId" clId="{FA0CB607-D8BE-48CD-9258-DB1B832A96BD}" dt="2022-09-11T03:34:22.496" v="1" actId="20577"/>
+          <ac:spMkLst>
+            <pc:docMk/>
+            <pc:sldMk cId="1114990967" sldId="262"/>
+            <ac:spMk id="7" creationId="{BBD6697D-2431-035B-A37E-0089CFBE1ECA}"/>
+          </ac:spMkLst>
+        </pc:spChg>
+      </pc:sldChg>
+      <pc:sldChg chg="addSp delSp modSp add mod setBg">
+        <pc:chgData name="Berta Devenyi" userId="99c6308e8d81b7b6" providerId="LiveId" clId="{FA0CB607-D8BE-48CD-9258-DB1B832A96BD}" dt="2022-09-11T05:12:47.324" v="696" actId="20577"/>
+        <pc:sldMkLst>
+          <pc:docMk/>
+          <pc:sldMk cId="1446067743" sldId="263"/>
+        </pc:sldMkLst>
+        <pc:spChg chg="mod">
+          <ac:chgData name="Berta Devenyi" userId="99c6308e8d81b7b6" providerId="LiveId" clId="{FA0CB607-D8BE-48CD-9258-DB1B832A96BD}" dt="2022-09-11T03:43:11.535" v="131" actId="26606"/>
+          <ac:spMkLst>
+            <pc:docMk/>
+            <pc:sldMk cId="1446067743" sldId="263"/>
+            <ac:spMk id="4" creationId="{33626372-42A7-F501-CD18-F3C48E2FD070}"/>
+          </ac:spMkLst>
+        </pc:spChg>
+        <pc:spChg chg="mod">
+          <ac:chgData name="Berta Devenyi" userId="99c6308e8d81b7b6" providerId="LiveId" clId="{FA0CB607-D8BE-48CD-9258-DB1B832A96BD}" dt="2022-09-11T05:12:47.324" v="696" actId="20577"/>
+          <ac:spMkLst>
+            <pc:docMk/>
+            <pc:sldMk cId="1446067743" sldId="263"/>
+            <ac:spMk id="5" creationId="{2AB91FB6-8116-C465-F7A7-A77B58B7017C}"/>
+          </ac:spMkLst>
+        </pc:spChg>
+        <pc:spChg chg="add del">
+          <ac:chgData name="Berta Devenyi" userId="99c6308e8d81b7b6" providerId="LiveId" clId="{FA0CB607-D8BE-48CD-9258-DB1B832A96BD}" dt="2022-09-11T03:51:15.504" v="136" actId="26606"/>
+          <ac:spMkLst>
+            <pc:docMk/>
+            <pc:sldMk cId="1446067743" sldId="263"/>
+            <ac:spMk id="10" creationId="{990D0034-F768-41E7-85D4-F38C4DE85770}"/>
+          </ac:spMkLst>
+        </pc:spChg>
+        <pc:spChg chg="add del">
+          <ac:chgData name="Berta Devenyi" userId="99c6308e8d81b7b6" providerId="LiveId" clId="{FA0CB607-D8BE-48CD-9258-DB1B832A96BD}" dt="2022-09-11T03:51:15.504" v="136" actId="26606"/>
+          <ac:spMkLst>
+            <pc:docMk/>
+            <pc:sldMk cId="1446067743" sldId="263"/>
+            <ac:spMk id="12" creationId="{C4F7E42D-8B5A-4FC8-81CD-9E60171F7FA8}"/>
+          </ac:spMkLst>
+        </pc:spChg>
+        <pc:spChg chg="add del">
+          <ac:chgData name="Berta Devenyi" userId="99c6308e8d81b7b6" providerId="LiveId" clId="{FA0CB607-D8BE-48CD-9258-DB1B832A96BD}" dt="2022-09-11T03:51:15.504" v="136" actId="26606"/>
+          <ac:spMkLst>
+            <pc:docMk/>
+            <pc:sldMk cId="1446067743" sldId="263"/>
+            <ac:spMk id="14" creationId="{8C04651D-B9F4-4935-A02D-364153FBDF54}"/>
+          </ac:spMkLst>
+        </pc:spChg>
+        <pc:spChg chg="add del">
+          <ac:chgData name="Berta Devenyi" userId="99c6308e8d81b7b6" providerId="LiveId" clId="{FA0CB607-D8BE-48CD-9258-DB1B832A96BD}" dt="2022-09-11T03:54:46.985" v="407" actId="26606"/>
+          <ac:spMkLst>
+            <pc:docMk/>
+            <pc:sldMk cId="1446067743" sldId="263"/>
+            <ac:spMk id="19" creationId="{44CC594A-A820-450F-B363-C19201FCFEC6}"/>
+          </ac:spMkLst>
+        </pc:spChg>
+        <pc:spChg chg="add del">
+          <ac:chgData name="Berta Devenyi" userId="99c6308e8d81b7b6" providerId="LiveId" clId="{FA0CB607-D8BE-48CD-9258-DB1B832A96BD}" dt="2022-09-11T03:54:46.985" v="407" actId="26606"/>
+          <ac:spMkLst>
+            <pc:docMk/>
+            <pc:sldMk cId="1446067743" sldId="263"/>
+            <ac:spMk id="21" creationId="{59FAB3DA-E9ED-4574-ABCC-378BC0FF1BBC}"/>
+          </ac:spMkLst>
+        </pc:spChg>
+        <pc:spChg chg="add del">
+          <ac:chgData name="Berta Devenyi" userId="99c6308e8d81b7b6" providerId="LiveId" clId="{FA0CB607-D8BE-48CD-9258-DB1B832A96BD}" dt="2022-09-11T03:54:46.985" v="407" actId="26606"/>
+          <ac:spMkLst>
+            <pc:docMk/>
+            <pc:sldMk cId="1446067743" sldId="263"/>
+            <ac:spMk id="23" creationId="{53B8D6B0-55D6-48DC-86D8-FD95D5F118AB}"/>
+          </ac:spMkLst>
+        </pc:spChg>
+        <pc:spChg chg="add del">
+          <ac:chgData name="Berta Devenyi" userId="99c6308e8d81b7b6" providerId="LiveId" clId="{FA0CB607-D8BE-48CD-9258-DB1B832A96BD}" dt="2022-09-11T03:54:46.978" v="406" actId="26606"/>
+          <ac:spMkLst>
+            <pc:docMk/>
+            <pc:sldMk cId="1446067743" sldId="263"/>
+            <ac:spMk id="28" creationId="{990D0034-F768-41E7-85D4-F38C4DE85770}"/>
+          </ac:spMkLst>
+        </pc:spChg>
+        <pc:spChg chg="add del">
+          <ac:chgData name="Berta Devenyi" userId="99c6308e8d81b7b6" providerId="LiveId" clId="{FA0CB607-D8BE-48CD-9258-DB1B832A96BD}" dt="2022-09-11T03:54:46.978" v="406" actId="26606"/>
+          <ac:spMkLst>
+            <pc:docMk/>
+            <pc:sldMk cId="1446067743" sldId="263"/>
+            <ac:spMk id="30" creationId="{C4F7E42D-8B5A-4FC8-81CD-9E60171F7FA8}"/>
+          </ac:spMkLst>
+        </pc:spChg>
+        <pc:spChg chg="add del">
+          <ac:chgData name="Berta Devenyi" userId="99c6308e8d81b7b6" providerId="LiveId" clId="{FA0CB607-D8BE-48CD-9258-DB1B832A96BD}" dt="2022-09-11T03:54:46.978" v="406" actId="26606"/>
+          <ac:spMkLst>
+            <pc:docMk/>
+            <pc:sldMk cId="1446067743" sldId="263"/>
+            <ac:spMk id="32" creationId="{8C04651D-B9F4-4935-A02D-364153FBDF54}"/>
+          </ac:spMkLst>
+        </pc:spChg>
+        <pc:spChg chg="add">
+          <ac:chgData name="Berta Devenyi" userId="99c6308e8d81b7b6" providerId="LiveId" clId="{FA0CB607-D8BE-48CD-9258-DB1B832A96BD}" dt="2022-09-11T03:54:46.985" v="407" actId="26606"/>
+          <ac:spMkLst>
+            <pc:docMk/>
+            <pc:sldMk cId="1446067743" sldId="263"/>
+            <ac:spMk id="34" creationId="{44CC594A-A820-450F-B363-C19201FCFEC6}"/>
+          </ac:spMkLst>
+        </pc:spChg>
+        <pc:spChg chg="add">
+          <ac:chgData name="Berta Devenyi" userId="99c6308e8d81b7b6" providerId="LiveId" clId="{FA0CB607-D8BE-48CD-9258-DB1B832A96BD}" dt="2022-09-11T03:54:46.985" v="407" actId="26606"/>
+          <ac:spMkLst>
+            <pc:docMk/>
+            <pc:sldMk cId="1446067743" sldId="263"/>
+            <ac:spMk id="35" creationId="{59FAB3DA-E9ED-4574-ABCC-378BC0FF1BBC}"/>
+          </ac:spMkLst>
+        </pc:spChg>
+        <pc:spChg chg="add">
+          <ac:chgData name="Berta Devenyi" userId="99c6308e8d81b7b6" providerId="LiveId" clId="{FA0CB607-D8BE-48CD-9258-DB1B832A96BD}" dt="2022-09-11T03:54:46.985" v="407" actId="26606"/>
+          <ac:spMkLst>
+            <pc:docMk/>
+            <pc:sldMk cId="1446067743" sldId="263"/>
+            <ac:spMk id="36" creationId="{53B8D6B0-55D6-48DC-86D8-FD95D5F118AB}"/>
+          </ac:spMkLst>
+        </pc:spChg>
+        <pc:picChg chg="del mod">
+          <ac:chgData name="Berta Devenyi" userId="99c6308e8d81b7b6" providerId="LiveId" clId="{FA0CB607-D8BE-48CD-9258-DB1B832A96BD}" dt="2022-09-11T03:50:48.785" v="133" actId="478"/>
+          <ac:picMkLst>
+            <pc:docMk/>
+            <pc:sldMk cId="1446067743" sldId="263"/>
+            <ac:picMk id="3" creationId="{E8237492-9E56-2D29-094B-B2CC696C8075}"/>
+          </ac:picMkLst>
+        </pc:picChg>
+        <pc:picChg chg="add mod">
+          <ac:chgData name="Berta Devenyi" userId="99c6308e8d81b7b6" providerId="LiveId" clId="{FA0CB607-D8BE-48CD-9258-DB1B832A96BD}" dt="2022-09-11T03:55:07.850" v="411" actId="1076"/>
+          <ac:picMkLst>
+            <pc:docMk/>
+            <pc:sldMk cId="1446067743" sldId="263"/>
+            <ac:picMk id="6" creationId="{FD651A7A-E8AC-A627-55D8-8A9687139159}"/>
+          </ac:picMkLst>
+        </pc:picChg>
+      </pc:sldChg>
+      <pc:sldChg chg="addSp delSp modSp add mod setBg chgLayout">
+        <pc:chgData name="Berta Devenyi" userId="99c6308e8d81b7b6" providerId="LiveId" clId="{FA0CB607-D8BE-48CD-9258-DB1B832A96BD}" dt="2022-09-11T05:13:15.110" v="718" actId="2711"/>
+        <pc:sldMkLst>
+          <pc:docMk/>
+          <pc:sldMk cId="2516570333" sldId="264"/>
+        </pc:sldMkLst>
+        <pc:spChg chg="mod ord">
+          <ac:chgData name="Berta Devenyi" userId="99c6308e8d81b7b6" providerId="LiveId" clId="{FA0CB607-D8BE-48CD-9258-DB1B832A96BD}" dt="2022-09-11T03:54:19.420" v="404" actId="26606"/>
+          <ac:spMkLst>
+            <pc:docMk/>
+            <pc:sldMk cId="2516570333" sldId="264"/>
+            <ac:spMk id="2" creationId="{A4890AAB-AD6E-4D0C-C387-EDC80BC6710E}"/>
+          </ac:spMkLst>
+        </pc:spChg>
+        <pc:spChg chg="mod ord">
+          <ac:chgData name="Berta Devenyi" userId="99c6308e8d81b7b6" providerId="LiveId" clId="{FA0CB607-D8BE-48CD-9258-DB1B832A96BD}" dt="2022-09-11T05:13:15.110" v="718" actId="2711"/>
+          <ac:spMkLst>
+            <pc:docMk/>
+            <pc:sldMk cId="2516570333" sldId="264"/>
+            <ac:spMk id="3" creationId="{A2747452-7799-79D9-1C74-222841D88F7A}"/>
+          </ac:spMkLst>
+        </pc:spChg>
+        <pc:spChg chg="add del">
+          <ac:chgData name="Berta Devenyi" userId="99c6308e8d81b7b6" providerId="LiveId" clId="{FA0CB607-D8BE-48CD-9258-DB1B832A96BD}" dt="2022-09-11T03:54:19.420" v="404" actId="26606"/>
+          <ac:spMkLst>
+            <pc:docMk/>
+            <pc:sldMk cId="2516570333" sldId="264"/>
+            <ac:spMk id="9" creationId="{44CC594A-A820-450F-B363-C19201FCFEC6}"/>
+          </ac:spMkLst>
+        </pc:spChg>
+        <pc:spChg chg="add del">
+          <ac:chgData name="Berta Devenyi" userId="99c6308e8d81b7b6" providerId="LiveId" clId="{FA0CB607-D8BE-48CD-9258-DB1B832A96BD}" dt="2022-09-11T03:54:19.420" v="404" actId="26606"/>
+          <ac:spMkLst>
+            <pc:docMk/>
+            <pc:sldMk cId="2516570333" sldId="264"/>
+            <ac:spMk id="11" creationId="{59FAB3DA-E9ED-4574-ABCC-378BC0FF1BBC}"/>
+          </ac:spMkLst>
+        </pc:spChg>
+        <pc:spChg chg="add del">
+          <ac:chgData name="Berta Devenyi" userId="99c6308e8d81b7b6" providerId="LiveId" clId="{FA0CB607-D8BE-48CD-9258-DB1B832A96BD}" dt="2022-09-11T03:54:19.420" v="404" actId="26606"/>
+          <ac:spMkLst>
+            <pc:docMk/>
+            <pc:sldMk cId="2516570333" sldId="264"/>
+            <ac:spMk id="13" creationId="{53B8D6B0-55D6-48DC-86D8-FD95D5F118AB}"/>
+          </ac:spMkLst>
+        </pc:spChg>
+        <pc:spChg chg="add del">
+          <ac:chgData name="Berta Devenyi" userId="99c6308e8d81b7b6" providerId="LiveId" clId="{FA0CB607-D8BE-48CD-9258-DB1B832A96BD}" dt="2022-09-11T03:54:19.403" v="403" actId="26606"/>
+          <ac:spMkLst>
+            <pc:docMk/>
+            <pc:sldMk cId="2516570333" sldId="264"/>
+            <ac:spMk id="18" creationId="{7EE378F3-9642-471B-8215-AA32884221B4}"/>
+          </ac:spMkLst>
+        </pc:spChg>
+        <pc:spChg chg="add del">
+          <ac:chgData name="Berta Devenyi" userId="99c6308e8d81b7b6" providerId="LiveId" clId="{FA0CB607-D8BE-48CD-9258-DB1B832A96BD}" dt="2022-09-11T03:54:19.403" v="403" actId="26606"/>
+          <ac:spMkLst>
+            <pc:docMk/>
+            <pc:sldMk cId="2516570333" sldId="264"/>
+            <ac:spMk id="20" creationId="{26405F82-F7FB-4124-AE2B-3D69A007C129}"/>
+          </ac:spMkLst>
+        </pc:spChg>
+        <pc:spChg chg="add del">
+          <ac:chgData name="Berta Devenyi" userId="99c6308e8d81b7b6" providerId="LiveId" clId="{FA0CB607-D8BE-48CD-9258-DB1B832A96BD}" dt="2022-09-11T03:54:19.403" v="403" actId="26606"/>
+          <ac:spMkLst>
+            <pc:docMk/>
+            <pc:sldMk cId="2516570333" sldId="264"/>
+            <ac:spMk id="22" creationId="{AAAE29FD-C3A6-46E4-BF94-132A4C4EE2E0}"/>
+          </ac:spMkLst>
+        </pc:spChg>
+        <pc:spChg chg="add">
+          <ac:chgData name="Berta Devenyi" userId="99c6308e8d81b7b6" providerId="LiveId" clId="{FA0CB607-D8BE-48CD-9258-DB1B832A96BD}" dt="2022-09-11T03:54:19.420" v="404" actId="26606"/>
+          <ac:spMkLst>
+            <pc:docMk/>
+            <pc:sldMk cId="2516570333" sldId="264"/>
+            <ac:spMk id="24" creationId="{44CC594A-A820-450F-B363-C19201FCFEC6}"/>
+          </ac:spMkLst>
+        </pc:spChg>
+        <pc:spChg chg="add">
+          <ac:chgData name="Berta Devenyi" userId="99c6308e8d81b7b6" providerId="LiveId" clId="{FA0CB607-D8BE-48CD-9258-DB1B832A96BD}" dt="2022-09-11T03:54:19.420" v="404" actId="26606"/>
+          <ac:spMkLst>
+            <pc:docMk/>
+            <pc:sldMk cId="2516570333" sldId="264"/>
+            <ac:spMk id="25" creationId="{59FAB3DA-E9ED-4574-ABCC-378BC0FF1BBC}"/>
+          </ac:spMkLst>
+        </pc:spChg>
+        <pc:spChg chg="add">
+          <ac:chgData name="Berta Devenyi" userId="99c6308e8d81b7b6" providerId="LiveId" clId="{FA0CB607-D8BE-48CD-9258-DB1B832A96BD}" dt="2022-09-11T03:54:19.420" v="404" actId="26606"/>
+          <ac:spMkLst>
+            <pc:docMk/>
+            <pc:sldMk cId="2516570333" sldId="264"/>
+            <ac:spMk id="26" creationId="{53B8D6B0-55D6-48DC-86D8-FD95D5F118AB}"/>
+          </ac:spMkLst>
+        </pc:spChg>
+        <pc:graphicFrameChg chg="add mod">
+          <ac:chgData name="Berta Devenyi" userId="99c6308e8d81b7b6" providerId="LiveId" clId="{FA0CB607-D8BE-48CD-9258-DB1B832A96BD}" dt="2022-09-11T03:54:19.420" v="404" actId="26606"/>
+          <ac:graphicFrameMkLst>
+            <pc:docMk/>
+            <pc:sldMk cId="2516570333" sldId="264"/>
+            <ac:graphicFrameMk id="4" creationId="{7A7D3E6D-BA77-35F4-4990-16CEA3386012}"/>
+          </ac:graphicFrameMkLst>
+        </pc:graphicFrameChg>
+      </pc:sldChg>
+      <pc:sldChg chg="addSp modSp new mod setBg">
+        <pc:chgData name="Berta Devenyi" userId="99c6308e8d81b7b6" providerId="LiveId" clId="{FA0CB607-D8BE-48CD-9258-DB1B832A96BD}" dt="2022-09-11T03:56:00.077" v="445" actId="26606"/>
+        <pc:sldMkLst>
+          <pc:docMk/>
+          <pc:sldMk cId="2843435938" sldId="265"/>
+        </pc:sldMkLst>
+        <pc:spChg chg="mod">
+          <ac:chgData name="Berta Devenyi" userId="99c6308e8d81b7b6" providerId="LiveId" clId="{FA0CB607-D8BE-48CD-9258-DB1B832A96BD}" dt="2022-09-11T03:56:00.077" v="445" actId="26606"/>
+          <ac:spMkLst>
+            <pc:docMk/>
+            <pc:sldMk cId="2843435938" sldId="265"/>
+            <ac:spMk id="2" creationId="{62048B59-CA8D-9F7B-C05E-2D0D8376C67C}"/>
+          </ac:spMkLst>
+        </pc:spChg>
+        <pc:spChg chg="mod">
+          <ac:chgData name="Berta Devenyi" userId="99c6308e8d81b7b6" providerId="LiveId" clId="{FA0CB607-D8BE-48CD-9258-DB1B832A96BD}" dt="2022-09-11T03:56:00.077" v="445" actId="26606"/>
+          <ac:spMkLst>
+            <pc:docMk/>
+            <pc:sldMk cId="2843435938" sldId="265"/>
+            <ac:spMk id="3" creationId="{269556EF-8199-C759-595A-3DFA7EA78684}"/>
+          </ac:spMkLst>
+        </pc:spChg>
+        <pc:spChg chg="add">
+          <ac:chgData name="Berta Devenyi" userId="99c6308e8d81b7b6" providerId="LiveId" clId="{FA0CB607-D8BE-48CD-9258-DB1B832A96BD}" dt="2022-09-11T03:56:00.077" v="445" actId="26606"/>
+          <ac:spMkLst>
+            <pc:docMk/>
+            <pc:sldMk cId="2843435938" sldId="265"/>
+            <ac:spMk id="8" creationId="{3741B58E-3B65-4A01-A276-975AB2CF8A08}"/>
+          </ac:spMkLst>
+        </pc:spChg>
+        <pc:spChg chg="add">
+          <ac:chgData name="Berta Devenyi" userId="99c6308e8d81b7b6" providerId="LiveId" clId="{FA0CB607-D8BE-48CD-9258-DB1B832A96BD}" dt="2022-09-11T03:56:00.077" v="445" actId="26606"/>
+          <ac:spMkLst>
+            <pc:docMk/>
+            <pc:sldMk cId="2843435938" sldId="265"/>
+            <ac:spMk id="10" creationId="{7AAC67C3-831B-4AB1-A259-DFB839CAFAFC}"/>
+          </ac:spMkLst>
+        </pc:spChg>
+        <pc:spChg chg="add">
+          <ac:chgData name="Berta Devenyi" userId="99c6308e8d81b7b6" providerId="LiveId" clId="{FA0CB607-D8BE-48CD-9258-DB1B832A96BD}" dt="2022-09-11T03:56:00.077" v="445" actId="26606"/>
+          <ac:spMkLst>
+            <pc:docMk/>
+            <pc:sldMk cId="2843435938" sldId="265"/>
+            <ac:spMk id="12" creationId="{054B3F04-9EAC-45C0-B3CE-0387EEA10A0C}"/>
+          </ac:spMkLst>
+        </pc:spChg>
+      </pc:sldChg>
+      <pc:sldChg chg="modSp new del mod">
+        <pc:chgData name="Berta Devenyi" userId="99c6308e8d81b7b6" providerId="LiveId" clId="{FA0CB607-D8BE-48CD-9258-DB1B832A96BD}" dt="2022-09-11T03:54:01.754" v="400" actId="47"/>
+        <pc:sldMkLst>
+          <pc:docMk/>
+          <pc:sldMk cId="2853383015" sldId="265"/>
+        </pc:sldMkLst>
+        <pc:spChg chg="mod">
+          <ac:chgData name="Berta Devenyi" userId="99c6308e8d81b7b6" providerId="LiveId" clId="{FA0CB607-D8BE-48CD-9258-DB1B832A96BD}" dt="2022-09-11T03:37:23.456" v="11" actId="5793"/>
+          <ac:spMkLst>
+            <pc:docMk/>
+            <pc:sldMk cId="2853383015" sldId="265"/>
+            <ac:spMk id="3" creationId="{C08BC687-8EE4-6340-5C5D-A42D2FC0FEAF}"/>
+          </ac:spMkLst>
+        </pc:spChg>
+      </pc:sldChg>
+      <pc:sldChg chg="delSp add del setBg delDesignElem">
+        <pc:chgData name="Berta Devenyi" userId="99c6308e8d81b7b6" providerId="LiveId" clId="{FA0CB607-D8BE-48CD-9258-DB1B832A96BD}" dt="2022-09-11T03:54:04.733" v="401" actId="47"/>
+        <pc:sldMkLst>
+          <pc:docMk/>
+          <pc:sldMk cId="794702256" sldId="266"/>
+        </pc:sldMkLst>
+        <pc:spChg chg="del">
+          <ac:chgData name="Berta Devenyi" userId="99c6308e8d81b7b6" providerId="LiveId" clId="{FA0CB607-D8BE-48CD-9258-DB1B832A96BD}" dt="2022-09-11T03:37:06.625" v="10"/>
+          <ac:spMkLst>
+            <pc:docMk/>
+            <pc:sldMk cId="794702256" sldId="266"/>
+            <ac:spMk id="9" creationId="{4E4490D0-3672-446A-AC12-B4830333BDDD}"/>
+          </ac:spMkLst>
+        </pc:spChg>
+        <pc:spChg chg="del">
+          <ac:chgData name="Berta Devenyi" userId="99c6308e8d81b7b6" providerId="LiveId" clId="{FA0CB607-D8BE-48CD-9258-DB1B832A96BD}" dt="2022-09-11T03:37:06.625" v="10"/>
+          <ac:spMkLst>
+            <pc:docMk/>
+            <pc:sldMk cId="794702256" sldId="266"/>
+            <ac:spMk id="11" creationId="{39CB82C2-DF65-4EC1-8280-F201D50F570B}"/>
+          </ac:spMkLst>
+        </pc:spChg>
+        <pc:spChg chg="del">
+          <ac:chgData name="Berta Devenyi" userId="99c6308e8d81b7b6" providerId="LiveId" clId="{FA0CB607-D8BE-48CD-9258-DB1B832A96BD}" dt="2022-09-11T03:37:06.625" v="10"/>
+          <ac:spMkLst>
+            <pc:docMk/>
+            <pc:sldMk cId="794702256" sldId="266"/>
+            <ac:spMk id="15" creationId="{5A1B47C8-47A0-4A88-8830-6DEA3B5DE392}"/>
+          </ac:spMkLst>
+        </pc:spChg>
+        <pc:spChg chg="del">
+          <ac:chgData name="Berta Devenyi" userId="99c6308e8d81b7b6" providerId="LiveId" clId="{FA0CB607-D8BE-48CD-9258-DB1B832A96BD}" dt="2022-09-11T03:37:06.625" v="10"/>
+          <ac:spMkLst>
+            <pc:docMk/>
+            <pc:sldMk cId="794702256" sldId="266"/>
+            <ac:spMk id="17" creationId="{984BBFDD-E720-4805-A9C8-129FBBF6DD70}"/>
+          </ac:spMkLst>
+        </pc:spChg>
+        <pc:spChg chg="del">
+          <ac:chgData name="Berta Devenyi" userId="99c6308e8d81b7b6" providerId="LiveId" clId="{FA0CB607-D8BE-48CD-9258-DB1B832A96BD}" dt="2022-09-11T03:37:06.625" v="10"/>
+          <ac:spMkLst>
+            <pc:docMk/>
+            <pc:sldMk cId="794702256" sldId="266"/>
+            <ac:spMk id="19" creationId="{5AC4BE46-4A77-42FE-9D15-065CDB2F847C}"/>
+          </ac:spMkLst>
+        </pc:spChg>
+        <pc:cxnChg chg="del">
+          <ac:chgData name="Berta Devenyi" userId="99c6308e8d81b7b6" providerId="LiveId" clId="{FA0CB607-D8BE-48CD-9258-DB1B832A96BD}" dt="2022-09-11T03:37:06.625" v="10"/>
+          <ac:cxnSpMkLst>
+            <pc:docMk/>
+            <pc:sldMk cId="794702256" sldId="266"/>
+            <ac:cxnSpMk id="13" creationId="{7E1D4427-852B-4B37-8E76-0E9F1810BA2A}"/>
+          </ac:cxnSpMkLst>
+        </pc:cxnChg>
+      </pc:sldChg>
+      <pc:sldChg chg="addSp delSp add del setBg delDesignElem">
+        <pc:chgData name="Berta Devenyi" userId="99c6308e8d81b7b6" providerId="LiveId" clId="{FA0CB607-D8BE-48CD-9258-DB1B832A96BD}" dt="2022-09-11T03:38:53.282" v="14"/>
+        <pc:sldMkLst>
+          <pc:docMk/>
+          <pc:sldMk cId="271679335" sldId="267"/>
+        </pc:sldMkLst>
+        <pc:spChg chg="add del">
+          <ac:chgData name="Berta Devenyi" userId="99c6308e8d81b7b6" providerId="LiveId" clId="{FA0CB607-D8BE-48CD-9258-DB1B832A96BD}" dt="2022-09-11T03:38:53.282" v="14"/>
+          <ac:spMkLst>
+            <pc:docMk/>
+            <pc:sldMk cId="271679335" sldId="267"/>
+            <ac:spMk id="9" creationId="{4E4490D0-3672-446A-AC12-B4830333BDDD}"/>
+          </ac:spMkLst>
+        </pc:spChg>
+        <pc:spChg chg="add del">
+          <ac:chgData name="Berta Devenyi" userId="99c6308e8d81b7b6" providerId="LiveId" clId="{FA0CB607-D8BE-48CD-9258-DB1B832A96BD}" dt="2022-09-11T03:38:53.282" v="14"/>
+          <ac:spMkLst>
+            <pc:docMk/>
+            <pc:sldMk cId="271679335" sldId="267"/>
+            <ac:spMk id="11" creationId="{39CB82C2-DF65-4EC1-8280-F201D50F570B}"/>
+          </ac:spMkLst>
+        </pc:spChg>
+        <pc:spChg chg="add del">
+          <ac:chgData name="Berta Devenyi" userId="99c6308e8d81b7b6" providerId="LiveId" clId="{FA0CB607-D8BE-48CD-9258-DB1B832A96BD}" dt="2022-09-11T03:38:53.282" v="14"/>
+          <ac:spMkLst>
+            <pc:docMk/>
+            <pc:sldMk cId="271679335" sldId="267"/>
+            <ac:spMk id="15" creationId="{5A1B47C8-47A0-4A88-8830-6DEA3B5DE392}"/>
+          </ac:spMkLst>
+        </pc:spChg>
+        <pc:spChg chg="add del">
+          <ac:chgData name="Berta Devenyi" userId="99c6308e8d81b7b6" providerId="LiveId" clId="{FA0CB607-D8BE-48CD-9258-DB1B832A96BD}" dt="2022-09-11T03:38:53.282" v="14"/>
+          <ac:spMkLst>
+            <pc:docMk/>
+            <pc:sldMk cId="271679335" sldId="267"/>
+            <ac:spMk id="17" creationId="{984BBFDD-E720-4805-A9C8-129FBBF6DD70}"/>
+          </ac:spMkLst>
+        </pc:spChg>
+        <pc:spChg chg="add del">
+          <ac:chgData name="Berta Devenyi" userId="99c6308e8d81b7b6" providerId="LiveId" clId="{FA0CB607-D8BE-48CD-9258-DB1B832A96BD}" dt="2022-09-11T03:38:53.282" v="14"/>
+          <ac:spMkLst>
+            <pc:docMk/>
+            <pc:sldMk cId="271679335" sldId="267"/>
+            <ac:spMk id="19" creationId="{5AC4BE46-4A77-42FE-9D15-065CDB2F847C}"/>
+          </ac:spMkLst>
+        </pc:spChg>
+        <pc:cxnChg chg="add del">
+          <ac:chgData name="Berta Devenyi" userId="99c6308e8d81b7b6" providerId="LiveId" clId="{FA0CB607-D8BE-48CD-9258-DB1B832A96BD}" dt="2022-09-11T03:38:53.282" v="14"/>
+          <ac:cxnSpMkLst>
+            <pc:docMk/>
+            <pc:sldMk cId="271679335" sldId="267"/>
+            <ac:cxnSpMk id="13" creationId="{7E1D4427-852B-4B37-8E76-0E9F1810BA2A}"/>
+          </ac:cxnSpMkLst>
+        </pc:cxnChg>
+      </pc:sldChg>
+    </pc:docChg>
+  </pc:docChgLst>
+</pc:chgInfo>
+</file>
+
+<file path=ppt/charts/chart1.xml><?xml version="1.0" encoding="utf-8"?>
+<c:chartSpace xmlns:c="http://schemas.openxmlformats.org/drawingml/2006/chart" xmlns:a="http://schemas.openxmlformats.org/drawingml/2006/main" xmlns:r="http://schemas.openxmlformats.org/officeDocument/2006/relationships" xmlns:c16r2="http://schemas.microsoft.com/office/drawing/2015/06/chart">
+  <c:date1904 val="0"/>
+  <c:lang val="en-US"/>
+  <c:roundedCorners val="0"/>
+  <mc:AlternateContent xmlns:mc="http://schemas.openxmlformats.org/markup-compatibility/2006">
+    <mc:Choice xmlns:c14="http://schemas.microsoft.com/office/drawing/2007/8/2/chart" Requires="c14">
+      <c14:style val="102"/>
+    </mc:Choice>
+    <mc:Fallback>
+      <c:style val="2"/>
+    </mc:Fallback>
+  </mc:AlternateContent>
+  <c:chart>
+    <c:title>
+      <c:tx>
+        <c:rich>
+          <a:bodyPr rot="0" spcFirstLastPara="1" vertOverflow="ellipsis" vert="horz" wrap="square" anchor="ctr" anchorCtr="1"/>
+          <a:lstStyle/>
+          <a:p>
+            <a:pPr>
+              <a:defRPr sz="1400" b="0" i="0" u="none" strike="noStrike" kern="1200" spc="0" baseline="0">
+                <a:solidFill>
+                  <a:schemeClr val="tx1">
+                    <a:lumMod val="65000"/>
+                    <a:lumOff val="35000"/>
+                  </a:schemeClr>
+                </a:solidFill>
+                <a:latin typeface="+mn-lt"/>
+                <a:ea typeface="+mn-ea"/>
+                <a:cs typeface="+mn-cs"/>
+              </a:defRPr>
+            </a:pPr>
+            <a:r>
+              <a:rPr lang="en-AU"/>
+              <a:t>Ballarat, 2019</a:t>
+            </a:r>
+          </a:p>
+        </c:rich>
+      </c:tx>
+      <c:overlay val="0"/>
+      <c:spPr>
+        <a:noFill/>
+        <a:ln>
+          <a:noFill/>
+        </a:ln>
+        <a:effectLst/>
+      </c:spPr>
+      <c:txPr>
+        <a:bodyPr rot="0" spcFirstLastPara="1" vertOverflow="ellipsis" vert="horz" wrap="square" anchor="ctr" anchorCtr="1"/>
+        <a:lstStyle/>
+        <a:p>
+          <a:pPr>
+            <a:defRPr sz="1400" b="0" i="0" u="none" strike="noStrike" kern="1200" spc="0" baseline="0">
+              <a:solidFill>
+                <a:schemeClr val="tx1">
+                  <a:lumMod val="65000"/>
+                  <a:lumOff val="35000"/>
+                </a:schemeClr>
+              </a:solidFill>
+              <a:latin typeface="+mn-lt"/>
+              <a:ea typeface="+mn-ea"/>
+              <a:cs typeface="+mn-cs"/>
+            </a:defRPr>
+          </a:pPr>
+          <a:endParaRPr lang="en-US"/>
+        </a:p>
+      </c:txPr>
+    </c:title>
+    <c:autoTitleDeleted val="0"/>
+    <c:plotArea>
+      <c:layout/>
+      <c:barChart>
+        <c:barDir val="col"/>
+        <c:grouping val="clustered"/>
+        <c:varyColors val="0"/>
+        <c:ser>
+          <c:idx val="0"/>
+          <c:order val="0"/>
+          <c:tx>
+            <c:strRef>
+              <c:f>Sheet1!$B$2</c:f>
+              <c:strCache>
+                <c:ptCount val="1"/>
+                <c:pt idx="0">
+                  <c:v>Ballarat</c:v>
+                </c:pt>
+              </c:strCache>
+            </c:strRef>
+          </c:tx>
+          <c:spPr>
+            <a:solidFill>
+              <a:schemeClr val="accent1"/>
+            </a:solidFill>
+            <a:ln>
+              <a:noFill/>
+            </a:ln>
+            <a:effectLst/>
+          </c:spPr>
+          <c:invertIfNegative val="0"/>
+          <c:cat>
+            <c:strRef>
+              <c:f>Sheet1!$C$1:$H$1</c:f>
+              <c:strCache>
+                <c:ptCount val="6"/>
+                <c:pt idx="0">
+                  <c:v>a_crime_vs_person</c:v>
+                </c:pt>
+                <c:pt idx="1">
+                  <c:v>b_property_deception</c:v>
+                </c:pt>
+                <c:pt idx="2">
+                  <c:v>c_drug_offence</c:v>
+                </c:pt>
+                <c:pt idx="3">
+                  <c:v>d_public_order_security</c:v>
+                </c:pt>
+                <c:pt idx="4">
+                  <c:v>e_justice_offence</c:v>
+                </c:pt>
+                <c:pt idx="5">
+                  <c:v>f_other_offence</c:v>
+                </c:pt>
+              </c:strCache>
+            </c:strRef>
+          </c:cat>
+          <c:val>
+            <c:numRef>
+              <c:f>Sheet1!$C$2:$H$2</c:f>
+              <c:numCache>
+                <c:formatCode>General</c:formatCode>
+                <c:ptCount val="6"/>
+                <c:pt idx="0">
+                  <c:v>1372</c:v>
+                </c:pt>
+                <c:pt idx="1">
+                  <c:v>5061</c:v>
+                </c:pt>
+                <c:pt idx="2">
+                  <c:v>204</c:v>
+                </c:pt>
+                <c:pt idx="3">
+                  <c:v>372</c:v>
+                </c:pt>
+                <c:pt idx="4">
+                  <c:v>1105</c:v>
+                </c:pt>
+                <c:pt idx="5">
+                  <c:v>15</c:v>
+                </c:pt>
+              </c:numCache>
+            </c:numRef>
+          </c:val>
+          <c:extLst>
+            <c:ext xmlns:c16="http://schemas.microsoft.com/office/drawing/2014/chart" uri="{C3380CC4-5D6E-409C-BE32-E72D297353CC}">
+              <c16:uniqueId val="{00000000-F43A-4A8A-BEA5-FB65349AEBAE}"/>
+            </c:ext>
+          </c:extLst>
+        </c:ser>
+        <c:dLbls>
+          <c:showLegendKey val="0"/>
+          <c:showVal val="0"/>
+          <c:showCatName val="0"/>
+          <c:showSerName val="0"/>
+          <c:showPercent val="0"/>
+          <c:showBubbleSize val="0"/>
+        </c:dLbls>
+        <c:gapWidth val="219"/>
+        <c:overlap val="-27"/>
+        <c:axId val="1142630416"/>
+        <c:axId val="1142634992"/>
+      </c:barChart>
+      <c:catAx>
+        <c:axId val="1142630416"/>
+        <c:scaling>
+          <c:orientation val="minMax"/>
+        </c:scaling>
+        <c:delete val="0"/>
+        <c:axPos val="b"/>
+        <c:numFmt formatCode="General" sourceLinked="1"/>
+        <c:majorTickMark val="none"/>
+        <c:minorTickMark val="none"/>
+        <c:tickLblPos val="nextTo"/>
+        <c:spPr>
+          <a:noFill/>
+          <a:ln w="9525" cap="flat" cmpd="sng" algn="ctr">
+            <a:solidFill>
+              <a:schemeClr val="tx1">
+                <a:lumMod val="15000"/>
+                <a:lumOff val="85000"/>
+              </a:schemeClr>
+            </a:solidFill>
+            <a:round/>
+          </a:ln>
+          <a:effectLst/>
+        </c:spPr>
+        <c:txPr>
+          <a:bodyPr rot="-60000000" spcFirstLastPara="1" vertOverflow="ellipsis" vert="horz" wrap="square" anchor="ctr" anchorCtr="1"/>
+          <a:lstStyle/>
+          <a:p>
+            <a:pPr>
+              <a:defRPr sz="900" b="0" i="0" u="none" strike="noStrike" kern="1200" baseline="0">
+                <a:solidFill>
+                  <a:schemeClr val="tx1">
+                    <a:lumMod val="65000"/>
+                    <a:lumOff val="35000"/>
+                  </a:schemeClr>
+                </a:solidFill>
+                <a:latin typeface="+mn-lt"/>
+                <a:ea typeface="+mn-ea"/>
+                <a:cs typeface="+mn-cs"/>
+              </a:defRPr>
+            </a:pPr>
+            <a:endParaRPr lang="en-US"/>
+          </a:p>
+        </c:txPr>
+        <c:crossAx val="1142634992"/>
+        <c:crosses val="autoZero"/>
+        <c:auto val="1"/>
+        <c:lblAlgn val="ctr"/>
+        <c:lblOffset val="100"/>
+        <c:noMultiLvlLbl val="0"/>
+      </c:catAx>
+      <c:valAx>
+        <c:axId val="1142634992"/>
+        <c:scaling>
+          <c:orientation val="minMax"/>
+        </c:scaling>
+        <c:delete val="0"/>
+        <c:axPos val="l"/>
+        <c:majorGridlines>
+          <c:spPr>
+            <a:ln w="9525" cap="flat" cmpd="sng" algn="ctr">
+              <a:solidFill>
+                <a:schemeClr val="tx1">
+                  <a:lumMod val="15000"/>
+                  <a:lumOff val="85000"/>
+                </a:schemeClr>
+              </a:solidFill>
+              <a:round/>
+            </a:ln>
+            <a:effectLst/>
+          </c:spPr>
+        </c:majorGridlines>
+        <c:numFmt formatCode="General" sourceLinked="1"/>
+        <c:majorTickMark val="none"/>
+        <c:minorTickMark val="none"/>
+        <c:tickLblPos val="nextTo"/>
+        <c:spPr>
+          <a:noFill/>
+          <a:ln>
+            <a:noFill/>
+          </a:ln>
+          <a:effectLst/>
+        </c:spPr>
+        <c:txPr>
+          <a:bodyPr rot="-60000000" spcFirstLastPara="1" vertOverflow="ellipsis" vert="horz" wrap="square" anchor="ctr" anchorCtr="1"/>
+          <a:lstStyle/>
+          <a:p>
+            <a:pPr>
+              <a:defRPr sz="900" b="0" i="0" u="none" strike="noStrike" kern="1200" baseline="0">
+                <a:solidFill>
+                  <a:schemeClr val="tx1">
+                    <a:lumMod val="65000"/>
+                    <a:lumOff val="35000"/>
+                  </a:schemeClr>
+                </a:solidFill>
+                <a:latin typeface="+mn-lt"/>
+                <a:ea typeface="+mn-ea"/>
+                <a:cs typeface="+mn-cs"/>
+              </a:defRPr>
+            </a:pPr>
+            <a:endParaRPr lang="en-US"/>
+          </a:p>
+        </c:txPr>
+        <c:crossAx val="1142630416"/>
+        <c:crosses val="autoZero"/>
+        <c:crossBetween val="between"/>
+      </c:valAx>
+      <c:spPr>
+        <a:noFill/>
+        <a:ln>
+          <a:noFill/>
+        </a:ln>
+        <a:effectLst/>
+      </c:spPr>
+    </c:plotArea>
+    <c:plotVisOnly val="1"/>
+    <c:dispBlanksAs val="gap"/>
+    <c:showDLblsOverMax val="0"/>
+  </c:chart>
+  <c:spPr>
+    <a:noFill/>
+    <a:ln>
+      <a:noFill/>
+    </a:ln>
+    <a:effectLst/>
+  </c:spPr>
+  <c:txPr>
+    <a:bodyPr/>
+    <a:lstStyle/>
+    <a:p>
+      <a:pPr>
+        <a:defRPr/>
+      </a:pPr>
+      <a:endParaRPr lang="en-US"/>
+    </a:p>
+  </c:txPr>
+  <c:externalData r:id="rId3">
+    <c:autoUpdate val="0"/>
+  </c:externalData>
+</c:chartSpace>
+</file>
+
+<file path=ppt/charts/colors1.xml><?xml version="1.0" encoding="utf-8"?>
+<cs:colorStyle xmlns:cs="http://schemas.microsoft.com/office/drawing/2012/chartStyle" xmlns:a="http://schemas.openxmlformats.org/drawingml/2006/main" meth="cycle" id="10">
+  <a:schemeClr val="accent1"/>
+  <a:schemeClr val="accent2"/>
+  <a:schemeClr val="accent3"/>
+  <a:schemeClr val="accent4"/>
+  <a:schemeClr val="accent5"/>
+  <a:schemeClr val="accent6"/>
+  <cs:variation/>
+  <cs:variation>
+    <a:lumMod val="60000"/>
+  </cs:variation>
+  <cs:variation>
+    <a:lumMod val="80000"/>
+    <a:lumOff val="20000"/>
+  </cs:variation>
+  <cs:variation>
+    <a:lumMod val="80000"/>
+  </cs:variation>
+  <cs:variation>
+    <a:lumMod val="60000"/>
+    <a:lumOff val="40000"/>
+  </cs:variation>
+  <cs:variation>
+    <a:lumMod val="50000"/>
+  </cs:variation>
+  <cs:variation>
+    <a:lumMod val="70000"/>
+    <a:lumOff val="30000"/>
+  </cs:variation>
+  <cs:variation>
+    <a:lumMod val="70000"/>
+  </cs:variation>
+  <cs:variation>
+    <a:lumMod val="50000"/>
+    <a:lumOff val="50000"/>
+  </cs:variation>
+</cs:colorStyle>
+</file>
+
+<file path=ppt/charts/style1.xml><?xml version="1.0" encoding="utf-8"?>
+<cs:chartStyle xmlns:cs="http://schemas.microsoft.com/office/drawing/2012/chartStyle" xmlns:a="http://schemas.openxmlformats.org/drawingml/2006/main" id="201">
+  <cs:axisTitle>
+    <cs:lnRef idx="0"/>
+    <cs:fillRef idx="0"/>
+    <cs:effectRef idx="0"/>
+    <cs:fontRef idx="minor">
+      <a:schemeClr val="tx1">
+        <a:lumMod val="65000"/>
+        <a:lumOff val="35000"/>
+      </a:schemeClr>
+    </cs:fontRef>
+    <cs:defRPr sz="1000" kern="1200"/>
+  </cs:axisTitle>
+  <cs:categoryAxis>
+    <cs:lnRef idx="0"/>
+    <cs:fillRef idx="0"/>
+    <cs:effectRef idx="0"/>
+    <cs:fontRef idx="minor">
+      <a:schemeClr val="tx1">
+        <a:lumMod val="65000"/>
+        <a:lumOff val="35000"/>
+      </a:schemeClr>
+    </cs:fontRef>
+    <cs:spPr>
+      <a:ln w="9525" cap="flat" cmpd="sng" algn="ctr">
+        <a:solidFill>
+          <a:schemeClr val="tx1">
+            <a:lumMod val="15000"/>
+            <a:lumOff val="85000"/>
+          </a:schemeClr>
+        </a:solidFill>
+        <a:round/>
+      </a:ln>
+    </cs:spPr>
+    <cs:defRPr sz="900" kern="1200"/>
+  </cs:categoryAxis>
+  <cs:chartArea mods="allowNoFillOverride allowNoLineOverride">
+    <cs:lnRef idx="0"/>
+    <cs:fillRef idx="0"/>
+    <cs:effectRef idx="0"/>
+    <cs:fontRef idx="minor">
+      <a:schemeClr val="tx1"/>
+    </cs:fontRef>
+    <cs:spPr>
+      <a:solidFill>
+        <a:schemeClr val="bg1"/>
+      </a:solidFill>
+      <a:ln w="9525" cap="flat" cmpd="sng" algn="ctr">
+        <a:solidFill>
+          <a:schemeClr val="tx1">
+            <a:lumMod val="15000"/>
+            <a:lumOff val="85000"/>
+          </a:schemeClr>
+        </a:solidFill>
+        <a:round/>
+      </a:ln>
+    </cs:spPr>
+    <cs:defRPr sz="1000" kern="1200"/>
+  </cs:chartArea>
+  <cs:dataLabel>
+    <cs:lnRef idx="0"/>
+    <cs:fillRef idx="0"/>
+    <cs:effectRef idx="0"/>
+    <cs:fontRef idx="minor">
+      <a:schemeClr val="tx1">
+        <a:lumMod val="75000"/>
+        <a:lumOff val="25000"/>
+      </a:schemeClr>
+    </cs:fontRef>
+    <cs:defRPr sz="900" kern="1200"/>
+  </cs:dataLabel>
+  <cs:dataLabelCallout>
+    <cs:lnRef idx="0"/>
+    <cs:fillRef idx="0"/>
+    <cs:effectRef idx="0"/>
+    <cs:fontRef idx="minor">
+      <a:schemeClr val="dk1">
+        <a:lumMod val="65000"/>
+        <a:lumOff val="35000"/>
+      </a:schemeClr>
+    </cs:fontRef>
+    <cs:spPr>
+      <a:solidFill>
+        <a:schemeClr val="lt1"/>
+      </a:solidFill>
+      <a:ln>
+        <a:solidFill>
+          <a:schemeClr val="dk1">
+            <a:lumMod val="25000"/>
+            <a:lumOff val="75000"/>
+          </a:schemeClr>
+        </a:solidFill>
+      </a:ln>
+    </cs:spPr>
+    <cs:defRPr sz="900" kern="1200"/>
+    <cs:bodyPr rot="0" spcFirstLastPara="1" vertOverflow="clip" horzOverflow="clip" vert="horz" wrap="square" lIns="36576" tIns="18288" rIns="36576" bIns="18288" anchor="ctr" anchorCtr="1">
+      <a:spAutoFit/>
+    </cs:bodyPr>
+  </cs:dataLabelCallout>
+  <cs:dataPoint>
+    <cs:lnRef idx="0"/>
+    <cs:fillRef idx="1">
+      <cs:styleClr val="auto"/>
+    </cs:fillRef>
+    <cs:effectRef idx="0"/>
+    <cs:fontRef idx="minor">
+      <a:schemeClr val="tx1"/>
+    </cs:fontRef>
+  </cs:dataPoint>
+  <cs:dataPoint3D>
+    <cs:lnRef idx="0"/>
+    <cs:fillRef idx="1">
+      <cs:styleClr val="auto"/>
+    </cs:fillRef>
+    <cs:effectRef idx="0"/>
+    <cs:fontRef idx="minor">
+      <a:schemeClr val="tx1"/>
+    </cs:fontRef>
+  </cs:dataPoint3D>
+  <cs:dataPointLine>
+    <cs:lnRef idx="0">
+      <cs:styleClr val="auto"/>
+    </cs:lnRef>
+    <cs:fillRef idx="1"/>
+    <cs:effectRef idx="0"/>
+    <cs:fontRef idx="minor">
+      <a:schemeClr val="tx1"/>
+    </cs:fontRef>
+    <cs:spPr>
+      <a:ln w="28575" cap="rnd">
+        <a:solidFill>
+          <a:schemeClr val="phClr"/>
+        </a:solidFill>
+        <a:round/>
+      </a:ln>
+    </cs:spPr>
+  </cs:dataPointLine>
+  <cs:dataPointMarker>
+    <cs:lnRef idx="0">
+      <cs:styleClr val="auto"/>
+    </cs:lnRef>
+    <cs:fillRef idx="1">
+      <cs:styleClr val="auto"/>
+    </cs:fillRef>
+    <cs:effectRef idx="0"/>
+    <cs:fontRef idx="minor">
+      <a:schemeClr val="tx1"/>
+    </cs:fontRef>
+    <cs:spPr>
+      <a:ln w="9525">
+        <a:solidFill>
+          <a:schemeClr val="phClr"/>
+        </a:solidFill>
+      </a:ln>
+    </cs:spPr>
+  </cs:dataPointMarker>
+  <cs:dataPointMarkerLayout symbol="circle" size="5"/>
+  <cs:dataPointWireframe>
+    <cs:lnRef idx="0">
+      <cs:styleClr val="auto"/>
+    </cs:lnRef>
+    <cs:fillRef idx="1"/>
+    <cs:effectRef idx="0"/>
+    <cs:fontRef idx="minor">
+      <a:schemeClr val="tx1"/>
+    </cs:fontRef>
+    <cs:spPr>
+      <a:ln w="9525" cap="rnd">
+        <a:solidFill>
+          <a:schemeClr val="phClr"/>
+        </a:solidFill>
+        <a:round/>
+      </a:ln>
+    </cs:spPr>
+  </cs:dataPointWireframe>
+  <cs:dataTable>
+    <cs:lnRef idx="0"/>
+    <cs:fillRef idx="0"/>
+    <cs:effectRef idx="0"/>
+    <cs:fontRef idx="minor">
+      <a:schemeClr val="tx1">
+        <a:lumMod val="65000"/>
+        <a:lumOff val="35000"/>
+      </a:schemeClr>
+    </cs:fontRef>
+    <cs:spPr>
+      <a:noFill/>
+      <a:ln w="9525" cap="flat" cmpd="sng" algn="ctr">
+        <a:solidFill>
+          <a:schemeClr val="tx1">
+            <a:lumMod val="15000"/>
+            <a:lumOff val="85000"/>
+          </a:schemeClr>
+        </a:solidFill>
+        <a:round/>
+      </a:ln>
+    </cs:spPr>
+    <cs:defRPr sz="900" kern="1200"/>
+  </cs:dataTable>
+  <cs:downBar>
+    <cs:lnRef idx="0"/>
+    <cs:fillRef idx="0"/>
+    <cs:effectRef idx="0"/>
+    <cs:fontRef idx="minor">
+      <a:schemeClr val="dk1"/>
+    </cs:fontRef>
+    <cs:spPr>
+      <a:solidFill>
+        <a:schemeClr val="dk1">
+          <a:lumMod val="65000"/>
+          <a:lumOff val="35000"/>
+        </a:schemeClr>
+      </a:solidFill>
+      <a:ln w="9525">
+        <a:solidFill>
+          <a:schemeClr val="tx1">
+            <a:lumMod val="65000"/>
+            <a:lumOff val="35000"/>
+          </a:schemeClr>
+        </a:solidFill>
+      </a:ln>
+    </cs:spPr>
+  </cs:downBar>
+  <cs:dropLine>
+    <cs:lnRef idx="0"/>
+    <cs:fillRef idx="0"/>
+    <cs:effectRef idx="0"/>
+    <cs:fontRef idx="minor">
+      <a:schemeClr val="tx1"/>
+    </cs:fontRef>
+    <cs:spPr>
+      <a:ln w="9525" cap="flat" cmpd="sng" algn="ctr">
+        <a:solidFill>
+          <a:schemeClr val="tx1">
+            <a:lumMod val="35000"/>
+            <a:lumOff val="65000"/>
+          </a:schemeClr>
+        </a:solidFill>
+        <a:round/>
+      </a:ln>
+    </cs:spPr>
+  </cs:dropLine>
+  <cs:errorBar>
+    <cs:lnRef idx="0"/>
+    <cs:fillRef idx="0"/>
+    <cs:effectRef idx="0"/>
+    <cs:fontRef idx="minor">
+      <a:schemeClr val="tx1"/>
+    </cs:fontRef>
+    <cs:spPr>
+      <a:ln w="9525" cap="flat" cmpd="sng" algn="ctr">
+        <a:solidFill>
+          <a:schemeClr val="tx1">
+            <a:lumMod val="65000"/>
+            <a:lumOff val="35000"/>
+          </a:schemeClr>
+        </a:solidFill>
+        <a:round/>
+      </a:ln>
+    </cs:spPr>
+  </cs:errorBar>
+  <cs:floor>
+    <cs:lnRef idx="0"/>
+    <cs:fillRef idx="0"/>
+    <cs:effectRef idx="0"/>
+    <cs:fontRef idx="minor">
+      <a:schemeClr val="tx1"/>
+    </cs:fontRef>
+    <cs:spPr>
+      <a:noFill/>
+      <a:ln>
+        <a:noFill/>
+      </a:ln>
+    </cs:spPr>
+  </cs:floor>
+  <cs:gridlineMajor>
+    <cs:lnRef idx="0"/>
+    <cs:fillRef idx="0"/>
+    <cs:effectRef idx="0"/>
+    <cs:fontRef idx="minor">
+      <a:schemeClr val="tx1"/>
+    </cs:fontRef>
+    <cs:spPr>
+      <a:ln w="9525" cap="flat" cmpd="sng" algn="ctr">
+        <a:solidFill>
+          <a:schemeClr val="tx1">
+            <a:lumMod val="15000"/>
+            <a:lumOff val="85000"/>
+          </a:schemeClr>
+        </a:solidFill>
+        <a:round/>
+      </a:ln>
+    </cs:spPr>
+  </cs:gridlineMajor>
+  <cs:gridlineMinor>
+    <cs:lnRef idx="0"/>
+    <cs:fillRef idx="0"/>
+    <cs:effectRef idx="0"/>
+    <cs:fontRef idx="minor">
+      <a:schemeClr val="tx1"/>
+    </cs:fontRef>
+    <cs:spPr>
+      <a:ln w="9525" cap="flat" cmpd="sng" algn="ctr">
+        <a:solidFill>
+          <a:schemeClr val="tx1">
+            <a:lumMod val="5000"/>
+            <a:lumOff val="95000"/>
+          </a:schemeClr>
+        </a:solidFill>
+        <a:round/>
+      </a:ln>
+    </cs:spPr>
+  </cs:gridlineMinor>
+  <cs:hiLoLine>
+    <cs:lnRef idx="0"/>
+    <cs:fillRef idx="0"/>
+    <cs:effectRef idx="0"/>
+    <cs:fontRef idx="minor">
+      <a:schemeClr val="tx1"/>
+    </cs:fontRef>
+    <cs:spPr>
+      <a:ln w="9525" cap="flat" cmpd="sng" algn="ctr">
+        <a:solidFill>
+          <a:schemeClr val="tx1">
+            <a:lumMod val="75000"/>
+            <a:lumOff val="25000"/>
+          </a:schemeClr>
+        </a:solidFill>
+        <a:round/>
+      </a:ln>
+    </cs:spPr>
+  </cs:hiLoLine>
+  <cs:leaderLine>
+    <cs:lnRef idx="0"/>
+    <cs:fillRef idx="0"/>
+    <cs:effectRef idx="0"/>
+    <cs:fontRef idx="minor">
+      <a:schemeClr val="tx1"/>
+    </cs:fontRef>
+    <cs:spPr>
+      <a:ln w="9525" cap="flat" cmpd="sng" algn="ctr">
+        <a:solidFill>
+          <a:schemeClr val="tx1">
+            <a:lumMod val="35000"/>
+            <a:lumOff val="65000"/>
+          </a:schemeClr>
+        </a:solidFill>
+        <a:round/>
+      </a:ln>
+    </cs:spPr>
+  </cs:leaderLine>
+  <cs:legend>
+    <cs:lnRef idx="0"/>
+    <cs:fillRef idx="0"/>
+    <cs:effectRef idx="0"/>
+    <cs:fontRef idx="minor">
+      <a:schemeClr val="tx1">
+        <a:lumMod val="65000"/>
+        <a:lumOff val="35000"/>
+      </a:schemeClr>
+    </cs:fontRef>
+    <cs:defRPr sz="900" kern="1200"/>
+  </cs:legend>
+  <cs:plotArea mods="allowNoFillOverride allowNoLineOverride">
+    <cs:lnRef idx="0"/>
+    <cs:fillRef idx="0"/>
+    <cs:effectRef idx="0"/>
+    <cs:fontRef idx="minor">
+      <a:schemeClr val="tx1"/>
+    </cs:fontRef>
+  </cs:plotArea>
+  <cs:plotArea3D mods="allowNoFillOverride allowNoLineOverride">
+    <cs:lnRef idx="0"/>
+    <cs:fillRef idx="0"/>
+    <cs:effectRef idx="0"/>
+    <cs:fontRef idx="minor">
+      <a:schemeClr val="tx1"/>
+    </cs:fontRef>
+  </cs:plotArea3D>
+  <cs:seriesAxis>
+    <cs:lnRef idx="0"/>
+    <cs:fillRef idx="0"/>
+    <cs:effectRef idx="0"/>
+    <cs:fontRef idx="minor">
+      <a:schemeClr val="tx1">
+        <a:lumMod val="65000"/>
+        <a:lumOff val="35000"/>
+      </a:schemeClr>
+    </cs:fontRef>
+    <cs:defRPr sz="900" kern="1200"/>
+  </cs:seriesAxis>
+  <cs:seriesLine>
+    <cs:lnRef idx="0"/>
+    <cs:fillRef idx="0"/>
+    <cs:effectRef idx="0"/>
+    <cs:fontRef idx="minor">
+      <a:schemeClr val="tx1"/>
+    </cs:fontRef>
+    <cs:spPr>
+      <a:ln w="9525" cap="flat" cmpd="sng" algn="ctr">
+        <a:solidFill>
+          <a:schemeClr val="tx1">
+            <a:lumMod val="35000"/>
+            <a:lumOff val="65000"/>
+          </a:schemeClr>
+        </a:solidFill>
+        <a:round/>
+      </a:ln>
+    </cs:spPr>
+  </cs:seriesLine>
+  <cs:title>
+    <cs:lnRef idx="0"/>
+    <cs:fillRef idx="0"/>
+    <cs:effectRef idx="0"/>
+    <cs:fontRef idx="minor">
+      <a:schemeClr val="tx1">
+        <a:lumMod val="65000"/>
+        <a:lumOff val="35000"/>
+      </a:schemeClr>
+    </cs:fontRef>
+    <cs:defRPr sz="1400" b="0" kern="1200" spc="0" baseline="0"/>
+  </cs:title>
+  <cs:trendline>
+    <cs:lnRef idx="0">
+      <cs:styleClr val="auto"/>
+    </cs:lnRef>
+    <cs:fillRef idx="0"/>
+    <cs:effectRef idx="0"/>
+    <cs:fontRef idx="minor">
+      <a:schemeClr val="tx1"/>
+    </cs:fontRef>
+    <cs:spPr>
+      <a:ln w="19050" cap="rnd">
+        <a:solidFill>
+          <a:schemeClr val="phClr"/>
+        </a:solidFill>
+        <a:prstDash val="sysDot"/>
+      </a:ln>
+    </cs:spPr>
+  </cs:trendline>
+  <cs:trendlineLabel>
+    <cs:lnRef idx="0"/>
+    <cs:fillRef idx="0"/>
+    <cs:effectRef idx="0"/>
+    <cs:fontRef idx="minor">
+      <a:schemeClr val="tx1">
+        <a:lumMod val="65000"/>
+        <a:lumOff val="35000"/>
+      </a:schemeClr>
+    </cs:fontRef>
+    <cs:defRPr sz="900" kern="1200"/>
+  </cs:trendlineLabel>
+  <cs:upBar>
+    <cs:lnRef idx="0"/>
+    <cs:fillRef idx="0"/>
+    <cs:effectRef idx="0"/>
+    <cs:fontRef idx="minor">
+      <a:schemeClr val="dk1"/>
+    </cs:fontRef>
+    <cs:spPr>
+      <a:solidFill>
+        <a:schemeClr val="lt1"/>
+      </a:solidFill>
+      <a:ln w="9525">
+        <a:solidFill>
+          <a:schemeClr val="tx1">
+            <a:lumMod val="15000"/>
+            <a:lumOff val="85000"/>
+          </a:schemeClr>
+        </a:solidFill>
+      </a:ln>
+    </cs:spPr>
+  </cs:upBar>
+  <cs:valueAxis>
+    <cs:lnRef idx="0"/>
+    <cs:fillRef idx="0"/>
+    <cs:effectRef idx="0"/>
+    <cs:fontRef idx="minor">
+      <a:schemeClr val="tx1">
+        <a:lumMod val="65000"/>
+        <a:lumOff val="35000"/>
+      </a:schemeClr>
+    </cs:fontRef>
+    <cs:defRPr sz="900" kern="1200"/>
+  </cs:valueAxis>
+  <cs:wall>
+    <cs:lnRef idx="0"/>
+    <cs:fillRef idx="0"/>
+    <cs:effectRef idx="0"/>
+    <cs:fontRef idx="minor">
+      <a:schemeClr val="tx1"/>
+    </cs:fontRef>
+    <cs:spPr>
+      <a:noFill/>
+      <a:ln>
+        <a:noFill/>
+      </a:ln>
+    </cs:spPr>
+  </cs:wall>
+</cs:chartStyle>
 </file>
 
 <file path=ppt/slideLayouts/slideLayout1.xml><?xml version="1.0" encoding="utf-8"?>
@@ -3907,28 +5275,45 @@
           </a:bodyPr>
           <a:lstStyle/>
           <a:p>
-            <a:r>
-              <a:rPr lang="en-US" sz="4400" b="1">
+            <a:pPr algn="ctr"/>
+            <a:r>
+              <a:rPr lang="en-US" sz="4400" b="1" dirty="0">
                 <a:solidFill>
                   <a:srgbClr val="FFFFFF"/>
                 </a:solidFill>
               </a:rPr>
-              <a:t>Victoria Crime </a:t>
+              <a:t>State of Victoria’s Crime </a:t>
             </a:r>
             <a:br>
-              <a:rPr lang="en-US" sz="4400" b="1">
+              <a:rPr lang="en-US" sz="4400" b="1" dirty="0">
                 <a:solidFill>
                   <a:srgbClr val="FFFFFF"/>
                 </a:solidFill>
               </a:rPr>
             </a:br>
             <a:r>
-              <a:rPr lang="en-US" sz="4400" b="1">
+              <a:rPr lang="en-US" sz="4400" b="1" dirty="0">
                 <a:solidFill>
                   <a:srgbClr val="FFFFFF"/>
                 </a:solidFill>
               </a:rPr>
-              <a:t>Data Visualization </a:t>
+              <a:t>Data </a:t>
+            </a:r>
+            <a:r>
+              <a:rPr lang="en-US" sz="4400" b="1" dirty="0" err="1">
+                <a:solidFill>
+                  <a:srgbClr val="FFFFFF"/>
+                </a:solidFill>
+              </a:rPr>
+              <a:t>Visualisation</a:t>
+            </a:r>
+            <a:r>
+              <a:rPr lang="en-US" sz="4400" b="1" dirty="0">
+                <a:solidFill>
+                  <a:srgbClr val="FFFFFF"/>
+                </a:solidFill>
+              </a:rPr>
+              <a:t> </a:t>
             </a:r>
           </a:p>
         </p:txBody>
@@ -4256,7 +5641,7 @@
           <a:p>
             <a:r>
               <a:rPr lang="en-US" dirty="0"/>
-              <a:t>Objectives of Study</a:t>
+              <a:t>Objectives of the Study</a:t>
             </a:r>
           </a:p>
         </p:txBody>
@@ -4290,7 +5675,7 @@
           <a:p>
             <a:r>
               <a:rPr lang="en-US" dirty="0"/>
-              <a:t>- We would like to compare last 4 year crime offences in Victoria, 2019-2022, pre-COVID and post-COVID.</a:t>
+              <a:t>- We would like to compare last 4 years of crime offences in Victoria, 2019-2022, pre-COVID and post-COVID.</a:t>
             </a:r>
           </a:p>
           <a:p>
@@ -4310,6 +5695,26 @@
               <a:rPr lang="en-US" dirty="0"/>
               <a:t>- What are the 10 most crime committed LGAs/suburbs.</a:t>
             </a:r>
+          </a:p>
+          <a:p>
+            <a:r>
+              <a:rPr lang="en-US" dirty="0"/>
+              <a:t>- Filtering offence data by Year and LGA and </a:t>
+            </a:r>
+            <a:r>
+              <a:rPr lang="en-US" dirty="0" err="1"/>
+              <a:t>visualising</a:t>
+            </a:r>
+            <a:r>
+              <a:rPr lang="en-US" dirty="0"/>
+              <a:t> this data. </a:t>
+            </a:r>
+          </a:p>
+          <a:p>
+            <a:endParaRPr lang="en-US" dirty="0"/>
+          </a:p>
+          <a:p>
+            <a:endParaRPr lang="en-US" dirty="0"/>
           </a:p>
           <a:p>
             <a:endParaRPr lang="en-US" dirty="0"/>
@@ -4403,7 +5808,7 @@
           <a:p>
             <a:r>
               <a:rPr lang="en-US" dirty="0"/>
-              <a:t>In considering Heroku’s free data capacity allowance, we decided:</a:t>
+              <a:t>Considering Heroku’s free data capacity allowance, we decided to add:</a:t>
             </a:r>
           </a:p>
           <a:p>
@@ -4417,15 +5822,7 @@
             </a:r>
             <a:r>
               <a:rPr lang="en-US" dirty="0"/>
-              <a:t>, data scoped 2019-2022, </a:t>
-            </a:r>
-            <a:r>
-              <a:rPr lang="en-US" dirty="0" err="1"/>
-              <a:t>droped</a:t>
-            </a:r>
-            <a:r>
-              <a:rPr lang="en-US" dirty="0"/>
-              <a:t> ‘Total’ rows.</a:t>
+              <a:t>, data scoped 2019-2022, dropped ‘Total’ rows.</a:t>
             </a:r>
           </a:p>
           <a:p>
@@ -4453,7 +5850,7 @@
             </a:r>
             <a:r>
               <a:rPr lang="en-US" dirty="0"/>
-              <a:t>, data scoped 2019-2022.</a:t>
+              <a:t> (offence_summary_df.csv???), data scoped 2019-2022.</a:t>
             </a:r>
           </a:p>
           <a:p>
@@ -5462,7 +6859,7 @@
                   <a:srgbClr val="FFFFFF"/>
                 </a:solidFill>
               </a:rPr>
-              <a:t>In 2022, Melbourne had the highest offences; next to it were </a:t>
+              <a:t>In 2022, Melbourne had the highest number of offences; next to it were </a:t>
             </a:r>
             <a:r>
               <a:rPr lang="en-US" sz="2000" dirty="0" err="1">
@@ -5478,7 +6875,7 @@
                   <a:srgbClr val="FFFFFF"/>
                 </a:solidFill>
               </a:rPr>
-              <a:t> and Wyndham, though they had almost half of the figure of </a:t>
+              <a:t> and Wyndham, though they had almost half of the number of crimes in </a:t>
             </a:r>
             <a:r>
               <a:rPr lang="en-US" sz="2000" dirty="0" err="1">
@@ -5636,7 +7033,7 @@
                   <a:srgbClr val="FFFFFF"/>
                 </a:solidFill>
               </a:rPr>
-              <a:t>upon clicking on the label ‘Local Government Offence’ will toggle hide or show the chart.  </a:t>
+              <a:t>Upon clicking on the label ‘Local Government Offence’ will toggle hide or show the chart.  </a:t>
             </a:r>
             <a:br>
               <a:rPr lang="en-US" sz="2000" dirty="0">
@@ -5756,23 +7153,7 @@
                   <a:schemeClr val="accent2"/>
                 </a:solidFill>
               </a:rPr>
-              <a:t>Local </a:t>
-            </a:r>
-            <a:r>
-              <a:rPr lang="en-US" sz="3200" dirty="0" err="1">
-                <a:solidFill>
-                  <a:schemeClr val="accent2"/>
-                </a:solidFill>
-              </a:rPr>
-              <a:t>Gornment</a:t>
-            </a:r>
-            <a:r>
-              <a:rPr lang="en-US" sz="3200" dirty="0">
-                <a:solidFill>
-                  <a:schemeClr val="accent2"/>
-                </a:solidFill>
-              </a:rPr>
-              <a:t> Area Offences base on Police Region</a:t>
+              <a:t>Local Government Area Offences base on Police Region</a:t>
             </a:r>
             <a:endParaRPr lang="en-US" sz="3200" dirty="0"/>
           </a:p>
@@ -5831,6 +7212,1116 @@
     <p:extLst>
       <p:ext uri="{BB962C8B-B14F-4D97-AF65-F5344CB8AC3E}">
         <p14:creationId xmlns:p14="http://schemas.microsoft.com/office/powerpoint/2010/main" val="1114990967"/>
+      </p:ext>
+    </p:extLst>
+  </p:cSld>
+  <p:clrMapOvr>
+    <a:masterClrMapping/>
+  </p:clrMapOvr>
+</p:sld>
+</file>
+
+<file path=ppt/slides/slide6.xml><?xml version="1.0" encoding="utf-8"?>
+<p:sld xmlns:a="http://schemas.openxmlformats.org/drawingml/2006/main" xmlns:r="http://schemas.openxmlformats.org/officeDocument/2006/relationships" xmlns:p="http://schemas.openxmlformats.org/presentationml/2006/main">
+  <p:cSld>
+    <p:bg>
+      <p:bgPr>
+        <a:solidFill>
+          <a:schemeClr val="bg1"/>
+        </a:solidFill>
+        <a:effectLst/>
+      </p:bgPr>
+    </p:bg>
+    <p:spTree>
+      <p:nvGrpSpPr>
+        <p:cNvPr id="1" name=""/>
+        <p:cNvGrpSpPr/>
+        <p:nvPr/>
+      </p:nvGrpSpPr>
+      <p:grpSpPr>
+        <a:xfrm>
+          <a:off x="0" y="0"/>
+          <a:ext cx="0" cy="0"/>
+          <a:chOff x="0" y="0"/>
+          <a:chExt cx="0" cy="0"/>
+        </a:xfrm>
+      </p:grpSpPr>
+      <p:sp useBgFill="1">
+        <p:nvSpPr>
+          <p:cNvPr id="34" name="Rectangle 27">
+            <a:extLst>
+              <a:ext uri="{FF2B5EF4-FFF2-40B4-BE49-F238E27FC236}">
+                <a16:creationId xmlns:a16="http://schemas.microsoft.com/office/drawing/2014/main" id="{44CC594A-A820-450F-B363-C19201FCFEC6}"/>
+              </a:ext>
+              <a:ext uri="{C183D7F6-B498-43B3-948B-1728B52AA6E4}">
+                <adec:decorative xmlns:adec="http://schemas.microsoft.com/office/drawing/2017/decorative" val="1"/>
+              </a:ext>
+            </a:extLst>
+          </p:cNvPr>
+          <p:cNvSpPr>
+            <a:spLocks noGrp="1" noRot="1" noChangeAspect="1" noMove="1" noResize="1" noEditPoints="1" noAdjustHandles="1" noChangeArrowheads="1" noChangeShapeType="1" noTextEdit="1"/>
+          </p:cNvSpPr>
+          <p:nvPr>
+            <p:extLst>
+              <p:ext uri="{386F3935-93C4-4BCD-93E2-E3B085C9AB24}">
+                <p16:designElem xmlns:p16="http://schemas.microsoft.com/office/powerpoint/2015/main" val="1"/>
+              </p:ext>
+            </p:extLst>
+          </p:nvPr>
+        </p:nvSpPr>
+        <p:spPr>
+          <a:xfrm>
+            <a:off x="0" y="0"/>
+            <a:ext cx="12186315" cy="6858000"/>
+          </a:xfrm>
+          <a:prstGeom prst="rect">
+            <a:avLst/>
+          </a:prstGeom>
+          <a:ln>
+            <a:noFill/>
+          </a:ln>
+        </p:spPr>
+        <p:style>
+          <a:lnRef idx="2">
+            <a:schemeClr val="accent6">
+              <a:shade val="50000"/>
+            </a:schemeClr>
+          </a:lnRef>
+          <a:fillRef idx="1001">
+            <a:schemeClr val="lt1"/>
+          </a:fillRef>
+          <a:effectRef idx="0">
+            <a:schemeClr val="accent6"/>
+          </a:effectRef>
+          <a:fontRef idx="minor">
+            <a:schemeClr val="lt1"/>
+          </a:fontRef>
+        </p:style>
+        <p:txBody>
+          <a:bodyPr rtlCol="0" anchor="ctr"/>
+          <a:lstStyle/>
+          <a:p>
+            <a:pPr algn="ctr"/>
+            <a:endParaRPr lang="en-US"/>
+          </a:p>
+        </p:txBody>
+      </p:sp>
+      <p:sp>
+        <p:nvSpPr>
+          <p:cNvPr id="35" name="Rectangle 29">
+            <a:extLst>
+              <a:ext uri="{FF2B5EF4-FFF2-40B4-BE49-F238E27FC236}">
+                <a16:creationId xmlns:a16="http://schemas.microsoft.com/office/drawing/2014/main" id="{59FAB3DA-E9ED-4574-ABCC-378BC0FF1BBC}"/>
+              </a:ext>
+              <a:ext uri="{C183D7F6-B498-43B3-948B-1728B52AA6E4}">
+                <adec:decorative xmlns:adec="http://schemas.microsoft.com/office/drawing/2017/decorative" val="1"/>
+              </a:ext>
+            </a:extLst>
+          </p:cNvPr>
+          <p:cNvSpPr>
+            <a:spLocks noGrp="1" noRot="1" noChangeAspect="1" noMove="1" noResize="1" noEditPoints="1" noAdjustHandles="1" noChangeArrowheads="1" noChangeShapeType="1" noTextEdit="1"/>
+          </p:cNvSpPr>
+          <p:nvPr>
+            <p:extLst>
+              <p:ext uri="{386F3935-93C4-4BCD-93E2-E3B085C9AB24}">
+                <p16:designElem xmlns:p16="http://schemas.microsoft.com/office/powerpoint/2015/main" val="1"/>
+              </p:ext>
+            </p:extLst>
+          </p:nvPr>
+        </p:nvSpPr>
+        <p:spPr>
+          <a:xfrm>
+            <a:off x="16" y="0"/>
+            <a:ext cx="4050791" cy="6858000"/>
+          </a:xfrm>
+          <a:prstGeom prst="rect">
+            <a:avLst/>
+          </a:prstGeom>
+          <a:solidFill>
+            <a:schemeClr val="accent2"/>
+          </a:solidFill>
+          <a:ln>
+            <a:noFill/>
+          </a:ln>
+        </p:spPr>
+        <p:style>
+          <a:lnRef idx="2">
+            <a:schemeClr val="accent1">
+              <a:shade val="50000"/>
+            </a:schemeClr>
+          </a:lnRef>
+          <a:fillRef idx="1">
+            <a:schemeClr val="accent1"/>
+          </a:fillRef>
+          <a:effectRef idx="0">
+            <a:schemeClr val="accent1"/>
+          </a:effectRef>
+          <a:fontRef idx="minor">
+            <a:schemeClr val="lt1"/>
+          </a:fontRef>
+        </p:style>
+      </p:sp>
+      <p:sp>
+        <p:nvSpPr>
+          <p:cNvPr id="4" name="Title 3">
+            <a:extLst>
+              <a:ext uri="{FF2B5EF4-FFF2-40B4-BE49-F238E27FC236}">
+                <a16:creationId xmlns:a16="http://schemas.microsoft.com/office/drawing/2014/main" id="{33626372-42A7-F501-CD18-F3C48E2FD070}"/>
+              </a:ext>
+            </a:extLst>
+          </p:cNvPr>
+          <p:cNvSpPr>
+            <a:spLocks noGrp="1"/>
+          </p:cNvSpPr>
+          <p:nvPr>
+            <p:ph type="title"/>
+          </p:nvPr>
+        </p:nvSpPr>
+        <p:spPr>
+          <a:xfrm>
+            <a:off x="492370" y="516835"/>
+            <a:ext cx="3084844" cy="2103875"/>
+          </a:xfrm>
+        </p:spPr>
+        <p:txBody>
+          <a:bodyPr>
+            <a:normAutofit/>
+          </a:bodyPr>
+          <a:lstStyle/>
+          <a:p>
+            <a:r>
+              <a:rPr lang="en-US" sz="3600" dirty="0">
+                <a:solidFill>
+                  <a:srgbClr val="FFFFFF"/>
+                </a:solidFill>
+              </a:rPr>
+              <a:t>Offence Summary – Display and Filter</a:t>
+            </a:r>
+            <a:endParaRPr lang="en-AU" sz="3600" dirty="0">
+              <a:solidFill>
+                <a:srgbClr val="FFFFFF"/>
+              </a:solidFill>
+            </a:endParaRPr>
+          </a:p>
+        </p:txBody>
+      </p:sp>
+      <p:sp>
+        <p:nvSpPr>
+          <p:cNvPr id="5" name="Content Placeholder 4">
+            <a:extLst>
+              <a:ext uri="{FF2B5EF4-FFF2-40B4-BE49-F238E27FC236}">
+                <a16:creationId xmlns:a16="http://schemas.microsoft.com/office/drawing/2014/main" id="{2AB91FB6-8116-C465-F7A7-A77B58B7017C}"/>
+              </a:ext>
+            </a:extLst>
+          </p:cNvPr>
+          <p:cNvSpPr>
+            <a:spLocks noGrp="1"/>
+          </p:cNvSpPr>
+          <p:nvPr>
+            <p:ph idx="1"/>
+          </p:nvPr>
+        </p:nvSpPr>
+        <p:spPr>
+          <a:xfrm>
+            <a:off x="492371" y="2653800"/>
+            <a:ext cx="3084844" cy="4124505"/>
+          </a:xfrm>
+        </p:spPr>
+        <p:txBody>
+          <a:bodyPr>
+            <a:normAutofit/>
+          </a:bodyPr>
+          <a:lstStyle/>
+          <a:p>
+            <a:r>
+              <a:rPr lang="en-US" sz="1300" dirty="0">
+                <a:solidFill>
+                  <a:srgbClr val="FFFFFF"/>
+                </a:solidFill>
+                <a:latin typeface="+mj-lt"/>
+              </a:rPr>
+              <a:t>Using Offense Summary CSV (offence_summary_df.csv)</a:t>
+            </a:r>
+            <a:endParaRPr lang="en-US" sz="1300" dirty="0">
+              <a:solidFill>
+                <a:srgbClr val="FFFFFF"/>
+              </a:solidFill>
+              <a:highlight>
+                <a:srgbClr val="FFFF00"/>
+              </a:highlight>
+              <a:latin typeface="+mj-lt"/>
+            </a:endParaRPr>
+          </a:p>
+          <a:p>
+            <a:pPr lvl="1"/>
+            <a:r>
+              <a:rPr lang="en-US" sz="1300" dirty="0">
+                <a:solidFill>
+                  <a:srgbClr val="FFFFFF"/>
+                </a:solidFill>
+                <a:latin typeface="+mj-lt"/>
+              </a:rPr>
+              <a:t>Year</a:t>
+            </a:r>
+          </a:p>
+          <a:p>
+            <a:pPr lvl="1"/>
+            <a:r>
+              <a:rPr lang="en-US" sz="1300" dirty="0">
+                <a:solidFill>
+                  <a:srgbClr val="FFFFFF"/>
+                </a:solidFill>
+                <a:latin typeface="+mj-lt"/>
+              </a:rPr>
+              <a:t>Local Government Area</a:t>
+            </a:r>
+          </a:p>
+          <a:p>
+            <a:pPr lvl="1"/>
+            <a:r>
+              <a:rPr lang="en-US" sz="1300" dirty="0">
+                <a:solidFill>
+                  <a:srgbClr val="FFFFFF"/>
+                </a:solidFill>
+                <a:latin typeface="+mj-lt"/>
+              </a:rPr>
+              <a:t>Offence types (A-F)</a:t>
+            </a:r>
+          </a:p>
+          <a:p>
+            <a:r>
+              <a:rPr lang="en-US" sz="1300" b="1" dirty="0">
+                <a:solidFill>
+                  <a:srgbClr val="FFFFFF"/>
+                </a:solidFill>
+                <a:latin typeface="+mj-lt"/>
+              </a:rPr>
+              <a:t>Technical Background</a:t>
+            </a:r>
+          </a:p>
+          <a:p>
+            <a:r>
+              <a:rPr lang="en-US" sz="1300" dirty="0">
+                <a:solidFill>
+                  <a:srgbClr val="FFFFFF"/>
+                </a:solidFill>
+                <a:latin typeface="+mj-lt"/>
+              </a:rPr>
+              <a:t>Displaying the summary data loaded from CSV, using </a:t>
+            </a:r>
+            <a:r>
+              <a:rPr lang="en-US" sz="1300" dirty="0" err="1">
+                <a:solidFill>
+                  <a:srgbClr val="FFFFFF"/>
+                </a:solidFill>
+                <a:latin typeface="+mj-lt"/>
+              </a:rPr>
+              <a:t>Javascript</a:t>
+            </a:r>
+            <a:r>
+              <a:rPr lang="en-US" sz="1300" dirty="0">
+                <a:solidFill>
+                  <a:srgbClr val="FFFFFF"/>
+                </a:solidFill>
+                <a:latin typeface="+mj-lt"/>
+              </a:rPr>
+              <a:t>, HTML, CSS and d3 (policedata.html, policadata.js, policedata.css)</a:t>
+            </a:r>
+          </a:p>
+          <a:p>
+            <a:r>
+              <a:rPr lang="en-US" sz="1300" dirty="0">
+                <a:solidFill>
+                  <a:srgbClr val="FFFFFF"/>
+                </a:solidFill>
+                <a:latin typeface="+mj-lt"/>
+              </a:rPr>
+              <a:t>The LGA filter is populated from the data source as well (dropdown)</a:t>
+            </a:r>
+          </a:p>
+          <a:p>
+            <a:r>
+              <a:rPr lang="en-US" sz="1300" dirty="0">
+                <a:solidFill>
+                  <a:srgbClr val="FFFFFF"/>
+                </a:solidFill>
+                <a:latin typeface="+mj-lt"/>
+              </a:rPr>
+              <a:t>Filtering by different fields (Local Government Area and Year)</a:t>
+            </a:r>
+          </a:p>
+        </p:txBody>
+      </p:sp>
+      <p:sp>
+        <p:nvSpPr>
+          <p:cNvPr id="36" name="Rectangle 31">
+            <a:extLst>
+              <a:ext uri="{FF2B5EF4-FFF2-40B4-BE49-F238E27FC236}">
+                <a16:creationId xmlns:a16="http://schemas.microsoft.com/office/drawing/2014/main" id="{53B8D6B0-55D6-48DC-86D8-FD95D5F118AB}"/>
+              </a:ext>
+              <a:ext uri="{C183D7F6-B498-43B3-948B-1728B52AA6E4}">
+                <adec:decorative xmlns:adec="http://schemas.microsoft.com/office/drawing/2017/decorative" val="1"/>
+              </a:ext>
+            </a:extLst>
+          </p:cNvPr>
+          <p:cNvSpPr>
+            <a:spLocks noGrp="1" noRot="1" noChangeAspect="1" noMove="1" noResize="1" noEditPoints="1" noAdjustHandles="1" noChangeArrowheads="1" noChangeShapeType="1" noTextEdit="1"/>
+          </p:cNvSpPr>
+          <p:nvPr>
+            <p:extLst>
+              <p:ext uri="{386F3935-93C4-4BCD-93E2-E3B085C9AB24}">
+                <p16:designElem xmlns:p16="http://schemas.microsoft.com/office/powerpoint/2015/main" val="1"/>
+              </p:ext>
+            </p:extLst>
+          </p:nvPr>
+        </p:nvSpPr>
+        <p:spPr>
+          <a:xfrm>
+            <a:off x="4040071" y="0"/>
+            <a:ext cx="64008" cy="6858000"/>
+          </a:xfrm>
+          <a:prstGeom prst="rect">
+            <a:avLst/>
+          </a:prstGeom>
+          <a:solidFill>
+            <a:schemeClr val="accent1"/>
+          </a:solidFill>
+          <a:ln>
+            <a:noFill/>
+          </a:ln>
+        </p:spPr>
+        <p:style>
+          <a:lnRef idx="2">
+            <a:schemeClr val="accent1">
+              <a:shade val="50000"/>
+            </a:schemeClr>
+          </a:lnRef>
+          <a:fillRef idx="1">
+            <a:schemeClr val="accent1"/>
+          </a:fillRef>
+          <a:effectRef idx="0">
+            <a:schemeClr val="accent1"/>
+          </a:effectRef>
+          <a:fontRef idx="minor">
+            <a:schemeClr val="lt1"/>
+          </a:fontRef>
+        </p:style>
+      </p:sp>
+      <p:pic>
+        <p:nvPicPr>
+          <p:cNvPr id="6" name="Picture 5">
+            <a:extLst>
+              <a:ext uri="{FF2B5EF4-FFF2-40B4-BE49-F238E27FC236}">
+                <a16:creationId xmlns:a16="http://schemas.microsoft.com/office/drawing/2014/main" id="{FD651A7A-E8AC-A627-55D8-8A9687139159}"/>
+              </a:ext>
+            </a:extLst>
+          </p:cNvPr>
+          <p:cNvPicPr>
+            <a:picLocks noChangeAspect="1"/>
+          </p:cNvPicPr>
+          <p:nvPr/>
+        </p:nvPicPr>
+        <p:blipFill>
+          <a:blip r:embed="rId2"/>
+          <a:stretch>
+            <a:fillRect/>
+          </a:stretch>
+        </p:blipFill>
+        <p:spPr>
+          <a:xfrm>
+            <a:off x="4103429" y="1568772"/>
+            <a:ext cx="8075532" cy="3957010"/>
+          </a:xfrm>
+          <a:prstGeom prst="rect">
+            <a:avLst/>
+          </a:prstGeom>
+        </p:spPr>
+      </p:pic>
+    </p:spTree>
+    <p:extLst>
+      <p:ext uri="{BB962C8B-B14F-4D97-AF65-F5344CB8AC3E}">
+        <p14:creationId xmlns:p14="http://schemas.microsoft.com/office/powerpoint/2010/main" val="1446067743"/>
+      </p:ext>
+    </p:extLst>
+  </p:cSld>
+  <p:clrMapOvr>
+    <a:masterClrMapping/>
+  </p:clrMapOvr>
+</p:sld>
+</file>
+
+<file path=ppt/slides/slide7.xml><?xml version="1.0" encoding="utf-8"?>
+<p:sld xmlns:a="http://schemas.openxmlformats.org/drawingml/2006/main" xmlns:r="http://schemas.openxmlformats.org/officeDocument/2006/relationships" xmlns:p="http://schemas.openxmlformats.org/presentationml/2006/main">
+  <p:cSld>
+    <p:bg>
+      <p:bgPr>
+        <a:solidFill>
+          <a:schemeClr val="bg1"/>
+        </a:solidFill>
+        <a:effectLst/>
+      </p:bgPr>
+    </p:bg>
+    <p:spTree>
+      <p:nvGrpSpPr>
+        <p:cNvPr id="1" name=""/>
+        <p:cNvGrpSpPr/>
+        <p:nvPr/>
+      </p:nvGrpSpPr>
+      <p:grpSpPr>
+        <a:xfrm>
+          <a:off x="0" y="0"/>
+          <a:ext cx="0" cy="0"/>
+          <a:chOff x="0" y="0"/>
+          <a:chExt cx="0" cy="0"/>
+        </a:xfrm>
+      </p:grpSpPr>
+      <p:sp useBgFill="1">
+        <p:nvSpPr>
+          <p:cNvPr id="24" name="Rectangle 17">
+            <a:extLst>
+              <a:ext uri="{FF2B5EF4-FFF2-40B4-BE49-F238E27FC236}">
+                <a16:creationId xmlns:a16="http://schemas.microsoft.com/office/drawing/2014/main" id="{44CC594A-A820-450F-B363-C19201FCFEC6}"/>
+              </a:ext>
+              <a:ext uri="{C183D7F6-B498-43B3-948B-1728B52AA6E4}">
+                <adec:decorative xmlns:adec="http://schemas.microsoft.com/office/drawing/2017/decorative" val="1"/>
+              </a:ext>
+            </a:extLst>
+          </p:cNvPr>
+          <p:cNvSpPr>
+            <a:spLocks noGrp="1" noRot="1" noChangeAspect="1" noMove="1" noResize="1" noEditPoints="1" noAdjustHandles="1" noChangeArrowheads="1" noChangeShapeType="1" noTextEdit="1"/>
+          </p:cNvSpPr>
+          <p:nvPr>
+            <p:extLst>
+              <p:ext uri="{386F3935-93C4-4BCD-93E2-E3B085C9AB24}">
+                <p16:designElem xmlns:p16="http://schemas.microsoft.com/office/powerpoint/2015/main" val="1"/>
+              </p:ext>
+            </p:extLst>
+          </p:nvPr>
+        </p:nvSpPr>
+        <p:spPr>
+          <a:xfrm>
+            <a:off x="0" y="0"/>
+            <a:ext cx="12186315" cy="6858000"/>
+          </a:xfrm>
+          <a:prstGeom prst="rect">
+            <a:avLst/>
+          </a:prstGeom>
+          <a:ln>
+            <a:noFill/>
+          </a:ln>
+        </p:spPr>
+        <p:style>
+          <a:lnRef idx="2">
+            <a:schemeClr val="accent6">
+              <a:shade val="50000"/>
+            </a:schemeClr>
+          </a:lnRef>
+          <a:fillRef idx="1001">
+            <a:schemeClr val="lt1"/>
+          </a:fillRef>
+          <a:effectRef idx="0">
+            <a:schemeClr val="accent6"/>
+          </a:effectRef>
+          <a:fontRef idx="minor">
+            <a:schemeClr val="lt1"/>
+          </a:fontRef>
+        </p:style>
+        <p:txBody>
+          <a:bodyPr rtlCol="0" anchor="ctr"/>
+          <a:lstStyle/>
+          <a:p>
+            <a:pPr algn="ctr"/>
+            <a:endParaRPr lang="en-US"/>
+          </a:p>
+        </p:txBody>
+      </p:sp>
+      <p:sp>
+        <p:nvSpPr>
+          <p:cNvPr id="25" name="Rectangle 19">
+            <a:extLst>
+              <a:ext uri="{FF2B5EF4-FFF2-40B4-BE49-F238E27FC236}">
+                <a16:creationId xmlns:a16="http://schemas.microsoft.com/office/drawing/2014/main" id="{59FAB3DA-E9ED-4574-ABCC-378BC0FF1BBC}"/>
+              </a:ext>
+              <a:ext uri="{C183D7F6-B498-43B3-948B-1728B52AA6E4}">
+                <adec:decorative xmlns:adec="http://schemas.microsoft.com/office/drawing/2017/decorative" val="1"/>
+              </a:ext>
+            </a:extLst>
+          </p:cNvPr>
+          <p:cNvSpPr>
+            <a:spLocks noGrp="1" noRot="1" noChangeAspect="1" noMove="1" noResize="1" noEditPoints="1" noAdjustHandles="1" noChangeArrowheads="1" noChangeShapeType="1" noTextEdit="1"/>
+          </p:cNvSpPr>
+          <p:nvPr>
+            <p:extLst>
+              <p:ext uri="{386F3935-93C4-4BCD-93E2-E3B085C9AB24}">
+                <p16:designElem xmlns:p16="http://schemas.microsoft.com/office/powerpoint/2015/main" val="1"/>
+              </p:ext>
+            </p:extLst>
+          </p:nvPr>
+        </p:nvSpPr>
+        <p:spPr>
+          <a:xfrm>
+            <a:off x="16" y="0"/>
+            <a:ext cx="4050791" cy="6858000"/>
+          </a:xfrm>
+          <a:prstGeom prst="rect">
+            <a:avLst/>
+          </a:prstGeom>
+          <a:solidFill>
+            <a:schemeClr val="accent2"/>
+          </a:solidFill>
+          <a:ln>
+            <a:noFill/>
+          </a:ln>
+        </p:spPr>
+        <p:style>
+          <a:lnRef idx="2">
+            <a:schemeClr val="accent1">
+              <a:shade val="50000"/>
+            </a:schemeClr>
+          </a:lnRef>
+          <a:fillRef idx="1">
+            <a:schemeClr val="accent1"/>
+          </a:fillRef>
+          <a:effectRef idx="0">
+            <a:schemeClr val="accent1"/>
+          </a:effectRef>
+          <a:fontRef idx="minor">
+            <a:schemeClr val="lt1"/>
+          </a:fontRef>
+        </p:style>
+      </p:sp>
+      <p:sp>
+        <p:nvSpPr>
+          <p:cNvPr id="2" name="Title 1">
+            <a:extLst>
+              <a:ext uri="{FF2B5EF4-FFF2-40B4-BE49-F238E27FC236}">
+                <a16:creationId xmlns:a16="http://schemas.microsoft.com/office/drawing/2014/main" id="{A4890AAB-AD6E-4D0C-C387-EDC80BC6710E}"/>
+              </a:ext>
+            </a:extLst>
+          </p:cNvPr>
+          <p:cNvSpPr>
+            <a:spLocks noGrp="1"/>
+          </p:cNvSpPr>
+          <p:nvPr>
+            <p:ph type="title"/>
+          </p:nvPr>
+        </p:nvSpPr>
+        <p:spPr>
+          <a:xfrm>
+            <a:off x="492370" y="516835"/>
+            <a:ext cx="3084844" cy="2103875"/>
+          </a:xfrm>
+        </p:spPr>
+        <p:txBody>
+          <a:bodyPr>
+            <a:normAutofit/>
+          </a:bodyPr>
+          <a:lstStyle/>
+          <a:p>
+            <a:r>
+              <a:rPr lang="en-US" sz="3100">
+                <a:solidFill>
+                  <a:srgbClr val="FFFFFF"/>
+                </a:solidFill>
+              </a:rPr>
+              <a:t>Visualisation - Different offence types for the selected LGA and year</a:t>
+            </a:r>
+            <a:endParaRPr lang="en-AU" sz="3100">
+              <a:solidFill>
+                <a:srgbClr val="FFFFFF"/>
+              </a:solidFill>
+            </a:endParaRPr>
+          </a:p>
+        </p:txBody>
+      </p:sp>
+      <p:sp>
+        <p:nvSpPr>
+          <p:cNvPr id="3" name="Content Placeholder 2">
+            <a:extLst>
+              <a:ext uri="{FF2B5EF4-FFF2-40B4-BE49-F238E27FC236}">
+                <a16:creationId xmlns:a16="http://schemas.microsoft.com/office/drawing/2014/main" id="{A2747452-7799-79D9-1C74-222841D88F7A}"/>
+              </a:ext>
+            </a:extLst>
+          </p:cNvPr>
+          <p:cNvSpPr>
+            <a:spLocks noGrp="1"/>
+          </p:cNvSpPr>
+          <p:nvPr>
+            <p:ph idx="1"/>
+          </p:nvPr>
+        </p:nvSpPr>
+        <p:spPr>
+          <a:xfrm>
+            <a:off x="492371" y="2653800"/>
+            <a:ext cx="3084844" cy="3335519"/>
+          </a:xfrm>
+        </p:spPr>
+        <p:txBody>
+          <a:bodyPr>
+            <a:normAutofit/>
+          </a:bodyPr>
+          <a:lstStyle/>
+          <a:p>
+            <a:r>
+              <a:rPr lang="en-US" sz="1500" dirty="0">
+                <a:solidFill>
+                  <a:srgbClr val="FFFFFF"/>
+                </a:solidFill>
+                <a:latin typeface="+mj-lt"/>
+              </a:rPr>
+              <a:t>Using the filters on the same page and </a:t>
+            </a:r>
+            <a:r>
+              <a:rPr lang="en-US" sz="1500" dirty="0" err="1">
+                <a:solidFill>
+                  <a:srgbClr val="FFFFFF"/>
+                </a:solidFill>
+                <a:latin typeface="+mj-lt"/>
+              </a:rPr>
+              <a:t>Plotly</a:t>
+            </a:r>
+            <a:r>
+              <a:rPr lang="en-US" sz="1500" dirty="0">
+                <a:solidFill>
+                  <a:srgbClr val="FFFFFF"/>
+                </a:solidFill>
+                <a:latin typeface="+mj-lt"/>
+              </a:rPr>
+              <a:t>, we display a bar chart representing the different offence types for a specific Local Government area for a specific year. </a:t>
+            </a:r>
+          </a:p>
+          <a:p>
+            <a:r>
+              <a:rPr lang="en-US" sz="1500" b="1" dirty="0">
+                <a:solidFill>
+                  <a:srgbClr val="FFFFFF"/>
+                </a:solidFill>
+                <a:latin typeface="+mj-lt"/>
+              </a:rPr>
+              <a:t>Technical Background</a:t>
+            </a:r>
+          </a:p>
+          <a:p>
+            <a:r>
+              <a:rPr lang="en-US" sz="1500" dirty="0" err="1">
+                <a:solidFill>
+                  <a:srgbClr val="FFFFFF"/>
+                </a:solidFill>
+                <a:latin typeface="+mj-lt"/>
+              </a:rPr>
+              <a:t>Javascript</a:t>
+            </a:r>
+            <a:r>
+              <a:rPr lang="en-US" sz="1500" dirty="0">
+                <a:solidFill>
+                  <a:srgbClr val="FFFFFF"/>
+                </a:solidFill>
+                <a:latin typeface="+mj-lt"/>
+              </a:rPr>
+              <a:t>, </a:t>
+            </a:r>
+            <a:r>
+              <a:rPr lang="en-US" sz="1500" dirty="0" err="1">
+                <a:solidFill>
+                  <a:srgbClr val="FFFFFF"/>
+                </a:solidFill>
+                <a:latin typeface="+mj-lt"/>
+              </a:rPr>
+              <a:t>Plotly</a:t>
+            </a:r>
+            <a:r>
+              <a:rPr lang="en-US" sz="1500" dirty="0">
+                <a:solidFill>
+                  <a:srgbClr val="FFFFFF"/>
+                </a:solidFill>
+                <a:latin typeface="+mj-lt"/>
+              </a:rPr>
+              <a:t>, D3</a:t>
+            </a:r>
+          </a:p>
+          <a:p>
+            <a:endParaRPr lang="en-US" sz="1500" dirty="0">
+              <a:solidFill>
+                <a:srgbClr val="FFFFFF"/>
+              </a:solidFill>
+              <a:latin typeface="+mj-lt"/>
+            </a:endParaRPr>
+          </a:p>
+        </p:txBody>
+      </p:sp>
+      <p:sp>
+        <p:nvSpPr>
+          <p:cNvPr id="26" name="Rectangle 21">
+            <a:extLst>
+              <a:ext uri="{FF2B5EF4-FFF2-40B4-BE49-F238E27FC236}">
+                <a16:creationId xmlns:a16="http://schemas.microsoft.com/office/drawing/2014/main" id="{53B8D6B0-55D6-48DC-86D8-FD95D5F118AB}"/>
+              </a:ext>
+              <a:ext uri="{C183D7F6-B498-43B3-948B-1728B52AA6E4}">
+                <adec:decorative xmlns:adec="http://schemas.microsoft.com/office/drawing/2017/decorative" val="1"/>
+              </a:ext>
+            </a:extLst>
+          </p:cNvPr>
+          <p:cNvSpPr>
+            <a:spLocks noGrp="1" noRot="1" noChangeAspect="1" noMove="1" noResize="1" noEditPoints="1" noAdjustHandles="1" noChangeArrowheads="1" noChangeShapeType="1" noTextEdit="1"/>
+          </p:cNvSpPr>
+          <p:nvPr>
+            <p:extLst>
+              <p:ext uri="{386F3935-93C4-4BCD-93E2-E3B085C9AB24}">
+                <p16:designElem xmlns:p16="http://schemas.microsoft.com/office/powerpoint/2015/main" val="1"/>
+              </p:ext>
+            </p:extLst>
+          </p:nvPr>
+        </p:nvSpPr>
+        <p:spPr>
+          <a:xfrm>
+            <a:off x="4040071" y="0"/>
+            <a:ext cx="64008" cy="6858000"/>
+          </a:xfrm>
+          <a:prstGeom prst="rect">
+            <a:avLst/>
+          </a:prstGeom>
+          <a:solidFill>
+            <a:schemeClr val="accent1"/>
+          </a:solidFill>
+          <a:ln>
+            <a:noFill/>
+          </a:ln>
+        </p:spPr>
+        <p:style>
+          <a:lnRef idx="2">
+            <a:schemeClr val="accent1">
+              <a:shade val="50000"/>
+            </a:schemeClr>
+          </a:lnRef>
+          <a:fillRef idx="1">
+            <a:schemeClr val="accent1"/>
+          </a:fillRef>
+          <a:effectRef idx="0">
+            <a:schemeClr val="accent1"/>
+          </a:effectRef>
+          <a:fontRef idx="minor">
+            <a:schemeClr val="lt1"/>
+          </a:fontRef>
+        </p:style>
+      </p:sp>
+      <p:graphicFrame>
+        <p:nvGraphicFramePr>
+          <p:cNvPr id="4" name="Chart 3">
+            <a:extLst>
+              <a:ext uri="{FF2B5EF4-FFF2-40B4-BE49-F238E27FC236}">
+                <a16:creationId xmlns:a16="http://schemas.microsoft.com/office/drawing/2014/main" id="{7A7D3E6D-BA77-35F4-4990-16CEA3386012}"/>
+              </a:ext>
+            </a:extLst>
+          </p:cNvPr>
+          <p:cNvGraphicFramePr>
+            <a:graphicFrameLocks/>
+          </p:cNvGraphicFramePr>
+          <p:nvPr>
+            <p:extLst>
+              <p:ext uri="{D42A27DB-BD31-4B8C-83A1-F6EECF244321}">
+                <p14:modId xmlns:p14="http://schemas.microsoft.com/office/powerpoint/2010/main" val="468368191"/>
+              </p:ext>
+            </p:extLst>
+          </p:nvPr>
+        </p:nvGraphicFramePr>
+        <p:xfrm>
+          <a:off x="4742017" y="640080"/>
+          <a:ext cx="6798082" cy="5577840"/>
+        </p:xfrm>
+        <a:graphic>
+          <a:graphicData uri="http://schemas.openxmlformats.org/drawingml/2006/chart">
+            <c:chart xmlns:c="http://schemas.openxmlformats.org/drawingml/2006/chart" xmlns:r="http://schemas.openxmlformats.org/officeDocument/2006/relationships" r:id="rId2"/>
+          </a:graphicData>
+        </a:graphic>
+      </p:graphicFrame>
+    </p:spTree>
+    <p:extLst>
+      <p:ext uri="{BB962C8B-B14F-4D97-AF65-F5344CB8AC3E}">
+        <p14:creationId xmlns:p14="http://schemas.microsoft.com/office/powerpoint/2010/main" val="2516570333"/>
+      </p:ext>
+    </p:extLst>
+  </p:cSld>
+  <p:clrMapOvr>
+    <a:masterClrMapping/>
+  </p:clrMapOvr>
+</p:sld>
+</file>
+
+<file path=ppt/slides/slide8.xml><?xml version="1.0" encoding="utf-8"?>
+<p:sld xmlns:a="http://schemas.openxmlformats.org/drawingml/2006/main" xmlns:r="http://schemas.openxmlformats.org/officeDocument/2006/relationships" xmlns:p="http://schemas.openxmlformats.org/presentationml/2006/main">
+  <p:cSld>
+    <p:bg>
+      <p:bgPr>
+        <a:solidFill>
+          <a:schemeClr val="bg1"/>
+        </a:solidFill>
+        <a:effectLst/>
+      </p:bgPr>
+    </p:bg>
+    <p:spTree>
+      <p:nvGrpSpPr>
+        <p:cNvPr id="1" name=""/>
+        <p:cNvGrpSpPr/>
+        <p:nvPr/>
+      </p:nvGrpSpPr>
+      <p:grpSpPr>
+        <a:xfrm>
+          <a:off x="0" y="0"/>
+          <a:ext cx="0" cy="0"/>
+          <a:chOff x="0" y="0"/>
+          <a:chExt cx="0" cy="0"/>
+        </a:xfrm>
+      </p:grpSpPr>
+      <p:sp useBgFill="1">
+        <p:nvSpPr>
+          <p:cNvPr id="8" name="Rectangle 7">
+            <a:extLst>
+              <a:ext uri="{FF2B5EF4-FFF2-40B4-BE49-F238E27FC236}">
+                <a16:creationId xmlns:a16="http://schemas.microsoft.com/office/drawing/2014/main" id="{3741B58E-3B65-4A01-A276-975AB2CF8A08}"/>
+              </a:ext>
+              <a:ext uri="{C183D7F6-B498-43B3-948B-1728B52AA6E4}">
+                <adec:decorative xmlns:adec="http://schemas.microsoft.com/office/drawing/2017/decorative" val="1"/>
+              </a:ext>
+            </a:extLst>
+          </p:cNvPr>
+          <p:cNvSpPr>
+            <a:spLocks noGrp="1" noRot="1" noChangeAspect="1" noMove="1" noResize="1" noEditPoints="1" noAdjustHandles="1" noChangeArrowheads="1" noChangeShapeType="1" noTextEdit="1"/>
+          </p:cNvSpPr>
+          <p:nvPr>
+            <p:extLst>
+              <p:ext uri="{386F3935-93C4-4BCD-93E2-E3B085C9AB24}">
+                <p16:designElem xmlns:p16="http://schemas.microsoft.com/office/powerpoint/2015/main" val="1"/>
+              </p:ext>
+            </p:extLst>
+          </p:nvPr>
+        </p:nvSpPr>
+        <p:spPr>
+          <a:xfrm>
+            <a:off x="0" y="0"/>
+            <a:ext cx="12186315" cy="6858000"/>
+          </a:xfrm>
+          <a:prstGeom prst="rect">
+            <a:avLst/>
+          </a:prstGeom>
+          <a:ln>
+            <a:noFill/>
+          </a:ln>
+        </p:spPr>
+        <p:style>
+          <a:lnRef idx="2">
+            <a:schemeClr val="accent6">
+              <a:shade val="50000"/>
+            </a:schemeClr>
+          </a:lnRef>
+          <a:fillRef idx="1001">
+            <a:schemeClr val="lt1"/>
+          </a:fillRef>
+          <a:effectRef idx="0">
+            <a:schemeClr val="accent6"/>
+          </a:effectRef>
+          <a:fontRef idx="minor">
+            <a:schemeClr val="lt1"/>
+          </a:fontRef>
+        </p:style>
+        <p:txBody>
+          <a:bodyPr rtlCol="0" anchor="ctr"/>
+          <a:lstStyle/>
+          <a:p>
+            <a:pPr algn="ctr"/>
+            <a:endParaRPr lang="en-US"/>
+          </a:p>
+        </p:txBody>
+      </p:sp>
+      <p:sp>
+        <p:nvSpPr>
+          <p:cNvPr id="10" name="Rectangle 9">
+            <a:extLst>
+              <a:ext uri="{FF2B5EF4-FFF2-40B4-BE49-F238E27FC236}">
+                <a16:creationId xmlns:a16="http://schemas.microsoft.com/office/drawing/2014/main" id="{7AAC67C3-831B-4AB1-A259-DFB839CAFAFC}"/>
+              </a:ext>
+              <a:ext uri="{C183D7F6-B498-43B3-948B-1728B52AA6E4}">
+                <adec:decorative xmlns:adec="http://schemas.microsoft.com/office/drawing/2017/decorative" val="1"/>
+              </a:ext>
+            </a:extLst>
+          </p:cNvPr>
+          <p:cNvSpPr>
+            <a:spLocks noGrp="1" noRot="1" noChangeAspect="1" noMove="1" noResize="1" noEditPoints="1" noAdjustHandles="1" noChangeArrowheads="1" noChangeShapeType="1" noTextEdit="1"/>
+          </p:cNvSpPr>
+          <p:nvPr>
+            <p:extLst>
+              <p:ext uri="{386F3935-93C4-4BCD-93E2-E3B085C9AB24}">
+                <p16:designElem xmlns:p16="http://schemas.microsoft.com/office/powerpoint/2015/main" val="1"/>
+              </p:ext>
+            </p:extLst>
+          </p:nvPr>
+        </p:nvSpPr>
+        <p:spPr>
+          <a:xfrm>
+            <a:off x="16" y="0"/>
+            <a:ext cx="4050791" cy="6858000"/>
+          </a:xfrm>
+          <a:prstGeom prst="rect">
+            <a:avLst/>
+          </a:prstGeom>
+          <a:solidFill>
+            <a:schemeClr val="accent2"/>
+          </a:solidFill>
+          <a:ln>
+            <a:noFill/>
+          </a:ln>
+        </p:spPr>
+        <p:style>
+          <a:lnRef idx="2">
+            <a:schemeClr val="accent1">
+              <a:shade val="50000"/>
+            </a:schemeClr>
+          </a:lnRef>
+          <a:fillRef idx="1">
+            <a:schemeClr val="accent1"/>
+          </a:fillRef>
+          <a:effectRef idx="0">
+            <a:schemeClr val="accent1"/>
+          </a:effectRef>
+          <a:fontRef idx="minor">
+            <a:schemeClr val="lt1"/>
+          </a:fontRef>
+        </p:style>
+      </p:sp>
+      <p:sp>
+        <p:nvSpPr>
+          <p:cNvPr id="2" name="Title 1">
+            <a:extLst>
+              <a:ext uri="{FF2B5EF4-FFF2-40B4-BE49-F238E27FC236}">
+                <a16:creationId xmlns:a16="http://schemas.microsoft.com/office/drawing/2014/main" id="{62048B59-CA8D-9F7B-C05E-2D0D8376C67C}"/>
+              </a:ext>
+            </a:extLst>
+          </p:cNvPr>
+          <p:cNvSpPr>
+            <a:spLocks noGrp="1"/>
+          </p:cNvSpPr>
+          <p:nvPr>
+            <p:ph type="title"/>
+          </p:nvPr>
+        </p:nvSpPr>
+        <p:spPr>
+          <a:xfrm>
+            <a:off x="492370" y="605896"/>
+            <a:ext cx="3084844" cy="5646208"/>
+          </a:xfrm>
+        </p:spPr>
+        <p:txBody>
+          <a:bodyPr anchor="ctr">
+            <a:normAutofit/>
+          </a:bodyPr>
+          <a:lstStyle/>
+          <a:p>
+            <a:r>
+              <a:rPr lang="en-US" sz="3100">
+                <a:solidFill>
+                  <a:srgbClr val="FFFFFF"/>
+                </a:solidFill>
+              </a:rPr>
+              <a:t>Findings and recommendations</a:t>
+            </a:r>
+            <a:endParaRPr lang="en-AU" sz="3100">
+              <a:solidFill>
+                <a:srgbClr val="FFFFFF"/>
+              </a:solidFill>
+            </a:endParaRPr>
+          </a:p>
+        </p:txBody>
+      </p:sp>
+      <p:sp>
+        <p:nvSpPr>
+          <p:cNvPr id="12" name="Rectangle 11">
+            <a:extLst>
+              <a:ext uri="{FF2B5EF4-FFF2-40B4-BE49-F238E27FC236}">
+                <a16:creationId xmlns:a16="http://schemas.microsoft.com/office/drawing/2014/main" id="{054B3F04-9EAC-45C0-B3CE-0387EEA10A0C}"/>
+              </a:ext>
+              <a:ext uri="{C183D7F6-B498-43B3-948B-1728B52AA6E4}">
+                <adec:decorative xmlns:adec="http://schemas.microsoft.com/office/drawing/2017/decorative" val="1"/>
+              </a:ext>
+            </a:extLst>
+          </p:cNvPr>
+          <p:cNvSpPr>
+            <a:spLocks noGrp="1" noRot="1" noChangeAspect="1" noMove="1" noResize="1" noEditPoints="1" noAdjustHandles="1" noChangeArrowheads="1" noChangeShapeType="1" noTextEdit="1"/>
+          </p:cNvSpPr>
+          <p:nvPr>
+            <p:extLst>
+              <p:ext uri="{386F3935-93C4-4BCD-93E2-E3B085C9AB24}">
+                <p16:designElem xmlns:p16="http://schemas.microsoft.com/office/powerpoint/2015/main" val="1"/>
+              </p:ext>
+            </p:extLst>
+          </p:nvPr>
+        </p:nvSpPr>
+        <p:spPr>
+          <a:xfrm>
+            <a:off x="4040071" y="0"/>
+            <a:ext cx="64008" cy="6858000"/>
+          </a:xfrm>
+          <a:prstGeom prst="rect">
+            <a:avLst/>
+          </a:prstGeom>
+          <a:solidFill>
+            <a:schemeClr val="accent1"/>
+          </a:solidFill>
+          <a:ln>
+            <a:noFill/>
+          </a:ln>
+        </p:spPr>
+        <p:style>
+          <a:lnRef idx="2">
+            <a:schemeClr val="accent1">
+              <a:shade val="50000"/>
+            </a:schemeClr>
+          </a:lnRef>
+          <a:fillRef idx="1">
+            <a:schemeClr val="accent1"/>
+          </a:fillRef>
+          <a:effectRef idx="0">
+            <a:schemeClr val="accent1"/>
+          </a:effectRef>
+          <a:fontRef idx="minor">
+            <a:schemeClr val="lt1"/>
+          </a:fontRef>
+        </p:style>
+      </p:sp>
+      <p:sp>
+        <p:nvSpPr>
+          <p:cNvPr id="3" name="Content Placeholder 2">
+            <a:extLst>
+              <a:ext uri="{FF2B5EF4-FFF2-40B4-BE49-F238E27FC236}">
+                <a16:creationId xmlns:a16="http://schemas.microsoft.com/office/drawing/2014/main" id="{269556EF-8199-C759-595A-3DFA7EA78684}"/>
+              </a:ext>
+            </a:extLst>
+          </p:cNvPr>
+          <p:cNvSpPr>
+            <a:spLocks noGrp="1"/>
+          </p:cNvSpPr>
+          <p:nvPr>
+            <p:ph idx="1"/>
+          </p:nvPr>
+        </p:nvSpPr>
+        <p:spPr>
+          <a:xfrm>
+            <a:off x="4742016" y="605896"/>
+            <a:ext cx="6413663" cy="5646208"/>
+          </a:xfrm>
+        </p:spPr>
+        <p:txBody>
+          <a:bodyPr anchor="ctr">
+            <a:normAutofit/>
+          </a:bodyPr>
+          <a:lstStyle/>
+          <a:p>
+            <a:endParaRPr lang="en-AU" dirty="0"/>
+          </a:p>
+        </p:txBody>
+      </p:sp>
+    </p:spTree>
+    <p:extLst>
+      <p:ext uri="{BB962C8B-B14F-4D97-AF65-F5344CB8AC3E}">
+        <p14:creationId xmlns:p14="http://schemas.microsoft.com/office/powerpoint/2010/main" val="2843435938"/>
       </p:ext>
     </p:extLst>
   </p:cSld>

</xml_diff>

<commit_message>
added line and bubble chart
</commit_message>
<xml_diff>
--- a/Victoria Crime Data Visualization3.pptx
+++ b/Victoria Crime Data Visualization3.pptx
@@ -9,10 +9,13 @@
     <p:sldId id="260" r:id="rId3"/>
     <p:sldId id="258" r:id="rId4"/>
     <p:sldId id="257" r:id="rId5"/>
-    <p:sldId id="262" r:id="rId6"/>
-    <p:sldId id="263" r:id="rId7"/>
-    <p:sldId id="264" r:id="rId8"/>
-    <p:sldId id="265" r:id="rId9"/>
+    <p:sldId id="268" r:id="rId6"/>
+    <p:sldId id="262" r:id="rId7"/>
+    <p:sldId id="269" r:id="rId8"/>
+    <p:sldId id="263" r:id="rId9"/>
+    <p:sldId id="264" r:id="rId10"/>
+    <p:sldId id="266" r:id="rId11"/>
+    <p:sldId id="267" r:id="rId12"/>
   </p:sldIdLst>
   <p:sldSz cx="12192000" cy="6858000"/>
   <p:notesSz cx="6858000" cy="9144000"/>
@@ -127,506 +130,6 @@
 </p1510:revInfo>
 </file>
 
-<file path=ppt/changesInfos/changesInfo1.xml><?xml version="1.0" encoding="utf-8"?>
-<pc:chgInfo xmlns:a="http://schemas.openxmlformats.org/drawingml/2006/main" xmlns:r="http://schemas.openxmlformats.org/officeDocument/2006/relationships" xmlns:ac="http://schemas.microsoft.com/office/drawing/2013/main/command" xmlns:pc="http://schemas.microsoft.com/office/powerpoint/2013/main/command">
-  <pc:docChgLst>
-    <pc:chgData name="Berta Devenyi" userId="99c6308e8d81b7b6" providerId="LiveId" clId="{FA0CB607-D8BE-48CD-9258-DB1B832A96BD}"/>
-    <pc:docChg chg="undo custSel addSld delSld modSld">
-      <pc:chgData name="Berta Devenyi" userId="99c6308e8d81b7b6" providerId="LiveId" clId="{FA0CB607-D8BE-48CD-9258-DB1B832A96BD}" dt="2022-09-11T05:13:15.110" v="718" actId="2711"/>
-      <pc:docMkLst>
-        <pc:docMk/>
-      </pc:docMkLst>
-      <pc:sldChg chg="modSp mod">
-        <pc:chgData name="Berta Devenyi" userId="99c6308e8d81b7b6" providerId="LiveId" clId="{FA0CB607-D8BE-48CD-9258-DB1B832A96BD}" dt="2022-09-11T05:08:35.236" v="648" actId="20577"/>
-        <pc:sldMkLst>
-          <pc:docMk/>
-          <pc:sldMk cId="3831519368" sldId="256"/>
-        </pc:sldMkLst>
-        <pc:spChg chg="mod">
-          <ac:chgData name="Berta Devenyi" userId="99c6308e8d81b7b6" providerId="LiveId" clId="{FA0CB607-D8BE-48CD-9258-DB1B832A96BD}" dt="2022-09-11T05:08:35.236" v="648" actId="20577"/>
-          <ac:spMkLst>
-            <pc:docMk/>
-            <pc:sldMk cId="3831519368" sldId="256"/>
-            <ac:spMk id="2" creationId="{8DCFAE3C-E50D-2441-5373-F8722CBE50FE}"/>
-          </ac:spMkLst>
-        </pc:spChg>
-      </pc:sldChg>
-      <pc:sldChg chg="modSp mod">
-        <pc:chgData name="Berta Devenyi" userId="99c6308e8d81b7b6" providerId="LiveId" clId="{FA0CB607-D8BE-48CD-9258-DB1B832A96BD}" dt="2022-09-11T05:11:15.715" v="665" actId="20577"/>
-        <pc:sldMkLst>
-          <pc:docMk/>
-          <pc:sldMk cId="1016780739" sldId="258"/>
-        </pc:sldMkLst>
-        <pc:spChg chg="mod">
-          <ac:chgData name="Berta Devenyi" userId="99c6308e8d81b7b6" providerId="LiveId" clId="{FA0CB607-D8BE-48CD-9258-DB1B832A96BD}" dt="2022-09-11T05:11:15.715" v="665" actId="20577"/>
-          <ac:spMkLst>
-            <pc:docMk/>
-            <pc:sldMk cId="1016780739" sldId="258"/>
-            <ac:spMk id="3" creationId="{6FF5BB63-C258-3658-7877-F23D9E4E5F42}"/>
-          </ac:spMkLst>
-        </pc:spChg>
-      </pc:sldChg>
-      <pc:sldChg chg="modSp mod">
-        <pc:chgData name="Berta Devenyi" userId="99c6308e8d81b7b6" providerId="LiveId" clId="{FA0CB607-D8BE-48CD-9258-DB1B832A96BD}" dt="2022-09-11T04:56:12.640" v="641" actId="20577"/>
-        <pc:sldMkLst>
-          <pc:docMk/>
-          <pc:sldMk cId="407982498" sldId="260"/>
-        </pc:sldMkLst>
-        <pc:spChg chg="mod">
-          <ac:chgData name="Berta Devenyi" userId="99c6308e8d81b7b6" providerId="LiveId" clId="{FA0CB607-D8BE-48CD-9258-DB1B832A96BD}" dt="2022-09-11T04:08:10.114" v="471" actId="20577"/>
-          <ac:spMkLst>
-            <pc:docMk/>
-            <pc:sldMk cId="407982498" sldId="260"/>
-            <ac:spMk id="2" creationId="{815D31FF-706B-AEAA-7E84-B19D87E96458}"/>
-          </ac:spMkLst>
-        </pc:spChg>
-        <pc:spChg chg="mod">
-          <ac:chgData name="Berta Devenyi" userId="99c6308e8d81b7b6" providerId="LiveId" clId="{FA0CB607-D8BE-48CD-9258-DB1B832A96BD}" dt="2022-09-11T04:56:12.640" v="641" actId="20577"/>
-          <ac:spMkLst>
-            <pc:docMk/>
-            <pc:sldMk cId="407982498" sldId="260"/>
-            <ac:spMk id="3" creationId="{B3AD4E39-D26F-5154-42A8-7DEB5A17B2D0}"/>
-          </ac:spMkLst>
-        </pc:spChg>
-      </pc:sldChg>
-      <pc:sldChg chg="modSp mod">
-        <pc:chgData name="Berta Devenyi" userId="99c6308e8d81b7b6" providerId="LiveId" clId="{FA0CB607-D8BE-48CD-9258-DB1B832A96BD}" dt="2022-09-11T04:05:25.761" v="450" actId="33524"/>
-        <pc:sldMkLst>
-          <pc:docMk/>
-          <pc:sldMk cId="1114990967" sldId="262"/>
-        </pc:sldMkLst>
-        <pc:spChg chg="mod">
-          <ac:chgData name="Berta Devenyi" userId="99c6308e8d81b7b6" providerId="LiveId" clId="{FA0CB607-D8BE-48CD-9258-DB1B832A96BD}" dt="2022-09-11T04:05:25.761" v="450" actId="33524"/>
-          <ac:spMkLst>
-            <pc:docMk/>
-            <pc:sldMk cId="1114990967" sldId="262"/>
-            <ac:spMk id="2" creationId="{75A5A951-1B12-FC62-4875-59A74BDA964F}"/>
-          </ac:spMkLst>
-        </pc:spChg>
-        <pc:spChg chg="mod">
-          <ac:chgData name="Berta Devenyi" userId="99c6308e8d81b7b6" providerId="LiveId" clId="{FA0CB607-D8BE-48CD-9258-DB1B832A96BD}" dt="2022-09-11T03:34:22.496" v="1" actId="20577"/>
-          <ac:spMkLst>
-            <pc:docMk/>
-            <pc:sldMk cId="1114990967" sldId="262"/>
-            <ac:spMk id="7" creationId="{BBD6697D-2431-035B-A37E-0089CFBE1ECA}"/>
-          </ac:spMkLst>
-        </pc:spChg>
-      </pc:sldChg>
-      <pc:sldChg chg="addSp delSp modSp add mod setBg">
-        <pc:chgData name="Berta Devenyi" userId="99c6308e8d81b7b6" providerId="LiveId" clId="{FA0CB607-D8BE-48CD-9258-DB1B832A96BD}" dt="2022-09-11T05:12:47.324" v="696" actId="20577"/>
-        <pc:sldMkLst>
-          <pc:docMk/>
-          <pc:sldMk cId="1446067743" sldId="263"/>
-        </pc:sldMkLst>
-        <pc:spChg chg="mod">
-          <ac:chgData name="Berta Devenyi" userId="99c6308e8d81b7b6" providerId="LiveId" clId="{FA0CB607-D8BE-48CD-9258-DB1B832A96BD}" dt="2022-09-11T03:43:11.535" v="131" actId="26606"/>
-          <ac:spMkLst>
-            <pc:docMk/>
-            <pc:sldMk cId="1446067743" sldId="263"/>
-            <ac:spMk id="4" creationId="{33626372-42A7-F501-CD18-F3C48E2FD070}"/>
-          </ac:spMkLst>
-        </pc:spChg>
-        <pc:spChg chg="mod">
-          <ac:chgData name="Berta Devenyi" userId="99c6308e8d81b7b6" providerId="LiveId" clId="{FA0CB607-D8BE-48CD-9258-DB1B832A96BD}" dt="2022-09-11T05:12:47.324" v="696" actId="20577"/>
-          <ac:spMkLst>
-            <pc:docMk/>
-            <pc:sldMk cId="1446067743" sldId="263"/>
-            <ac:spMk id="5" creationId="{2AB91FB6-8116-C465-F7A7-A77B58B7017C}"/>
-          </ac:spMkLst>
-        </pc:spChg>
-        <pc:spChg chg="add del">
-          <ac:chgData name="Berta Devenyi" userId="99c6308e8d81b7b6" providerId="LiveId" clId="{FA0CB607-D8BE-48CD-9258-DB1B832A96BD}" dt="2022-09-11T03:51:15.504" v="136" actId="26606"/>
-          <ac:spMkLst>
-            <pc:docMk/>
-            <pc:sldMk cId="1446067743" sldId="263"/>
-            <ac:spMk id="10" creationId="{990D0034-F768-41E7-85D4-F38C4DE85770}"/>
-          </ac:spMkLst>
-        </pc:spChg>
-        <pc:spChg chg="add del">
-          <ac:chgData name="Berta Devenyi" userId="99c6308e8d81b7b6" providerId="LiveId" clId="{FA0CB607-D8BE-48CD-9258-DB1B832A96BD}" dt="2022-09-11T03:51:15.504" v="136" actId="26606"/>
-          <ac:spMkLst>
-            <pc:docMk/>
-            <pc:sldMk cId="1446067743" sldId="263"/>
-            <ac:spMk id="12" creationId="{C4F7E42D-8B5A-4FC8-81CD-9E60171F7FA8}"/>
-          </ac:spMkLst>
-        </pc:spChg>
-        <pc:spChg chg="add del">
-          <ac:chgData name="Berta Devenyi" userId="99c6308e8d81b7b6" providerId="LiveId" clId="{FA0CB607-D8BE-48CD-9258-DB1B832A96BD}" dt="2022-09-11T03:51:15.504" v="136" actId="26606"/>
-          <ac:spMkLst>
-            <pc:docMk/>
-            <pc:sldMk cId="1446067743" sldId="263"/>
-            <ac:spMk id="14" creationId="{8C04651D-B9F4-4935-A02D-364153FBDF54}"/>
-          </ac:spMkLst>
-        </pc:spChg>
-        <pc:spChg chg="add del">
-          <ac:chgData name="Berta Devenyi" userId="99c6308e8d81b7b6" providerId="LiveId" clId="{FA0CB607-D8BE-48CD-9258-DB1B832A96BD}" dt="2022-09-11T03:54:46.985" v="407" actId="26606"/>
-          <ac:spMkLst>
-            <pc:docMk/>
-            <pc:sldMk cId="1446067743" sldId="263"/>
-            <ac:spMk id="19" creationId="{44CC594A-A820-450F-B363-C19201FCFEC6}"/>
-          </ac:spMkLst>
-        </pc:spChg>
-        <pc:spChg chg="add del">
-          <ac:chgData name="Berta Devenyi" userId="99c6308e8d81b7b6" providerId="LiveId" clId="{FA0CB607-D8BE-48CD-9258-DB1B832A96BD}" dt="2022-09-11T03:54:46.985" v="407" actId="26606"/>
-          <ac:spMkLst>
-            <pc:docMk/>
-            <pc:sldMk cId="1446067743" sldId="263"/>
-            <ac:spMk id="21" creationId="{59FAB3DA-E9ED-4574-ABCC-378BC0FF1BBC}"/>
-          </ac:spMkLst>
-        </pc:spChg>
-        <pc:spChg chg="add del">
-          <ac:chgData name="Berta Devenyi" userId="99c6308e8d81b7b6" providerId="LiveId" clId="{FA0CB607-D8BE-48CD-9258-DB1B832A96BD}" dt="2022-09-11T03:54:46.985" v="407" actId="26606"/>
-          <ac:spMkLst>
-            <pc:docMk/>
-            <pc:sldMk cId="1446067743" sldId="263"/>
-            <ac:spMk id="23" creationId="{53B8D6B0-55D6-48DC-86D8-FD95D5F118AB}"/>
-          </ac:spMkLst>
-        </pc:spChg>
-        <pc:spChg chg="add del">
-          <ac:chgData name="Berta Devenyi" userId="99c6308e8d81b7b6" providerId="LiveId" clId="{FA0CB607-D8BE-48CD-9258-DB1B832A96BD}" dt="2022-09-11T03:54:46.978" v="406" actId="26606"/>
-          <ac:spMkLst>
-            <pc:docMk/>
-            <pc:sldMk cId="1446067743" sldId="263"/>
-            <ac:spMk id="28" creationId="{990D0034-F768-41E7-85D4-F38C4DE85770}"/>
-          </ac:spMkLst>
-        </pc:spChg>
-        <pc:spChg chg="add del">
-          <ac:chgData name="Berta Devenyi" userId="99c6308e8d81b7b6" providerId="LiveId" clId="{FA0CB607-D8BE-48CD-9258-DB1B832A96BD}" dt="2022-09-11T03:54:46.978" v="406" actId="26606"/>
-          <ac:spMkLst>
-            <pc:docMk/>
-            <pc:sldMk cId="1446067743" sldId="263"/>
-            <ac:spMk id="30" creationId="{C4F7E42D-8B5A-4FC8-81CD-9E60171F7FA8}"/>
-          </ac:spMkLst>
-        </pc:spChg>
-        <pc:spChg chg="add del">
-          <ac:chgData name="Berta Devenyi" userId="99c6308e8d81b7b6" providerId="LiveId" clId="{FA0CB607-D8BE-48CD-9258-DB1B832A96BD}" dt="2022-09-11T03:54:46.978" v="406" actId="26606"/>
-          <ac:spMkLst>
-            <pc:docMk/>
-            <pc:sldMk cId="1446067743" sldId="263"/>
-            <ac:spMk id="32" creationId="{8C04651D-B9F4-4935-A02D-364153FBDF54}"/>
-          </ac:spMkLst>
-        </pc:spChg>
-        <pc:spChg chg="add">
-          <ac:chgData name="Berta Devenyi" userId="99c6308e8d81b7b6" providerId="LiveId" clId="{FA0CB607-D8BE-48CD-9258-DB1B832A96BD}" dt="2022-09-11T03:54:46.985" v="407" actId="26606"/>
-          <ac:spMkLst>
-            <pc:docMk/>
-            <pc:sldMk cId="1446067743" sldId="263"/>
-            <ac:spMk id="34" creationId="{44CC594A-A820-450F-B363-C19201FCFEC6}"/>
-          </ac:spMkLst>
-        </pc:spChg>
-        <pc:spChg chg="add">
-          <ac:chgData name="Berta Devenyi" userId="99c6308e8d81b7b6" providerId="LiveId" clId="{FA0CB607-D8BE-48CD-9258-DB1B832A96BD}" dt="2022-09-11T03:54:46.985" v="407" actId="26606"/>
-          <ac:spMkLst>
-            <pc:docMk/>
-            <pc:sldMk cId="1446067743" sldId="263"/>
-            <ac:spMk id="35" creationId="{59FAB3DA-E9ED-4574-ABCC-378BC0FF1BBC}"/>
-          </ac:spMkLst>
-        </pc:spChg>
-        <pc:spChg chg="add">
-          <ac:chgData name="Berta Devenyi" userId="99c6308e8d81b7b6" providerId="LiveId" clId="{FA0CB607-D8BE-48CD-9258-DB1B832A96BD}" dt="2022-09-11T03:54:46.985" v="407" actId="26606"/>
-          <ac:spMkLst>
-            <pc:docMk/>
-            <pc:sldMk cId="1446067743" sldId="263"/>
-            <ac:spMk id="36" creationId="{53B8D6B0-55D6-48DC-86D8-FD95D5F118AB}"/>
-          </ac:spMkLst>
-        </pc:spChg>
-        <pc:picChg chg="del mod">
-          <ac:chgData name="Berta Devenyi" userId="99c6308e8d81b7b6" providerId="LiveId" clId="{FA0CB607-D8BE-48CD-9258-DB1B832A96BD}" dt="2022-09-11T03:50:48.785" v="133" actId="478"/>
-          <ac:picMkLst>
-            <pc:docMk/>
-            <pc:sldMk cId="1446067743" sldId="263"/>
-            <ac:picMk id="3" creationId="{E8237492-9E56-2D29-094B-B2CC696C8075}"/>
-          </ac:picMkLst>
-        </pc:picChg>
-        <pc:picChg chg="add mod">
-          <ac:chgData name="Berta Devenyi" userId="99c6308e8d81b7b6" providerId="LiveId" clId="{FA0CB607-D8BE-48CD-9258-DB1B832A96BD}" dt="2022-09-11T03:55:07.850" v="411" actId="1076"/>
-          <ac:picMkLst>
-            <pc:docMk/>
-            <pc:sldMk cId="1446067743" sldId="263"/>
-            <ac:picMk id="6" creationId="{FD651A7A-E8AC-A627-55D8-8A9687139159}"/>
-          </ac:picMkLst>
-        </pc:picChg>
-      </pc:sldChg>
-      <pc:sldChg chg="addSp delSp modSp add mod setBg chgLayout">
-        <pc:chgData name="Berta Devenyi" userId="99c6308e8d81b7b6" providerId="LiveId" clId="{FA0CB607-D8BE-48CD-9258-DB1B832A96BD}" dt="2022-09-11T05:13:15.110" v="718" actId="2711"/>
-        <pc:sldMkLst>
-          <pc:docMk/>
-          <pc:sldMk cId="2516570333" sldId="264"/>
-        </pc:sldMkLst>
-        <pc:spChg chg="mod ord">
-          <ac:chgData name="Berta Devenyi" userId="99c6308e8d81b7b6" providerId="LiveId" clId="{FA0CB607-D8BE-48CD-9258-DB1B832A96BD}" dt="2022-09-11T03:54:19.420" v="404" actId="26606"/>
-          <ac:spMkLst>
-            <pc:docMk/>
-            <pc:sldMk cId="2516570333" sldId="264"/>
-            <ac:spMk id="2" creationId="{A4890AAB-AD6E-4D0C-C387-EDC80BC6710E}"/>
-          </ac:spMkLst>
-        </pc:spChg>
-        <pc:spChg chg="mod ord">
-          <ac:chgData name="Berta Devenyi" userId="99c6308e8d81b7b6" providerId="LiveId" clId="{FA0CB607-D8BE-48CD-9258-DB1B832A96BD}" dt="2022-09-11T05:13:15.110" v="718" actId="2711"/>
-          <ac:spMkLst>
-            <pc:docMk/>
-            <pc:sldMk cId="2516570333" sldId="264"/>
-            <ac:spMk id="3" creationId="{A2747452-7799-79D9-1C74-222841D88F7A}"/>
-          </ac:spMkLst>
-        </pc:spChg>
-        <pc:spChg chg="add del">
-          <ac:chgData name="Berta Devenyi" userId="99c6308e8d81b7b6" providerId="LiveId" clId="{FA0CB607-D8BE-48CD-9258-DB1B832A96BD}" dt="2022-09-11T03:54:19.420" v="404" actId="26606"/>
-          <ac:spMkLst>
-            <pc:docMk/>
-            <pc:sldMk cId="2516570333" sldId="264"/>
-            <ac:spMk id="9" creationId="{44CC594A-A820-450F-B363-C19201FCFEC6}"/>
-          </ac:spMkLst>
-        </pc:spChg>
-        <pc:spChg chg="add del">
-          <ac:chgData name="Berta Devenyi" userId="99c6308e8d81b7b6" providerId="LiveId" clId="{FA0CB607-D8BE-48CD-9258-DB1B832A96BD}" dt="2022-09-11T03:54:19.420" v="404" actId="26606"/>
-          <ac:spMkLst>
-            <pc:docMk/>
-            <pc:sldMk cId="2516570333" sldId="264"/>
-            <ac:spMk id="11" creationId="{59FAB3DA-E9ED-4574-ABCC-378BC0FF1BBC}"/>
-          </ac:spMkLst>
-        </pc:spChg>
-        <pc:spChg chg="add del">
-          <ac:chgData name="Berta Devenyi" userId="99c6308e8d81b7b6" providerId="LiveId" clId="{FA0CB607-D8BE-48CD-9258-DB1B832A96BD}" dt="2022-09-11T03:54:19.420" v="404" actId="26606"/>
-          <ac:spMkLst>
-            <pc:docMk/>
-            <pc:sldMk cId="2516570333" sldId="264"/>
-            <ac:spMk id="13" creationId="{53B8D6B0-55D6-48DC-86D8-FD95D5F118AB}"/>
-          </ac:spMkLst>
-        </pc:spChg>
-        <pc:spChg chg="add del">
-          <ac:chgData name="Berta Devenyi" userId="99c6308e8d81b7b6" providerId="LiveId" clId="{FA0CB607-D8BE-48CD-9258-DB1B832A96BD}" dt="2022-09-11T03:54:19.403" v="403" actId="26606"/>
-          <ac:spMkLst>
-            <pc:docMk/>
-            <pc:sldMk cId="2516570333" sldId="264"/>
-            <ac:spMk id="18" creationId="{7EE378F3-9642-471B-8215-AA32884221B4}"/>
-          </ac:spMkLst>
-        </pc:spChg>
-        <pc:spChg chg="add del">
-          <ac:chgData name="Berta Devenyi" userId="99c6308e8d81b7b6" providerId="LiveId" clId="{FA0CB607-D8BE-48CD-9258-DB1B832A96BD}" dt="2022-09-11T03:54:19.403" v="403" actId="26606"/>
-          <ac:spMkLst>
-            <pc:docMk/>
-            <pc:sldMk cId="2516570333" sldId="264"/>
-            <ac:spMk id="20" creationId="{26405F82-F7FB-4124-AE2B-3D69A007C129}"/>
-          </ac:spMkLst>
-        </pc:spChg>
-        <pc:spChg chg="add del">
-          <ac:chgData name="Berta Devenyi" userId="99c6308e8d81b7b6" providerId="LiveId" clId="{FA0CB607-D8BE-48CD-9258-DB1B832A96BD}" dt="2022-09-11T03:54:19.403" v="403" actId="26606"/>
-          <ac:spMkLst>
-            <pc:docMk/>
-            <pc:sldMk cId="2516570333" sldId="264"/>
-            <ac:spMk id="22" creationId="{AAAE29FD-C3A6-46E4-BF94-132A4C4EE2E0}"/>
-          </ac:spMkLst>
-        </pc:spChg>
-        <pc:spChg chg="add">
-          <ac:chgData name="Berta Devenyi" userId="99c6308e8d81b7b6" providerId="LiveId" clId="{FA0CB607-D8BE-48CD-9258-DB1B832A96BD}" dt="2022-09-11T03:54:19.420" v="404" actId="26606"/>
-          <ac:spMkLst>
-            <pc:docMk/>
-            <pc:sldMk cId="2516570333" sldId="264"/>
-            <ac:spMk id="24" creationId="{44CC594A-A820-450F-B363-C19201FCFEC6}"/>
-          </ac:spMkLst>
-        </pc:spChg>
-        <pc:spChg chg="add">
-          <ac:chgData name="Berta Devenyi" userId="99c6308e8d81b7b6" providerId="LiveId" clId="{FA0CB607-D8BE-48CD-9258-DB1B832A96BD}" dt="2022-09-11T03:54:19.420" v="404" actId="26606"/>
-          <ac:spMkLst>
-            <pc:docMk/>
-            <pc:sldMk cId="2516570333" sldId="264"/>
-            <ac:spMk id="25" creationId="{59FAB3DA-E9ED-4574-ABCC-378BC0FF1BBC}"/>
-          </ac:spMkLst>
-        </pc:spChg>
-        <pc:spChg chg="add">
-          <ac:chgData name="Berta Devenyi" userId="99c6308e8d81b7b6" providerId="LiveId" clId="{FA0CB607-D8BE-48CD-9258-DB1B832A96BD}" dt="2022-09-11T03:54:19.420" v="404" actId="26606"/>
-          <ac:spMkLst>
-            <pc:docMk/>
-            <pc:sldMk cId="2516570333" sldId="264"/>
-            <ac:spMk id="26" creationId="{53B8D6B0-55D6-48DC-86D8-FD95D5F118AB}"/>
-          </ac:spMkLst>
-        </pc:spChg>
-        <pc:graphicFrameChg chg="add mod">
-          <ac:chgData name="Berta Devenyi" userId="99c6308e8d81b7b6" providerId="LiveId" clId="{FA0CB607-D8BE-48CD-9258-DB1B832A96BD}" dt="2022-09-11T03:54:19.420" v="404" actId="26606"/>
-          <ac:graphicFrameMkLst>
-            <pc:docMk/>
-            <pc:sldMk cId="2516570333" sldId="264"/>
-            <ac:graphicFrameMk id="4" creationId="{7A7D3E6D-BA77-35F4-4990-16CEA3386012}"/>
-          </ac:graphicFrameMkLst>
-        </pc:graphicFrameChg>
-      </pc:sldChg>
-      <pc:sldChg chg="addSp modSp new mod setBg">
-        <pc:chgData name="Berta Devenyi" userId="99c6308e8d81b7b6" providerId="LiveId" clId="{FA0CB607-D8BE-48CD-9258-DB1B832A96BD}" dt="2022-09-11T03:56:00.077" v="445" actId="26606"/>
-        <pc:sldMkLst>
-          <pc:docMk/>
-          <pc:sldMk cId="2843435938" sldId="265"/>
-        </pc:sldMkLst>
-        <pc:spChg chg="mod">
-          <ac:chgData name="Berta Devenyi" userId="99c6308e8d81b7b6" providerId="LiveId" clId="{FA0CB607-D8BE-48CD-9258-DB1B832A96BD}" dt="2022-09-11T03:56:00.077" v="445" actId="26606"/>
-          <ac:spMkLst>
-            <pc:docMk/>
-            <pc:sldMk cId="2843435938" sldId="265"/>
-            <ac:spMk id="2" creationId="{62048B59-CA8D-9F7B-C05E-2D0D8376C67C}"/>
-          </ac:spMkLst>
-        </pc:spChg>
-        <pc:spChg chg="mod">
-          <ac:chgData name="Berta Devenyi" userId="99c6308e8d81b7b6" providerId="LiveId" clId="{FA0CB607-D8BE-48CD-9258-DB1B832A96BD}" dt="2022-09-11T03:56:00.077" v="445" actId="26606"/>
-          <ac:spMkLst>
-            <pc:docMk/>
-            <pc:sldMk cId="2843435938" sldId="265"/>
-            <ac:spMk id="3" creationId="{269556EF-8199-C759-595A-3DFA7EA78684}"/>
-          </ac:spMkLst>
-        </pc:spChg>
-        <pc:spChg chg="add">
-          <ac:chgData name="Berta Devenyi" userId="99c6308e8d81b7b6" providerId="LiveId" clId="{FA0CB607-D8BE-48CD-9258-DB1B832A96BD}" dt="2022-09-11T03:56:00.077" v="445" actId="26606"/>
-          <ac:spMkLst>
-            <pc:docMk/>
-            <pc:sldMk cId="2843435938" sldId="265"/>
-            <ac:spMk id="8" creationId="{3741B58E-3B65-4A01-A276-975AB2CF8A08}"/>
-          </ac:spMkLst>
-        </pc:spChg>
-        <pc:spChg chg="add">
-          <ac:chgData name="Berta Devenyi" userId="99c6308e8d81b7b6" providerId="LiveId" clId="{FA0CB607-D8BE-48CD-9258-DB1B832A96BD}" dt="2022-09-11T03:56:00.077" v="445" actId="26606"/>
-          <ac:spMkLst>
-            <pc:docMk/>
-            <pc:sldMk cId="2843435938" sldId="265"/>
-            <ac:spMk id="10" creationId="{7AAC67C3-831B-4AB1-A259-DFB839CAFAFC}"/>
-          </ac:spMkLst>
-        </pc:spChg>
-        <pc:spChg chg="add">
-          <ac:chgData name="Berta Devenyi" userId="99c6308e8d81b7b6" providerId="LiveId" clId="{FA0CB607-D8BE-48CD-9258-DB1B832A96BD}" dt="2022-09-11T03:56:00.077" v="445" actId="26606"/>
-          <ac:spMkLst>
-            <pc:docMk/>
-            <pc:sldMk cId="2843435938" sldId="265"/>
-            <ac:spMk id="12" creationId="{054B3F04-9EAC-45C0-B3CE-0387EEA10A0C}"/>
-          </ac:spMkLst>
-        </pc:spChg>
-      </pc:sldChg>
-      <pc:sldChg chg="modSp new del mod">
-        <pc:chgData name="Berta Devenyi" userId="99c6308e8d81b7b6" providerId="LiveId" clId="{FA0CB607-D8BE-48CD-9258-DB1B832A96BD}" dt="2022-09-11T03:54:01.754" v="400" actId="47"/>
-        <pc:sldMkLst>
-          <pc:docMk/>
-          <pc:sldMk cId="2853383015" sldId="265"/>
-        </pc:sldMkLst>
-        <pc:spChg chg="mod">
-          <ac:chgData name="Berta Devenyi" userId="99c6308e8d81b7b6" providerId="LiveId" clId="{FA0CB607-D8BE-48CD-9258-DB1B832A96BD}" dt="2022-09-11T03:37:23.456" v="11" actId="5793"/>
-          <ac:spMkLst>
-            <pc:docMk/>
-            <pc:sldMk cId="2853383015" sldId="265"/>
-            <ac:spMk id="3" creationId="{C08BC687-8EE4-6340-5C5D-A42D2FC0FEAF}"/>
-          </ac:spMkLst>
-        </pc:spChg>
-      </pc:sldChg>
-      <pc:sldChg chg="delSp add del setBg delDesignElem">
-        <pc:chgData name="Berta Devenyi" userId="99c6308e8d81b7b6" providerId="LiveId" clId="{FA0CB607-D8BE-48CD-9258-DB1B832A96BD}" dt="2022-09-11T03:54:04.733" v="401" actId="47"/>
-        <pc:sldMkLst>
-          <pc:docMk/>
-          <pc:sldMk cId="794702256" sldId="266"/>
-        </pc:sldMkLst>
-        <pc:spChg chg="del">
-          <ac:chgData name="Berta Devenyi" userId="99c6308e8d81b7b6" providerId="LiveId" clId="{FA0CB607-D8BE-48CD-9258-DB1B832A96BD}" dt="2022-09-11T03:37:06.625" v="10"/>
-          <ac:spMkLst>
-            <pc:docMk/>
-            <pc:sldMk cId="794702256" sldId="266"/>
-            <ac:spMk id="9" creationId="{4E4490D0-3672-446A-AC12-B4830333BDDD}"/>
-          </ac:spMkLst>
-        </pc:spChg>
-        <pc:spChg chg="del">
-          <ac:chgData name="Berta Devenyi" userId="99c6308e8d81b7b6" providerId="LiveId" clId="{FA0CB607-D8BE-48CD-9258-DB1B832A96BD}" dt="2022-09-11T03:37:06.625" v="10"/>
-          <ac:spMkLst>
-            <pc:docMk/>
-            <pc:sldMk cId="794702256" sldId="266"/>
-            <ac:spMk id="11" creationId="{39CB82C2-DF65-4EC1-8280-F201D50F570B}"/>
-          </ac:spMkLst>
-        </pc:spChg>
-        <pc:spChg chg="del">
-          <ac:chgData name="Berta Devenyi" userId="99c6308e8d81b7b6" providerId="LiveId" clId="{FA0CB607-D8BE-48CD-9258-DB1B832A96BD}" dt="2022-09-11T03:37:06.625" v="10"/>
-          <ac:spMkLst>
-            <pc:docMk/>
-            <pc:sldMk cId="794702256" sldId="266"/>
-            <ac:spMk id="15" creationId="{5A1B47C8-47A0-4A88-8830-6DEA3B5DE392}"/>
-          </ac:spMkLst>
-        </pc:spChg>
-        <pc:spChg chg="del">
-          <ac:chgData name="Berta Devenyi" userId="99c6308e8d81b7b6" providerId="LiveId" clId="{FA0CB607-D8BE-48CD-9258-DB1B832A96BD}" dt="2022-09-11T03:37:06.625" v="10"/>
-          <ac:spMkLst>
-            <pc:docMk/>
-            <pc:sldMk cId="794702256" sldId="266"/>
-            <ac:spMk id="17" creationId="{984BBFDD-E720-4805-A9C8-129FBBF6DD70}"/>
-          </ac:spMkLst>
-        </pc:spChg>
-        <pc:spChg chg="del">
-          <ac:chgData name="Berta Devenyi" userId="99c6308e8d81b7b6" providerId="LiveId" clId="{FA0CB607-D8BE-48CD-9258-DB1B832A96BD}" dt="2022-09-11T03:37:06.625" v="10"/>
-          <ac:spMkLst>
-            <pc:docMk/>
-            <pc:sldMk cId="794702256" sldId="266"/>
-            <ac:spMk id="19" creationId="{5AC4BE46-4A77-42FE-9D15-065CDB2F847C}"/>
-          </ac:spMkLst>
-        </pc:spChg>
-        <pc:cxnChg chg="del">
-          <ac:chgData name="Berta Devenyi" userId="99c6308e8d81b7b6" providerId="LiveId" clId="{FA0CB607-D8BE-48CD-9258-DB1B832A96BD}" dt="2022-09-11T03:37:06.625" v="10"/>
-          <ac:cxnSpMkLst>
-            <pc:docMk/>
-            <pc:sldMk cId="794702256" sldId="266"/>
-            <ac:cxnSpMk id="13" creationId="{7E1D4427-852B-4B37-8E76-0E9F1810BA2A}"/>
-          </ac:cxnSpMkLst>
-        </pc:cxnChg>
-      </pc:sldChg>
-      <pc:sldChg chg="addSp delSp add del setBg delDesignElem">
-        <pc:chgData name="Berta Devenyi" userId="99c6308e8d81b7b6" providerId="LiveId" clId="{FA0CB607-D8BE-48CD-9258-DB1B832A96BD}" dt="2022-09-11T03:38:53.282" v="14"/>
-        <pc:sldMkLst>
-          <pc:docMk/>
-          <pc:sldMk cId="271679335" sldId="267"/>
-        </pc:sldMkLst>
-        <pc:spChg chg="add del">
-          <ac:chgData name="Berta Devenyi" userId="99c6308e8d81b7b6" providerId="LiveId" clId="{FA0CB607-D8BE-48CD-9258-DB1B832A96BD}" dt="2022-09-11T03:38:53.282" v="14"/>
-          <ac:spMkLst>
-            <pc:docMk/>
-            <pc:sldMk cId="271679335" sldId="267"/>
-            <ac:spMk id="9" creationId="{4E4490D0-3672-446A-AC12-B4830333BDDD}"/>
-          </ac:spMkLst>
-        </pc:spChg>
-        <pc:spChg chg="add del">
-          <ac:chgData name="Berta Devenyi" userId="99c6308e8d81b7b6" providerId="LiveId" clId="{FA0CB607-D8BE-48CD-9258-DB1B832A96BD}" dt="2022-09-11T03:38:53.282" v="14"/>
-          <ac:spMkLst>
-            <pc:docMk/>
-            <pc:sldMk cId="271679335" sldId="267"/>
-            <ac:spMk id="11" creationId="{39CB82C2-DF65-4EC1-8280-F201D50F570B}"/>
-          </ac:spMkLst>
-        </pc:spChg>
-        <pc:spChg chg="add del">
-          <ac:chgData name="Berta Devenyi" userId="99c6308e8d81b7b6" providerId="LiveId" clId="{FA0CB607-D8BE-48CD-9258-DB1B832A96BD}" dt="2022-09-11T03:38:53.282" v="14"/>
-          <ac:spMkLst>
-            <pc:docMk/>
-            <pc:sldMk cId="271679335" sldId="267"/>
-            <ac:spMk id="15" creationId="{5A1B47C8-47A0-4A88-8830-6DEA3B5DE392}"/>
-          </ac:spMkLst>
-        </pc:spChg>
-        <pc:spChg chg="add del">
-          <ac:chgData name="Berta Devenyi" userId="99c6308e8d81b7b6" providerId="LiveId" clId="{FA0CB607-D8BE-48CD-9258-DB1B832A96BD}" dt="2022-09-11T03:38:53.282" v="14"/>
-          <ac:spMkLst>
-            <pc:docMk/>
-            <pc:sldMk cId="271679335" sldId="267"/>
-            <ac:spMk id="17" creationId="{984BBFDD-E720-4805-A9C8-129FBBF6DD70}"/>
-          </ac:spMkLst>
-        </pc:spChg>
-        <pc:spChg chg="add del">
-          <ac:chgData name="Berta Devenyi" userId="99c6308e8d81b7b6" providerId="LiveId" clId="{FA0CB607-D8BE-48CD-9258-DB1B832A96BD}" dt="2022-09-11T03:38:53.282" v="14"/>
-          <ac:spMkLst>
-            <pc:docMk/>
-            <pc:sldMk cId="271679335" sldId="267"/>
-            <ac:spMk id="19" creationId="{5AC4BE46-4A77-42FE-9D15-065CDB2F847C}"/>
-          </ac:spMkLst>
-        </pc:spChg>
-        <pc:cxnChg chg="add del">
-          <ac:chgData name="Berta Devenyi" userId="99c6308e8d81b7b6" providerId="LiveId" clId="{FA0CB607-D8BE-48CD-9258-DB1B832A96BD}" dt="2022-09-11T03:38:53.282" v="14"/>
-          <ac:cxnSpMkLst>
-            <pc:docMk/>
-            <pc:sldMk cId="271679335" sldId="267"/>
-            <ac:cxnSpMk id="13" creationId="{7E1D4427-852B-4B37-8E76-0E9F1810BA2A}"/>
-          </ac:cxnSpMkLst>
-        </pc:cxnChg>
-      </pc:sldChg>
-    </pc:docChg>
-  </pc:docChgLst>
-</pc:chgInfo>
-</file>
-
 <file path=ppt/charts/chart1.xml><?xml version="1.0" encoding="utf-8"?>
 <c:chartSpace xmlns:c="http://schemas.openxmlformats.org/drawingml/2006/chart" xmlns:a="http://schemas.openxmlformats.org/drawingml/2006/main" xmlns:r="http://schemas.openxmlformats.org/officeDocument/2006/relationships" xmlns:c16r2="http://schemas.microsoft.com/office/drawing/2015/06/chart">
   <c:date1904 val="0"/>
@@ -698,7 +201,17 @@
     </c:title>
     <c:autoTitleDeleted val="0"/>
     <c:plotArea>
-      <c:layout/>
+      <c:layout>
+        <c:manualLayout>
+          <c:layoutTarget val="inner"/>
+          <c:xMode val="edge"/>
+          <c:yMode val="edge"/>
+          <c:x val="5.2475389381887422E-2"/>
+          <c:y val="0.10304001132035946"/>
+          <c:w val="0.91763382671759475"/>
+          <c:h val="0.64686836914452905"/>
+        </c:manualLayout>
+      </c:layout>
       <c:barChart>
         <c:barDir val="col"/>
         <c:grouping val="clustered"/>
@@ -5601,6 +5114,218 @@
 </p:sld>
 </file>
 
+<file path=ppt/slides/slide10.xml><?xml version="1.0" encoding="utf-8"?>
+<p:sld xmlns:a="http://schemas.openxmlformats.org/drawingml/2006/main" xmlns:r="http://schemas.openxmlformats.org/officeDocument/2006/relationships" xmlns:p="http://schemas.openxmlformats.org/presentationml/2006/main">
+  <p:cSld>
+    <p:spTree>
+      <p:nvGrpSpPr>
+        <p:cNvPr id="1" name=""/>
+        <p:cNvGrpSpPr/>
+        <p:nvPr/>
+      </p:nvGrpSpPr>
+      <p:grpSpPr>
+        <a:xfrm>
+          <a:off x="0" y="0"/>
+          <a:ext cx="0" cy="0"/>
+          <a:chOff x="0" y="0"/>
+          <a:chExt cx="0" cy="0"/>
+        </a:xfrm>
+      </p:grpSpPr>
+      <p:sp>
+        <p:nvSpPr>
+          <p:cNvPr id="2" name="Title 1">
+            <a:extLst>
+              <a:ext uri="{FF2B5EF4-FFF2-40B4-BE49-F238E27FC236}">
+                <a16:creationId xmlns:a16="http://schemas.microsoft.com/office/drawing/2014/main" id="{E450ACAB-367E-7F26-FA4B-6EA46797BFD4}"/>
+              </a:ext>
+            </a:extLst>
+          </p:cNvPr>
+          <p:cNvSpPr>
+            <a:spLocks noGrp="1"/>
+          </p:cNvSpPr>
+          <p:nvPr>
+            <p:ph type="title"/>
+          </p:nvPr>
+        </p:nvSpPr>
+        <p:spPr/>
+        <p:txBody>
+          <a:bodyPr/>
+          <a:lstStyle/>
+          <a:p>
+            <a:endParaRPr lang="en-US"/>
+          </a:p>
+        </p:txBody>
+      </p:sp>
+      <p:sp>
+        <p:nvSpPr>
+          <p:cNvPr id="3" name="Content Placeholder 2">
+            <a:extLst>
+              <a:ext uri="{FF2B5EF4-FFF2-40B4-BE49-F238E27FC236}">
+                <a16:creationId xmlns:a16="http://schemas.microsoft.com/office/drawing/2014/main" id="{55A3E2DA-F189-02A2-2163-5D6075F6E69B}"/>
+              </a:ext>
+            </a:extLst>
+          </p:cNvPr>
+          <p:cNvSpPr>
+            <a:spLocks noGrp="1"/>
+          </p:cNvSpPr>
+          <p:nvPr>
+            <p:ph idx="1"/>
+          </p:nvPr>
+        </p:nvSpPr>
+        <p:spPr/>
+        <p:txBody>
+          <a:bodyPr/>
+          <a:lstStyle/>
+          <a:p>
+            <a:endParaRPr lang="en-US" dirty="0"/>
+          </a:p>
+        </p:txBody>
+      </p:sp>
+      <p:sp>
+        <p:nvSpPr>
+          <p:cNvPr id="4" name="Text Placeholder 3">
+            <a:extLst>
+              <a:ext uri="{FF2B5EF4-FFF2-40B4-BE49-F238E27FC236}">
+                <a16:creationId xmlns:a16="http://schemas.microsoft.com/office/drawing/2014/main" id="{158F30CB-B6E4-BA63-2481-D3B342EE2868}"/>
+              </a:ext>
+            </a:extLst>
+          </p:cNvPr>
+          <p:cNvSpPr>
+            <a:spLocks noGrp="1"/>
+          </p:cNvSpPr>
+          <p:nvPr>
+            <p:ph type="body" sz="half" idx="2"/>
+          </p:nvPr>
+        </p:nvSpPr>
+        <p:spPr/>
+        <p:txBody>
+          <a:bodyPr/>
+          <a:lstStyle/>
+          <a:p>
+            <a:endParaRPr lang="en-US"/>
+          </a:p>
+        </p:txBody>
+      </p:sp>
+    </p:spTree>
+    <p:extLst>
+      <p:ext uri="{BB962C8B-B14F-4D97-AF65-F5344CB8AC3E}">
+        <p14:creationId xmlns:p14="http://schemas.microsoft.com/office/powerpoint/2010/main" val="1635608422"/>
+      </p:ext>
+    </p:extLst>
+  </p:cSld>
+  <p:clrMapOvr>
+    <a:masterClrMapping/>
+  </p:clrMapOvr>
+</p:sld>
+</file>
+
+<file path=ppt/slides/slide11.xml><?xml version="1.0" encoding="utf-8"?>
+<p:sld xmlns:a="http://schemas.openxmlformats.org/drawingml/2006/main" xmlns:r="http://schemas.openxmlformats.org/officeDocument/2006/relationships" xmlns:p="http://schemas.openxmlformats.org/presentationml/2006/main">
+  <p:cSld>
+    <p:spTree>
+      <p:nvGrpSpPr>
+        <p:cNvPr id="1" name=""/>
+        <p:cNvGrpSpPr/>
+        <p:nvPr/>
+      </p:nvGrpSpPr>
+      <p:grpSpPr>
+        <a:xfrm>
+          <a:off x="0" y="0"/>
+          <a:ext cx="0" cy="0"/>
+          <a:chOff x="0" y="0"/>
+          <a:chExt cx="0" cy="0"/>
+        </a:xfrm>
+      </p:grpSpPr>
+      <p:sp>
+        <p:nvSpPr>
+          <p:cNvPr id="2" name="Title 1">
+            <a:extLst>
+              <a:ext uri="{FF2B5EF4-FFF2-40B4-BE49-F238E27FC236}">
+                <a16:creationId xmlns:a16="http://schemas.microsoft.com/office/drawing/2014/main" id="{815D31FF-706B-AEAA-7E84-B19D87E96458}"/>
+              </a:ext>
+            </a:extLst>
+          </p:cNvPr>
+          <p:cNvSpPr>
+            <a:spLocks noGrp="1"/>
+          </p:cNvSpPr>
+          <p:nvPr>
+            <p:ph type="title"/>
+          </p:nvPr>
+        </p:nvSpPr>
+        <p:spPr/>
+        <p:txBody>
+          <a:bodyPr>
+            <a:normAutofit/>
+          </a:bodyPr>
+          <a:lstStyle/>
+          <a:p>
+            <a:r>
+              <a:rPr lang="en-US" sz="3600" b="1" dirty="0">
+                <a:solidFill>
+                  <a:schemeClr val="accent2"/>
+                </a:solidFill>
+              </a:rPr>
+              <a:t>Findings</a:t>
+            </a:r>
+          </a:p>
+        </p:txBody>
+      </p:sp>
+      <p:sp>
+        <p:nvSpPr>
+          <p:cNvPr id="3" name="Content Placeholder 2">
+            <a:extLst>
+              <a:ext uri="{FF2B5EF4-FFF2-40B4-BE49-F238E27FC236}">
+                <a16:creationId xmlns:a16="http://schemas.microsoft.com/office/drawing/2014/main" id="{B3AD4E39-D26F-5154-42A8-7DEB5A17B2D0}"/>
+              </a:ext>
+            </a:extLst>
+          </p:cNvPr>
+          <p:cNvSpPr>
+            <a:spLocks noGrp="1"/>
+          </p:cNvSpPr>
+          <p:nvPr>
+            <p:ph idx="1"/>
+          </p:nvPr>
+        </p:nvSpPr>
+        <p:spPr/>
+        <p:txBody>
+          <a:bodyPr/>
+          <a:lstStyle/>
+          <a:p>
+            <a:r>
+              <a:rPr lang="en-US" dirty="0"/>
+              <a:t>- 2017, Victoria had the highest home theft and burglary in Australia.</a:t>
+            </a:r>
+          </a:p>
+          <a:p>
+            <a:r>
+              <a:rPr lang="en-US" dirty="0"/>
+              <a:t>- 2022, Victoria has</a:t>
+            </a:r>
+          </a:p>
+          <a:p>
+            <a:endParaRPr lang="en-US" dirty="0"/>
+          </a:p>
+          <a:p>
+            <a:endParaRPr lang="en-US" dirty="0"/>
+          </a:p>
+          <a:p>
+            <a:endParaRPr lang="en-US" dirty="0"/>
+          </a:p>
+        </p:txBody>
+      </p:sp>
+    </p:spTree>
+    <p:extLst>
+      <p:ext uri="{BB962C8B-B14F-4D97-AF65-F5344CB8AC3E}">
+        <p14:creationId xmlns:p14="http://schemas.microsoft.com/office/powerpoint/2010/main" val="1745378491"/>
+      </p:ext>
+    </p:extLst>
+  </p:cSld>
+  <p:clrMapOvr>
+    <a:masterClrMapping/>
+  </p:clrMapOvr>
+</p:sld>
+</file>
+
 <file path=ppt/slides/slide2.xml><?xml version="1.0" encoding="utf-8"?>
 <p:sld xmlns:a="http://schemas.openxmlformats.org/drawingml/2006/main" xmlns:r="http://schemas.openxmlformats.org/officeDocument/2006/relationships" xmlns:p="http://schemas.openxmlformats.org/presentationml/2006/main">
   <p:cSld>
@@ -5636,11 +5361,17 @@
         </p:nvSpPr>
         <p:spPr/>
         <p:txBody>
-          <a:bodyPr/>
+          <a:bodyPr>
+            <a:normAutofit/>
+          </a:bodyPr>
           <a:lstStyle/>
           <a:p>
             <a:r>
-              <a:rPr lang="en-US" dirty="0"/>
+              <a:rPr lang="en-US" sz="4000" b="1" dirty="0">
+                <a:solidFill>
+                  <a:schemeClr val="accent2"/>
+                </a:solidFill>
+              </a:rPr>
               <a:t>Objectives of the Study</a:t>
             </a:r>
           </a:p>
@@ -5669,13 +5400,7 @@
           <a:p>
             <a:r>
               <a:rPr lang="en-US" dirty="0"/>
-              <a:t>- 2017, Victoria had the highest home theft and burglary in Australia.</a:t>
-            </a:r>
-          </a:p>
-          <a:p>
-            <a:r>
-              <a:rPr lang="en-US" dirty="0"/>
-              <a:t>- We would like to compare last 4 years of crime offences in Victoria, 2019-2022, pre-COVID and post-COVID.</a:t>
+              <a:t>- We would like to compare last 4 years of crime offences in Victoria, 2019-2022, pre-COVID and during-COVID.</a:t>
             </a:r>
           </a:p>
           <a:p>
@@ -5772,11 +5497,17 @@
         </p:nvSpPr>
         <p:spPr/>
         <p:txBody>
-          <a:bodyPr/>
+          <a:bodyPr>
+            <a:normAutofit/>
+          </a:bodyPr>
           <a:lstStyle/>
           <a:p>
             <a:r>
-              <a:rPr lang="en-US" dirty="0"/>
+              <a:rPr lang="en-US" sz="4400" b="1" dirty="0">
+                <a:solidFill>
+                  <a:schemeClr val="accent2"/>
+                </a:solidFill>
+              </a:rPr>
               <a:t>Data scope, cleanup and add-on</a:t>
             </a:r>
           </a:p>
@@ -5800,67 +5531,77 @@
         </p:nvSpPr>
         <p:spPr/>
         <p:txBody>
-          <a:bodyPr/>
+          <a:bodyPr>
+            <a:normAutofit lnSpcReduction="10000"/>
+          </a:bodyPr>
           <a:lstStyle/>
           <a:p>
-            <a:endParaRPr lang="en-US" dirty="0"/>
-          </a:p>
-          <a:p>
-            <a:r>
-              <a:rPr lang="en-US" dirty="0"/>
+            <a:endParaRPr lang="en-US" sz="2400" dirty="0"/>
+          </a:p>
+          <a:p>
+            <a:r>
+              <a:rPr lang="en-US" sz="2400" dirty="0"/>
               <a:t>Considering Heroku’s free data capacity allowance, we decided to add:</a:t>
             </a:r>
           </a:p>
           <a:p>
             <a:r>
-              <a:rPr lang="en-US" dirty="0"/>
+              <a:rPr lang="en-US" sz="2400" dirty="0"/>
               <a:t>- Table1, Police Region data, renamed as </a:t>
             </a:r>
             <a:r>
-              <a:rPr lang="en-US" dirty="0" err="1"/>
+              <a:rPr lang="en-US" sz="2400" dirty="0" err="1"/>
               <a:t>region_incident</a:t>
             </a:r>
             <a:r>
-              <a:rPr lang="en-US" dirty="0"/>
+              <a:rPr lang="en-US" sz="2400" dirty="0"/>
               <a:t>, data scoped 2019-2022, dropped ‘Total’ rows.</a:t>
             </a:r>
           </a:p>
           <a:p>
             <a:r>
-              <a:rPr lang="en-US" dirty="0"/>
+              <a:rPr lang="en-US" sz="2400" dirty="0"/>
               <a:t>- Table2, Local Government Area offence data, renamed as </a:t>
             </a:r>
             <a:r>
-              <a:rPr lang="en-US" dirty="0" err="1"/>
+              <a:rPr lang="en-US" sz="2400" dirty="0" err="1"/>
               <a:t>lga_offence</a:t>
             </a:r>
             <a:r>
-              <a:rPr lang="en-US" dirty="0"/>
+              <a:rPr lang="en-US" sz="2400" dirty="0"/>
               <a:t>, data scoped 2022.</a:t>
             </a:r>
           </a:p>
           <a:p>
             <a:r>
-              <a:rPr lang="en-US" dirty="0"/>
+              <a:rPr lang="en-US" sz="2400" dirty="0"/>
               <a:t>- Table5, Local Government  Area Charge status data, renamed as </a:t>
             </a:r>
             <a:r>
-              <a:rPr lang="en-US" dirty="0" err="1"/>
+              <a:rPr lang="en-US" sz="2400" dirty="0" err="1"/>
               <a:t>charge_status</a:t>
             </a:r>
             <a:r>
-              <a:rPr lang="en-US" dirty="0"/>
-              <a:t> (offence_summary_df.csv???), data scoped 2019-2022.</a:t>
-            </a:r>
-          </a:p>
-          <a:p>
-            <a:r>
-              <a:rPr lang="en-US" dirty="0"/>
-              <a:t>- Table 6, new add-on to show summary of LGA offences base on offence type, for easier data retrieval and visualization.</a:t>
-            </a:r>
-          </a:p>
-          <a:p>
-            <a:endParaRPr lang="en-US" dirty="0"/>
+              <a:rPr lang="en-US" sz="2400" dirty="0"/>
+              <a:t>, data scoped 2019-2022.</a:t>
+            </a:r>
+          </a:p>
+          <a:p>
+            <a:r>
+              <a:rPr lang="en-US" sz="2400" dirty="0"/>
+              <a:t>- Table 6, new add-on to show summary of LGA offences base on offence type renamed as </a:t>
+            </a:r>
+            <a:r>
+              <a:rPr lang="en-US" sz="2400" dirty="0" err="1"/>
+              <a:t>lga_offence_summary</a:t>
+            </a:r>
+            <a:r>
+              <a:rPr lang="en-US" sz="2400" dirty="0"/>
+              <a:t>, for easier data retrieval and visualization.</a:t>
+            </a:r>
+          </a:p>
+          <a:p>
+            <a:endParaRPr lang="en-US" sz="2400" dirty="0"/>
           </a:p>
           <a:p>
             <a:endParaRPr lang="en-US" dirty="0"/>
@@ -6154,8 +5895,8 @@
         </p:blipFill>
         <p:spPr>
           <a:xfrm>
-            <a:off x="911401" y="824296"/>
-            <a:ext cx="5720862" cy="5393623"/>
+            <a:off x="1018406" y="1108953"/>
+            <a:ext cx="5720862" cy="5367192"/>
           </a:xfrm>
           <a:prstGeom prst="rect">
             <a:avLst/>
@@ -6235,8 +5976,8 @@
         </p:nvSpPr>
         <p:spPr>
           <a:xfrm>
-            <a:off x="8096885" y="652111"/>
-            <a:ext cx="3659246" cy="6314173"/>
+            <a:off x="7978343" y="385011"/>
+            <a:ext cx="3748436" cy="6013313"/>
           </a:xfrm>
         </p:spPr>
         <p:txBody>
@@ -6245,45 +5986,56 @@
           </a:bodyPr>
           <a:lstStyle/>
           <a:p>
+            <a:r>
+              <a:rPr lang="en-US" sz="2000" b="1" dirty="0">
+                <a:solidFill>
+                  <a:srgbClr val="FFFFFF"/>
+                </a:solidFill>
+              </a:rPr>
+              <a:t>Data Exploration</a:t>
+            </a:r>
             <a:br>
-              <a:rPr lang="en-US" sz="2100" b="1" dirty="0">
-                <a:solidFill>
-                  <a:srgbClr val="FFFFFF"/>
-                </a:solidFill>
-              </a:rPr>
-            </a:br>
-            <a:r>
-              <a:rPr lang="en-US" sz="2100" b="1" dirty="0">
-                <a:solidFill>
-                  <a:srgbClr val="FFFFFF"/>
-                </a:solidFill>
-              </a:rPr>
-              <a:t>Data Exploration</a:t>
-            </a:r>
-            <a:br>
-              <a:rPr lang="en-US" sz="2100" b="1" dirty="0">
+              <a:rPr lang="en-US" sz="2000" b="1" dirty="0">
                 <a:solidFill>
                   <a:srgbClr val="FFFFFF"/>
                 </a:solidFill>
               </a:rPr>
             </a:br>
             <a:br>
-              <a:rPr lang="en-US" sz="2100" dirty="0">
+              <a:rPr lang="en-US" sz="2000" dirty="0">
                 <a:solidFill>
                   <a:srgbClr val="FFFFFF"/>
                 </a:solidFill>
               </a:rPr>
             </a:br>
             <a:r>
-              <a:rPr lang="en-US" sz="2100" b="1" dirty="0">
-                <a:solidFill>
-                  <a:srgbClr val="FFFFFF"/>
-                </a:solidFill>
-              </a:rPr>
-              <a:t>In Victoria in high level, we have 4 Police Regions, plus </a:t>
-            </a:r>
-            <a:r>
-              <a:rPr lang="en-US" sz="2100" b="1" i="0" u="none" strike="noStrike" dirty="0">
+              <a:rPr lang="en-US" sz="2000" b="1" dirty="0">
+                <a:solidFill>
+                  <a:srgbClr val="FFFFFF"/>
+                </a:solidFill>
+              </a:rPr>
+              <a:t>In </a:t>
+            </a:r>
+            <a:r>
+              <a:rPr lang="en-US" sz="2000" b="1" dirty="0">
+                <a:solidFill>
+                  <a:srgbClr val="FFFFFF"/>
+                </a:solidFill>
+                <a:latin typeface="Calibri Light" panose="020F0302020204030204" pitchFamily="34" charset="0"/>
+                <a:cs typeface="Calibri Light" panose="020F0302020204030204" pitchFamily="34" charset="0"/>
+              </a:rPr>
+              <a:t>Victoria</a:t>
+            </a:r>
+            <a:r>
+              <a:rPr lang="en-US" sz="2000" b="1" dirty="0">
+                <a:solidFill>
+                  <a:srgbClr val="FFFFFF"/>
+                </a:solidFill>
+              </a:rPr>
+              <a:t> in high level, we have 4 Police Regions, plus </a:t>
+            </a:r>
+            <a:r>
+              <a:rPr lang="en-US" sz="2000" b="1" i="0" u="none" strike="noStrike" dirty="0">
                 <a:solidFill>
                   <a:srgbClr val="FFFFFF"/>
                 </a:solidFill>
@@ -6292,7 +6044,7 @@
               <a:t>Justice Institutions and Immigration Facilities</a:t>
             </a:r>
             <a:r>
-              <a:rPr lang="en-US" sz="2100" b="1" dirty="0">
+              <a:rPr lang="en-US" sz="2000" b="1" dirty="0">
                 <a:solidFill>
                   <a:srgbClr val="FFFFFF"/>
                 </a:solidFill>
@@ -6300,21 +6052,21 @@
               <a:t>  and Unincorporated Vic.</a:t>
             </a:r>
             <a:br>
-              <a:rPr lang="en-US" sz="2100" b="1" dirty="0">
+              <a:rPr lang="en-US" sz="2000" b="1" dirty="0">
                 <a:solidFill>
                   <a:srgbClr val="FFFFFF"/>
                 </a:solidFill>
               </a:rPr>
             </a:br>
             <a:br>
-              <a:rPr lang="en-US" sz="2100" b="1" dirty="0">
+              <a:rPr lang="en-US" sz="2000" b="1" dirty="0">
                 <a:solidFill>
                   <a:srgbClr val="FFFFFF"/>
                 </a:solidFill>
               </a:rPr>
             </a:br>
             <a:r>
-              <a:rPr lang="en-US" sz="2100" b="1" dirty="0">
+              <a:rPr lang="en-US" sz="2000" b="1" dirty="0">
                 <a:solidFill>
                   <a:srgbClr val="FFFFFF"/>
                 </a:solidFill>
@@ -6322,21 +6074,21 @@
               <a:t>Each Police Region has multiple Police Service Area (PSA, total of 54) which provide law and order services to Local Government Area (LGA, total of 79) .</a:t>
             </a:r>
             <a:br>
-              <a:rPr lang="en-US" sz="2100" b="1" dirty="0">
+              <a:rPr lang="en-US" sz="2000" b="1" dirty="0">
                 <a:solidFill>
                   <a:srgbClr val="FFFFFF"/>
                 </a:solidFill>
               </a:rPr>
             </a:br>
             <a:br>
-              <a:rPr lang="en-US" sz="2100" b="1" dirty="0">
+              <a:rPr lang="en-US" sz="2000" b="1" dirty="0">
                 <a:solidFill>
                   <a:srgbClr val="FFFFFF"/>
                 </a:solidFill>
               </a:rPr>
             </a:br>
             <a:r>
-              <a:rPr lang="en-US" sz="2100" b="1" dirty="0">
+              <a:rPr lang="en-US" sz="2000" b="1" dirty="0">
                 <a:solidFill>
                   <a:srgbClr val="FFFFFF"/>
                 </a:solidFill>
@@ -6344,21 +6096,21 @@
               <a:t>Each offence can be break down to division, sub-division and sub-group.</a:t>
             </a:r>
             <a:br>
-              <a:rPr lang="en-US" sz="2100" b="1" dirty="0">
+              <a:rPr lang="en-US" sz="2000" b="1" dirty="0">
                 <a:solidFill>
                   <a:srgbClr val="FFFFFF"/>
                 </a:solidFill>
               </a:rPr>
             </a:br>
             <a:br>
-              <a:rPr lang="en-US" sz="2100" b="1" dirty="0">
+              <a:rPr lang="en-US" sz="2000" b="1" dirty="0">
                 <a:solidFill>
                   <a:srgbClr val="FFFFFF"/>
                 </a:solidFill>
               </a:rPr>
             </a:br>
             <a:r>
-              <a:rPr lang="en-US" sz="2100" b="1" dirty="0">
+              <a:rPr lang="en-US" sz="2000" b="1" dirty="0">
                 <a:solidFill>
                   <a:srgbClr val="FFFFFF"/>
                 </a:solidFill>
@@ -6366,27 +6118,27 @@
               <a:t>Each year the Victoria Crime Statistic data were released in March.</a:t>
             </a:r>
             <a:br>
-              <a:rPr lang="en-US" sz="2100" b="1" dirty="0">
+              <a:rPr lang="en-US" sz="2000" b="1" dirty="0">
                 <a:solidFill>
                   <a:srgbClr val="FFFFFF"/>
                 </a:solidFill>
               </a:rPr>
             </a:br>
             <a:br>
-              <a:rPr lang="en-US" sz="2100" b="1" dirty="0">
+              <a:rPr lang="en-US" sz="2000" b="1" dirty="0">
                 <a:solidFill>
                   <a:srgbClr val="FFFFFF"/>
                 </a:solidFill>
               </a:rPr>
             </a:br>
             <a:br>
-              <a:rPr lang="en-US" sz="2100" b="1" dirty="0">
+              <a:rPr lang="en-US" sz="2000" b="1" dirty="0">
                 <a:solidFill>
                   <a:srgbClr val="FFFFFF"/>
                 </a:solidFill>
               </a:rPr>
             </a:br>
-            <a:endParaRPr lang="en-US" sz="2100" b="1" dirty="0">
+            <a:endParaRPr lang="en-US" sz="2000" b="1" dirty="0">
               <a:solidFill>
                 <a:srgbClr val="FFFFFF"/>
               </a:solidFill>
@@ -6448,6 +6200,46 @@
             <a:schemeClr val="lt1"/>
           </a:fontRef>
         </p:style>
+      </p:sp>
+      <p:sp>
+        <p:nvSpPr>
+          <p:cNvPr id="6" name="TextBox 5">
+            <a:extLst>
+              <a:ext uri="{FF2B5EF4-FFF2-40B4-BE49-F238E27FC236}">
+                <a16:creationId xmlns:a16="http://schemas.microsoft.com/office/drawing/2014/main" id="{8B4A35C2-DCD2-1B3A-9B74-ED159F03F103}"/>
+              </a:ext>
+            </a:extLst>
+          </p:cNvPr>
+          <p:cNvSpPr txBox="1"/>
+          <p:nvPr/>
+        </p:nvSpPr>
+        <p:spPr>
+          <a:xfrm>
+            <a:off x="834571" y="459676"/>
+            <a:ext cx="5887764" cy="584775"/>
+          </a:xfrm>
+          <a:prstGeom prst="rect">
+            <a:avLst/>
+          </a:prstGeom>
+          <a:noFill/>
+        </p:spPr>
+        <p:txBody>
+          <a:bodyPr wrap="square">
+            <a:spAutoFit/>
+          </a:bodyPr>
+          <a:lstStyle/>
+          <a:p>
+            <a:r>
+              <a:rPr lang="en-US" sz="3200" b="1" dirty="0">
+                <a:solidFill>
+                  <a:schemeClr val="accent2"/>
+                </a:solidFill>
+              </a:rPr>
+              <a:t>Entity Relation Diagram</a:t>
+            </a:r>
+            <a:endParaRPr lang="en-US" sz="3200" dirty="0"/>
+          </a:p>
+        </p:txBody>
       </p:sp>
     </p:spTree>
     <p:extLst>
@@ -6487,12 +6279,12 @@
           <a:chExt cx="0" cy="0"/>
         </a:xfrm>
       </p:grpSpPr>
-      <p:sp>
-        <p:nvSpPr>
-          <p:cNvPr id="9" name="Rectangle 8">
+      <p:sp useBgFill="1">
+        <p:nvSpPr>
+          <p:cNvPr id="8" name="Rectangle 7">
             <a:extLst>
               <a:ext uri="{FF2B5EF4-FFF2-40B4-BE49-F238E27FC236}">
-                <a16:creationId xmlns:a16="http://schemas.microsoft.com/office/drawing/2014/main" id="{4E4490D0-3672-446A-AC12-B4830333BDDD}"/>
+                <a16:creationId xmlns:a16="http://schemas.microsoft.com/office/drawing/2014/main" id="{CECF0FC6-D57B-48B6-9036-F4FFD91A4B34}"/>
               </a:ext>
               <a:ext uri="{C183D7F6-B498-43B3-948B-1728B52AA6E4}">
                 <adec:decorative xmlns:adec="http://schemas.microsoft.com/office/drawing/2017/decorative" val="1"/>
@@ -6512,8 +6304,97 @@
         </p:nvSpPr>
         <p:spPr>
           <a:xfrm>
-            <a:off x="3175" y="6400800"/>
-            <a:ext cx="12188825" cy="457200"/>
+            <a:off x="0" y="0"/>
+            <a:ext cx="12186315" cy="6858000"/>
+          </a:xfrm>
+          <a:prstGeom prst="rect">
+            <a:avLst/>
+          </a:prstGeom>
+          <a:ln>
+            <a:noFill/>
+          </a:ln>
+        </p:spPr>
+        <p:style>
+          <a:lnRef idx="2">
+            <a:schemeClr val="accent6">
+              <a:shade val="50000"/>
+            </a:schemeClr>
+          </a:lnRef>
+          <a:fillRef idx="1001">
+            <a:schemeClr val="lt1"/>
+          </a:fillRef>
+          <a:effectRef idx="0">
+            <a:schemeClr val="accent6"/>
+          </a:effectRef>
+          <a:fontRef idx="minor">
+            <a:schemeClr val="lt1"/>
+          </a:fontRef>
+        </p:style>
+        <p:txBody>
+          <a:bodyPr rtlCol="0" anchor="ctr"/>
+          <a:lstStyle/>
+          <a:p>
+            <a:pPr algn="ctr"/>
+            <a:endParaRPr lang="en-US"/>
+          </a:p>
+        </p:txBody>
+      </p:sp>
+      <p:pic>
+        <p:nvPicPr>
+          <p:cNvPr id="14" name="Content Placeholder 13">
+            <a:extLst>
+              <a:ext uri="{FF2B5EF4-FFF2-40B4-BE49-F238E27FC236}">
+                <a16:creationId xmlns:a16="http://schemas.microsoft.com/office/drawing/2014/main" id="{E5C02023-1590-2A54-A625-AAB3B932B077}"/>
+              </a:ext>
+            </a:extLst>
+          </p:cNvPr>
+          <p:cNvPicPr>
+            <a:picLocks noGrp="1" noChangeAspect="1"/>
+          </p:cNvPicPr>
+          <p:nvPr>
+            <p:ph idx="1"/>
+          </p:nvPr>
+        </p:nvPicPr>
+        <p:blipFill>
+          <a:blip r:embed="rId2"/>
+          <a:stretch>
+            <a:fillRect/>
+          </a:stretch>
+        </p:blipFill>
+        <p:spPr>
+          <a:xfrm>
+            <a:off x="449179" y="1818527"/>
+            <a:ext cx="7523820" cy="4321792"/>
+          </a:xfrm>
+        </p:spPr>
+      </p:pic>
+      <p:sp>
+        <p:nvSpPr>
+          <p:cNvPr id="10" name="Rectangle 9">
+            <a:extLst>
+              <a:ext uri="{FF2B5EF4-FFF2-40B4-BE49-F238E27FC236}">
+                <a16:creationId xmlns:a16="http://schemas.microsoft.com/office/drawing/2014/main" id="{717A211C-5863-4303-AC3D-AEBFDF6D6A4C}"/>
+              </a:ext>
+              <a:ext uri="{C183D7F6-B498-43B3-948B-1728B52AA6E4}">
+                <adec:decorative xmlns:adec="http://schemas.microsoft.com/office/drawing/2017/decorative" val="1"/>
+              </a:ext>
+            </a:extLst>
+          </p:cNvPr>
+          <p:cNvSpPr>
+            <a:spLocks noGrp="1" noRot="1" noChangeAspect="1" noMove="1" noResize="1" noEditPoints="1" noAdjustHandles="1" noChangeArrowheads="1" noChangeShapeType="1" noTextEdit="1"/>
+          </p:cNvSpPr>
+          <p:nvPr>
+            <p:extLst>
+              <p:ext uri="{386F3935-93C4-4BCD-93E2-E3B085C9AB24}">
+                <p16:designElem xmlns:p16="http://schemas.microsoft.com/office/powerpoint/2015/main" val="1"/>
+              </p:ext>
+            </p:extLst>
+          </p:nvPr>
+        </p:nvSpPr>
+        <p:spPr>
+          <a:xfrm>
+            <a:off x="8144150" y="0"/>
+            <a:ext cx="4050791" cy="6858000"/>
           </a:xfrm>
           <a:prstGeom prst="rect">
             <a:avLst/>
@@ -6544,10 +6425,10 @@
       </p:sp>
       <p:sp>
         <p:nvSpPr>
-          <p:cNvPr id="11" name="Rectangle 10">
+          <p:cNvPr id="12" name="Rectangle 11">
             <a:extLst>
               <a:ext uri="{FF2B5EF4-FFF2-40B4-BE49-F238E27FC236}">
-                <a16:creationId xmlns:a16="http://schemas.microsoft.com/office/drawing/2014/main" id="{39CB82C2-DF65-4EC1-8280-F201D50F570B}"/>
+                <a16:creationId xmlns:a16="http://schemas.microsoft.com/office/drawing/2014/main" id="{087519CD-2FFF-42E3-BB0C-FEAA828BA5DB}"/>
               </a:ext>
               <a:ext uri="{C183D7F6-B498-43B3-948B-1728B52AA6E4}">
                 <adec:decorative xmlns:adec="http://schemas.microsoft.com/office/drawing/2017/decorative" val="1"/>
@@ -6567,8 +6448,8 @@
         </p:nvSpPr>
         <p:spPr>
           <a:xfrm>
-            <a:off x="15" y="6334316"/>
-            <a:ext cx="12188825" cy="64008"/>
+            <a:off x="8132823" y="0"/>
+            <a:ext cx="64008" cy="6858000"/>
           </a:xfrm>
           <a:prstGeom prst="rect">
             <a:avLst/>
@@ -6597,534 +6478,12 @@
           </a:fontRef>
         </p:style>
       </p:sp>
-      <p:cxnSp>
-        <p:nvCxnSpPr>
-          <p:cNvPr id="13" name="Straight Connector 12">
+      <p:sp>
+        <p:nvSpPr>
+          <p:cNvPr id="5" name="TextBox 4">
             <a:extLst>
               <a:ext uri="{FF2B5EF4-FFF2-40B4-BE49-F238E27FC236}">
-                <a16:creationId xmlns:a16="http://schemas.microsoft.com/office/drawing/2014/main" id="{7E1D4427-852B-4B37-8E76-0E9F1810BA2A}"/>
-              </a:ext>
-              <a:ext uri="{C183D7F6-B498-43B3-948B-1728B52AA6E4}">
-                <adec:decorative xmlns:adec="http://schemas.microsoft.com/office/drawing/2017/decorative" val="1"/>
-              </a:ext>
-            </a:extLst>
-          </p:cNvPr>
-          <p:cNvCxnSpPr>
-            <a:cxnSpLocks noGrp="1" noRot="1" noChangeAspect="1" noMove="1" noResize="1" noEditPoints="1" noAdjustHandles="1" noChangeArrowheads="1" noChangeShapeType="1"/>
-          </p:cNvCxnSpPr>
-          <p:nvPr>
-            <p:extLst>
-              <p:ext uri="{386F3935-93C4-4BCD-93E2-E3B085C9AB24}">
-                <p16:designElem xmlns:p16="http://schemas.microsoft.com/office/powerpoint/2015/main" val="1"/>
-              </p:ext>
-            </p:extLst>
-          </p:nvPr>
-        </p:nvCxnSpPr>
-        <p:spPr>
-          <a:xfrm>
-            <a:off x="1207658" y="4343400"/>
-            <a:ext cx="9875520" cy="0"/>
-          </a:xfrm>
-          <a:prstGeom prst="line">
-            <a:avLst/>
-          </a:prstGeom>
-          <a:ln w="6350">
-            <a:solidFill>
-              <a:schemeClr val="tx1">
-                <a:lumMod val="50000"/>
-                <a:lumOff val="50000"/>
-              </a:schemeClr>
-            </a:solidFill>
-          </a:ln>
-        </p:spPr>
-        <p:style>
-          <a:lnRef idx="1">
-            <a:schemeClr val="accent1"/>
-          </a:lnRef>
-          <a:fillRef idx="0">
-            <a:schemeClr val="accent1"/>
-          </a:fillRef>
-          <a:effectRef idx="0">
-            <a:schemeClr val="accent1"/>
-          </a:effectRef>
-          <a:fontRef idx="minor">
-            <a:schemeClr val="tx1"/>
-          </a:fontRef>
-        </p:style>
-      </p:cxnSp>
-      <p:sp useBgFill="1">
-        <p:nvSpPr>
-          <p:cNvPr id="15" name="Rectangle 14">
-            <a:extLst>
-              <a:ext uri="{FF2B5EF4-FFF2-40B4-BE49-F238E27FC236}">
-                <a16:creationId xmlns:a16="http://schemas.microsoft.com/office/drawing/2014/main" id="{5A1B47C8-47A0-4A88-8830-6DEA3B5DE392}"/>
-              </a:ext>
-              <a:ext uri="{C183D7F6-B498-43B3-948B-1728B52AA6E4}">
-                <adec:decorative xmlns:adec="http://schemas.microsoft.com/office/drawing/2017/decorative" val="1"/>
-              </a:ext>
-            </a:extLst>
-          </p:cNvPr>
-          <p:cNvSpPr>
-            <a:spLocks noGrp="1" noRot="1" noChangeAspect="1" noMove="1" noResize="1" noEditPoints="1" noAdjustHandles="1" noChangeArrowheads="1" noChangeShapeType="1" noTextEdit="1"/>
-          </p:cNvSpPr>
-          <p:nvPr>
-            <p:extLst>
-              <p:ext uri="{386F3935-93C4-4BCD-93E2-E3B085C9AB24}">
-                <p16:designElem xmlns:p16="http://schemas.microsoft.com/office/powerpoint/2015/main" val="1"/>
-              </p:ext>
-            </p:extLst>
-          </p:nvPr>
-        </p:nvSpPr>
-        <p:spPr>
-          <a:xfrm>
-            <a:off x="0" y="0"/>
-            <a:ext cx="12192000" cy="6858000"/>
-          </a:xfrm>
-          <a:prstGeom prst="rect">
-            <a:avLst/>
-          </a:prstGeom>
-          <a:ln>
-            <a:noFill/>
-          </a:ln>
-        </p:spPr>
-        <p:style>
-          <a:lnRef idx="2">
-            <a:schemeClr val="accent1">
-              <a:shade val="50000"/>
-            </a:schemeClr>
-          </a:lnRef>
-          <a:fillRef idx="1001">
-            <a:schemeClr val="lt1"/>
-          </a:fillRef>
-          <a:effectRef idx="0">
-            <a:schemeClr val="accent1"/>
-          </a:effectRef>
-          <a:fontRef idx="minor">
-            <a:schemeClr val="lt1"/>
-          </a:fontRef>
-        </p:style>
-        <p:txBody>
-          <a:bodyPr rtlCol="0" anchor="ctr"/>
-          <a:lstStyle/>
-          <a:p>
-            <a:pPr marL="0" marR="0" lvl="0" indent="0" algn="ctr" defTabSz="457200" rtl="0" eaLnBrk="1" fontAlgn="auto" latinLnBrk="0" hangingPunct="1">
-              <a:lnSpc>
-                <a:spcPct val="100000"/>
-              </a:lnSpc>
-              <a:spcBef>
-                <a:spcPts val="0"/>
-              </a:spcBef>
-              <a:spcAft>
-                <a:spcPts val="0"/>
-              </a:spcAft>
-              <a:buClrTx/>
-              <a:buSzTx/>
-              <a:buFontTx/>
-              <a:buNone/>
-              <a:tabLst/>
-              <a:defRPr/>
-            </a:pPr>
-            <a:endParaRPr kumimoji="0" lang="en-US" sz="1800" b="0" i="0" u="none" strike="noStrike" kern="1200" cap="none" spc="0" normalizeH="0" baseline="0" noProof="0">
-              <a:ln>
-                <a:noFill/>
-              </a:ln>
-              <a:solidFill>
-                <a:prstClr val="white"/>
-              </a:solidFill>
-              <a:effectLst/>
-              <a:uLnTx/>
-              <a:uFillTx/>
-              <a:latin typeface="Calibri" panose="020F0502020204030204"/>
-              <a:ea typeface="+mn-ea"/>
-              <a:cs typeface="+mn-cs"/>
-            </a:endParaRPr>
-          </a:p>
-        </p:txBody>
-      </p:sp>
-      <p:sp>
-        <p:nvSpPr>
-          <p:cNvPr id="17" name="Rectangle 16">
-            <a:extLst>
-              <a:ext uri="{FF2B5EF4-FFF2-40B4-BE49-F238E27FC236}">
-                <a16:creationId xmlns:a16="http://schemas.microsoft.com/office/drawing/2014/main" id="{984BBFDD-E720-4805-A9C8-129FBBF6DD70}"/>
-              </a:ext>
-              <a:ext uri="{C183D7F6-B498-43B3-948B-1728B52AA6E4}">
-                <adec:decorative xmlns:adec="http://schemas.microsoft.com/office/drawing/2017/decorative" val="1"/>
-              </a:ext>
-            </a:extLst>
-          </p:cNvPr>
-          <p:cNvSpPr>
-            <a:spLocks noGrp="1" noRot="1" noChangeAspect="1" noMove="1" noResize="1" noEditPoints="1" noAdjustHandles="1" noChangeArrowheads="1" noChangeShapeType="1" noTextEdit="1"/>
-          </p:cNvSpPr>
-          <p:nvPr>
-            <p:extLst>
-              <p:ext uri="{386F3935-93C4-4BCD-93E2-E3B085C9AB24}">
-                <p16:designElem xmlns:p16="http://schemas.microsoft.com/office/powerpoint/2015/main" val="1"/>
-              </p:ext>
-            </p:extLst>
-          </p:nvPr>
-        </p:nvSpPr>
-        <p:spPr bwMode="white">
-          <a:xfrm>
-            <a:off x="7613486" y="0"/>
-            <a:ext cx="4584734" cy="6858000"/>
-          </a:xfrm>
-          <a:prstGeom prst="rect">
-            <a:avLst/>
-          </a:prstGeom>
-          <a:solidFill>
-            <a:schemeClr val="accent2"/>
-          </a:solidFill>
-          <a:ln>
-            <a:noFill/>
-          </a:ln>
-        </p:spPr>
-        <p:style>
-          <a:lnRef idx="2">
-            <a:schemeClr val="accent1">
-              <a:shade val="50000"/>
-            </a:schemeClr>
-          </a:lnRef>
-          <a:fillRef idx="1">
-            <a:schemeClr val="accent1"/>
-          </a:fillRef>
-          <a:effectRef idx="0">
-            <a:schemeClr val="accent1"/>
-          </a:effectRef>
-          <a:fontRef idx="minor">
-            <a:schemeClr val="lt1"/>
-          </a:fontRef>
-        </p:style>
-      </p:sp>
-      <p:sp>
-        <p:nvSpPr>
-          <p:cNvPr id="2" name="Title 1">
-            <a:extLst>
-              <a:ext uri="{FF2B5EF4-FFF2-40B4-BE49-F238E27FC236}">
-                <a16:creationId xmlns:a16="http://schemas.microsoft.com/office/drawing/2014/main" id="{75A5A951-1B12-FC62-4875-59A74BDA964F}"/>
-              </a:ext>
-            </a:extLst>
-          </p:cNvPr>
-          <p:cNvSpPr>
-            <a:spLocks noGrp="1"/>
-          </p:cNvSpPr>
-          <p:nvPr>
-            <p:ph type="title"/>
-          </p:nvPr>
-        </p:nvSpPr>
-        <p:spPr>
-          <a:xfrm>
-            <a:off x="7829962" y="369869"/>
-            <a:ext cx="4294598" cy="6626832"/>
-          </a:xfrm>
-        </p:spPr>
-        <p:txBody>
-          <a:bodyPr vert="horz" lIns="91440" tIns="45720" rIns="91440" bIns="45720" rtlCol="0" anchor="b">
-            <a:noAutofit/>
-          </a:bodyPr>
-          <a:lstStyle/>
-          <a:p>
-            <a:br>
-              <a:rPr lang="en-US" sz="2100" b="1" dirty="0">
-                <a:solidFill>
-                  <a:srgbClr val="FFFFFF"/>
-                </a:solidFill>
-              </a:rPr>
-            </a:br>
-            <a:r>
-              <a:rPr lang="en-US" sz="2000" b="1" dirty="0">
-                <a:solidFill>
-                  <a:srgbClr val="FFFFFF"/>
-                </a:solidFill>
-              </a:rPr>
-              <a:t>Data  Analysis</a:t>
-            </a:r>
-            <a:br>
-              <a:rPr lang="en-US" sz="2000" b="1" dirty="0">
-                <a:solidFill>
-                  <a:srgbClr val="FFFFFF"/>
-                </a:solidFill>
-              </a:rPr>
-            </a:br>
-            <a:br>
-              <a:rPr lang="en-US" sz="2000" dirty="0">
-                <a:solidFill>
-                  <a:srgbClr val="FFFFFF"/>
-                </a:solidFill>
-              </a:rPr>
-            </a:br>
-            <a:r>
-              <a:rPr lang="en-US" sz="2000" dirty="0">
-                <a:solidFill>
-                  <a:srgbClr val="FFFFFF"/>
-                </a:solidFill>
-              </a:rPr>
-              <a:t>In 2022, Melbourne had the highest number of offences; next to it were </a:t>
-            </a:r>
-            <a:r>
-              <a:rPr lang="en-US" sz="2000" dirty="0" err="1">
-                <a:solidFill>
-                  <a:srgbClr val="FFFFFF"/>
-                </a:solidFill>
-              </a:rPr>
-              <a:t>Brimbank</a:t>
-            </a:r>
-            <a:r>
-              <a:rPr lang="en-US" sz="2000" dirty="0">
-                <a:solidFill>
-                  <a:srgbClr val="FFFFFF"/>
-                </a:solidFill>
-              </a:rPr>
-              <a:t> and Wyndham, though they had almost half of the number of crimes in </a:t>
-            </a:r>
-            <a:r>
-              <a:rPr lang="en-US" sz="2000" dirty="0" err="1">
-                <a:solidFill>
-                  <a:srgbClr val="FFFFFF"/>
-                </a:solidFill>
-              </a:rPr>
-              <a:t>Melbournce</a:t>
-            </a:r>
-            <a:r>
-              <a:rPr lang="en-US" sz="2000" dirty="0">
-                <a:solidFill>
-                  <a:srgbClr val="FFFFFF"/>
-                </a:solidFill>
-              </a:rPr>
-              <a:t>.</a:t>
-            </a:r>
-            <a:br>
-              <a:rPr lang="en-US" sz="2000" dirty="0">
-                <a:solidFill>
-                  <a:srgbClr val="FFFFFF"/>
-                </a:solidFill>
-              </a:rPr>
-            </a:br>
-            <a:br>
-              <a:rPr lang="en-US" sz="2000" dirty="0">
-                <a:solidFill>
-                  <a:srgbClr val="FFFFFF"/>
-                </a:solidFill>
-              </a:rPr>
-            </a:br>
-            <a:r>
-              <a:rPr lang="en-US" sz="2000" dirty="0">
-                <a:solidFill>
-                  <a:srgbClr val="FFFFFF"/>
-                </a:solidFill>
-              </a:rPr>
-              <a:t>The LGAs are under government of Police Region ‘1 North West Metro’ that has 14 LGAs.</a:t>
-            </a:r>
-            <a:br>
-              <a:rPr lang="en-US" sz="2000" b="1" dirty="0">
-                <a:solidFill>
-                  <a:srgbClr val="FFFFFF"/>
-                </a:solidFill>
-              </a:rPr>
-            </a:br>
-            <a:br>
-              <a:rPr lang="en-US" sz="2000" b="1" dirty="0">
-                <a:solidFill>
-                  <a:srgbClr val="FFFFFF"/>
-                </a:solidFill>
-              </a:rPr>
-            </a:br>
-            <a:r>
-              <a:rPr lang="en-US" sz="2000" b="1" dirty="0">
-                <a:solidFill>
-                  <a:srgbClr val="FFFFFF"/>
-                </a:solidFill>
-              </a:rPr>
-              <a:t>Technical  background</a:t>
-            </a:r>
-            <a:br>
-              <a:rPr lang="en-US" sz="2000" b="1" dirty="0">
-                <a:solidFill>
-                  <a:srgbClr val="FFFFFF"/>
-                </a:solidFill>
-              </a:rPr>
-            </a:br>
-            <a:br>
-              <a:rPr lang="en-US" sz="2000" b="1" dirty="0">
-                <a:solidFill>
-                  <a:srgbClr val="FFFFFF"/>
-                </a:solidFill>
-              </a:rPr>
-            </a:br>
-            <a:r>
-              <a:rPr lang="en-US" sz="2000" dirty="0">
-                <a:solidFill>
-                  <a:srgbClr val="FFFFFF"/>
-                </a:solidFill>
-              </a:rPr>
-              <a:t>This bar chart was created using chart </a:t>
-            </a:r>
-            <a:r>
-              <a:rPr lang="en-US" sz="2000" dirty="0" err="1">
-                <a:solidFill>
-                  <a:srgbClr val="FFFFFF"/>
-                </a:solidFill>
-              </a:rPr>
-              <a:t>js</a:t>
-            </a:r>
-            <a:r>
-              <a:rPr lang="en-US" sz="2000" dirty="0">
-                <a:solidFill>
-                  <a:srgbClr val="FFFFFF"/>
-                </a:solidFill>
-              </a:rPr>
-              <a:t>, one of the </a:t>
-            </a:r>
-            <a:r>
-              <a:rPr lang="en-US" sz="2000" dirty="0" err="1">
-                <a:solidFill>
-                  <a:srgbClr val="FFFFFF"/>
-                </a:solidFill>
-              </a:rPr>
-              <a:t>javascript</a:t>
-            </a:r>
-            <a:r>
-              <a:rPr lang="en-US" sz="2000" dirty="0">
-                <a:solidFill>
-                  <a:srgbClr val="FFFFFF"/>
-                </a:solidFill>
-              </a:rPr>
-              <a:t> library. </a:t>
-            </a:r>
-            <a:br>
-              <a:rPr lang="en-US" sz="2000" dirty="0">
-                <a:solidFill>
-                  <a:srgbClr val="FFFFFF"/>
-                </a:solidFill>
-              </a:rPr>
-            </a:br>
-            <a:br>
-              <a:rPr lang="en-US" sz="2000" dirty="0">
-                <a:solidFill>
-                  <a:srgbClr val="FFFFFF"/>
-                </a:solidFill>
-              </a:rPr>
-            </a:br>
-            <a:r>
-              <a:rPr lang="en-US" sz="2000" dirty="0">
-                <a:solidFill>
-                  <a:srgbClr val="FFFFFF"/>
-                </a:solidFill>
-              </a:rPr>
-              <a:t>When the chart first load, it has delay animation effect.</a:t>
-            </a:r>
-            <a:br>
-              <a:rPr lang="en-US" sz="2000" dirty="0">
-                <a:solidFill>
-                  <a:srgbClr val="FFFFFF"/>
-                </a:solidFill>
-              </a:rPr>
-            </a:br>
-            <a:br>
-              <a:rPr lang="en-US" sz="2000" dirty="0">
-                <a:solidFill>
-                  <a:srgbClr val="FFFFFF"/>
-                </a:solidFill>
-              </a:rPr>
-            </a:br>
-            <a:r>
-              <a:rPr lang="en-US" sz="2000" dirty="0">
-                <a:solidFill>
-                  <a:srgbClr val="FFFFFF"/>
-                </a:solidFill>
-              </a:rPr>
-              <a:t>Upon clicking on the label ‘Local Government Offence’ will toggle hide or show the chart.  </a:t>
-            </a:r>
-            <a:br>
-              <a:rPr lang="en-US" sz="2000" dirty="0">
-                <a:solidFill>
-                  <a:srgbClr val="FFFFFF"/>
-                </a:solidFill>
-              </a:rPr>
-            </a:br>
-            <a:br>
-              <a:rPr lang="en-US" sz="2000" dirty="0">
-                <a:solidFill>
-                  <a:srgbClr val="FFFFFF"/>
-                </a:solidFill>
-              </a:rPr>
-            </a:br>
-            <a:br>
-              <a:rPr lang="en-US" sz="2100" dirty="0">
-                <a:solidFill>
-                  <a:srgbClr val="FFFFFF"/>
-                </a:solidFill>
-              </a:rPr>
-            </a:br>
-            <a:endParaRPr lang="en-US" sz="2100" dirty="0">
-              <a:solidFill>
-                <a:srgbClr val="FFFFFF"/>
-              </a:solidFill>
-            </a:endParaRPr>
-          </a:p>
-        </p:txBody>
-      </p:sp>
-      <p:sp>
-        <p:nvSpPr>
-          <p:cNvPr id="19" name="Rectangle 18">
-            <a:extLst>
-              <a:ext uri="{FF2B5EF4-FFF2-40B4-BE49-F238E27FC236}">
-                <a16:creationId xmlns:a16="http://schemas.microsoft.com/office/drawing/2014/main" id="{5AC4BE46-4A77-42FE-9D15-065CDB2F847C}"/>
-              </a:ext>
-              <a:ext uri="{C183D7F6-B498-43B3-948B-1728B52AA6E4}">
-                <adec:decorative xmlns:adec="http://schemas.microsoft.com/office/drawing/2017/decorative" val="1"/>
-              </a:ext>
-            </a:extLst>
-          </p:cNvPr>
-          <p:cNvSpPr>
-            <a:spLocks noGrp="1" noRot="1" noChangeAspect="1" noMove="1" noResize="1" noEditPoints="1" noAdjustHandles="1" noChangeArrowheads="1" noChangeShapeType="1" noTextEdit="1"/>
-          </p:cNvSpPr>
-          <p:nvPr>
-            <p:extLst>
-              <p:ext uri="{386F3935-93C4-4BCD-93E2-E3B085C9AB24}">
-                <p16:designElem xmlns:p16="http://schemas.microsoft.com/office/powerpoint/2015/main" val="1"/>
-              </p:ext>
-            </p:extLst>
-          </p:nvPr>
-        </p:nvSpPr>
-        <p:spPr>
-          <a:xfrm>
-            <a:off x="7556906" y="0"/>
-            <a:ext cx="64008" cy="6858000"/>
-          </a:xfrm>
-          <a:prstGeom prst="rect">
-            <a:avLst/>
-          </a:prstGeom>
-          <a:solidFill>
-            <a:schemeClr val="accent1"/>
-          </a:solidFill>
-          <a:ln>
-            <a:noFill/>
-          </a:ln>
-        </p:spPr>
-        <p:style>
-          <a:lnRef idx="2">
-            <a:schemeClr val="accent1">
-              <a:shade val="50000"/>
-            </a:schemeClr>
-          </a:lnRef>
-          <a:fillRef idx="1">
-            <a:schemeClr val="accent1"/>
-          </a:fillRef>
-          <a:effectRef idx="0">
-            <a:schemeClr val="accent1"/>
-          </a:effectRef>
-          <a:fontRef idx="minor">
-            <a:schemeClr val="lt1"/>
-          </a:fontRef>
-        </p:style>
-      </p:sp>
-      <p:sp>
-        <p:nvSpPr>
-          <p:cNvPr id="7" name="TextBox 6">
-            <a:extLst>
-              <a:ext uri="{FF2B5EF4-FFF2-40B4-BE49-F238E27FC236}">
-                <a16:creationId xmlns:a16="http://schemas.microsoft.com/office/drawing/2014/main" id="{BBD6697D-2431-035B-A37E-0089CFBE1ECA}"/>
+                <a16:creationId xmlns:a16="http://schemas.microsoft.com/office/drawing/2014/main" id="{AF7185DB-5601-695A-D4AB-4293210CE9A9}"/>
               </a:ext>
             </a:extLst>
           </p:cNvPr>
@@ -7133,8 +6492,8 @@
         </p:nvSpPr>
         <p:spPr>
           <a:xfrm>
-            <a:off x="626724" y="1006886"/>
-            <a:ext cx="6316243" cy="1077218"/>
+            <a:off x="8356655" y="481264"/>
+            <a:ext cx="3731071" cy="6771084"/>
           </a:xfrm>
           <a:prstGeom prst="rect">
             <a:avLst/>
@@ -7148,70 +6507,484 @@
           <a:lstStyle/>
           <a:p>
             <a:r>
-              <a:rPr lang="en-US" sz="3200" dirty="0">
-                <a:solidFill>
-                  <a:schemeClr val="accent2"/>
-                </a:solidFill>
-              </a:rPr>
-              <a:t>Local Government Area Offences base on Police Region</a:t>
-            </a:r>
-            <a:endParaRPr lang="en-US" sz="3200" dirty="0"/>
+              <a:rPr kumimoji="0" lang="en-US" b="1" i="0" u="none" strike="noStrike" kern="1200" cap="none" spc="-50" normalizeH="0" baseline="0" noProof="0" dirty="0">
+                <a:ln>
+                  <a:noFill/>
+                </a:ln>
+                <a:solidFill>
+                  <a:srgbClr val="FFFFFF"/>
+                </a:solidFill>
+                <a:effectLst/>
+                <a:uLnTx/>
+                <a:uFillTx/>
+                <a:latin typeface="+mj-lt"/>
+                <a:ea typeface="+mj-ea"/>
+                <a:cs typeface="+mj-cs"/>
+              </a:rPr>
+              <a:t>Data  Analysis</a:t>
+            </a:r>
+            <a:br>
+              <a:rPr kumimoji="0" lang="en-US" b="1" i="0" u="none" strike="noStrike" kern="1200" cap="none" spc="-50" normalizeH="0" baseline="0" noProof="0" dirty="0">
+                <a:ln>
+                  <a:noFill/>
+                </a:ln>
+                <a:solidFill>
+                  <a:srgbClr val="FFFFFF"/>
+                </a:solidFill>
+                <a:effectLst/>
+                <a:uLnTx/>
+                <a:uFillTx/>
+                <a:latin typeface="+mj-lt"/>
+                <a:ea typeface="+mj-ea"/>
+                <a:cs typeface="+mj-cs"/>
+              </a:rPr>
+            </a:br>
+            <a:br>
+              <a:rPr kumimoji="0" lang="en-US" b="1" i="0" u="none" strike="noStrike" kern="1200" cap="none" spc="-50" normalizeH="0" baseline="0" noProof="0" dirty="0">
+                <a:ln>
+                  <a:noFill/>
+                </a:ln>
+                <a:solidFill>
+                  <a:srgbClr val="FFFFFF"/>
+                </a:solidFill>
+                <a:effectLst/>
+                <a:uLnTx/>
+                <a:uFillTx/>
+                <a:latin typeface="+mj-lt"/>
+                <a:ea typeface="+mj-ea"/>
+                <a:cs typeface="+mj-cs"/>
+              </a:rPr>
+            </a:br>
+            <a:r>
+              <a:rPr kumimoji="0" lang="en-US" b="1" i="0" u="none" strike="noStrike" kern="1200" cap="none" spc="-50" normalizeH="0" baseline="0" noProof="0" dirty="0">
+                <a:ln>
+                  <a:noFill/>
+                </a:ln>
+                <a:solidFill>
+                  <a:srgbClr val="FFFFFF"/>
+                </a:solidFill>
+                <a:effectLst/>
+                <a:uLnTx/>
+                <a:uFillTx/>
+                <a:latin typeface="+mj-lt"/>
+                <a:ea typeface="+mj-ea"/>
+                <a:cs typeface="+mj-cs"/>
+              </a:rPr>
+              <a:t>This line chart shows 4 years of Victoria’s offence data.  2020 had the highest counts, follow to it was 2021 and 2019.  The number of offences are lowest in 2022</a:t>
+            </a:r>
+            <a:r>
+              <a:rPr lang="en-US" b="1" spc="-50" dirty="0">
+                <a:solidFill>
+                  <a:srgbClr val="FFFFFF"/>
+                </a:solidFill>
+                <a:latin typeface="+mj-lt"/>
+                <a:ea typeface="+mj-ea"/>
+                <a:cs typeface="+mj-cs"/>
+              </a:rPr>
+              <a:t>.</a:t>
+            </a:r>
+          </a:p>
+          <a:p>
+            <a:br>
+              <a:rPr kumimoji="0" lang="en-US" b="1" i="0" u="none" strike="noStrike" kern="1200" cap="none" spc="-50" normalizeH="0" baseline="0" noProof="0" dirty="0">
+                <a:ln>
+                  <a:noFill/>
+                </a:ln>
+                <a:solidFill>
+                  <a:srgbClr val="FFFFFF"/>
+                </a:solidFill>
+                <a:effectLst/>
+                <a:uLnTx/>
+                <a:uFillTx/>
+                <a:latin typeface="+mj-lt"/>
+                <a:ea typeface="+mj-ea"/>
+                <a:cs typeface="+mj-cs"/>
+              </a:rPr>
+            </a:br>
+            <a:r>
+              <a:rPr kumimoji="0" lang="en-US" b="1" i="0" u="none" strike="noStrike" kern="1200" cap="none" spc="-50" normalizeH="0" baseline="0" noProof="0" dirty="0">
+                <a:ln>
+                  <a:noFill/>
+                </a:ln>
+                <a:solidFill>
+                  <a:srgbClr val="FFFFFF"/>
+                </a:solidFill>
+                <a:effectLst/>
+                <a:uLnTx/>
+                <a:uFillTx/>
+                <a:latin typeface="+mj-lt"/>
+                <a:ea typeface="+mj-ea"/>
+                <a:cs typeface="+mj-cs"/>
+              </a:rPr>
+              <a:t>Technical  background</a:t>
+            </a:r>
+            <a:br>
+              <a:rPr kumimoji="0" lang="en-US" b="1" i="0" u="none" strike="noStrike" kern="1200" cap="none" spc="-50" normalizeH="0" baseline="0" noProof="0" dirty="0">
+                <a:ln>
+                  <a:noFill/>
+                </a:ln>
+                <a:solidFill>
+                  <a:srgbClr val="FFFFFF"/>
+                </a:solidFill>
+                <a:effectLst/>
+                <a:uLnTx/>
+                <a:uFillTx/>
+                <a:latin typeface="+mj-lt"/>
+                <a:ea typeface="+mj-ea"/>
+                <a:cs typeface="+mj-cs"/>
+              </a:rPr>
+            </a:br>
+            <a:br>
+              <a:rPr kumimoji="0" lang="en-US" b="1" i="0" u="none" strike="noStrike" kern="1200" cap="none" spc="-50" normalizeH="0" baseline="0" noProof="0" dirty="0">
+                <a:ln>
+                  <a:noFill/>
+                </a:ln>
+                <a:solidFill>
+                  <a:srgbClr val="FFFFFF"/>
+                </a:solidFill>
+                <a:effectLst/>
+                <a:uLnTx/>
+                <a:uFillTx/>
+                <a:latin typeface="+mj-lt"/>
+                <a:ea typeface="+mj-ea"/>
+                <a:cs typeface="+mj-cs"/>
+              </a:rPr>
+            </a:br>
+            <a:r>
+              <a:rPr kumimoji="0" lang="en-US" b="1" i="0" u="none" strike="noStrike" kern="1200" cap="none" spc="-50" normalizeH="0" baseline="0" noProof="0" dirty="0">
+                <a:ln>
+                  <a:noFill/>
+                </a:ln>
+                <a:solidFill>
+                  <a:srgbClr val="FFFFFF"/>
+                </a:solidFill>
+                <a:effectLst/>
+                <a:uLnTx/>
+                <a:uFillTx/>
+                <a:latin typeface="+mj-lt"/>
+                <a:ea typeface="+mj-ea"/>
+                <a:cs typeface="+mj-cs"/>
+              </a:rPr>
+              <a:t>This </a:t>
+            </a:r>
+            <a:r>
+              <a:rPr lang="en-US" b="1" spc="-50" dirty="0">
+                <a:solidFill>
+                  <a:srgbClr val="FFFFFF"/>
+                </a:solidFill>
+                <a:latin typeface="+mj-lt"/>
+                <a:ea typeface="+mj-ea"/>
+                <a:cs typeface="+mj-cs"/>
+              </a:rPr>
+              <a:t>line</a:t>
+            </a:r>
+            <a:r>
+              <a:rPr kumimoji="0" lang="en-US" b="1" i="0" u="none" strike="noStrike" kern="1200" cap="none" spc="-50" normalizeH="0" baseline="0" noProof="0" dirty="0">
+                <a:ln>
+                  <a:noFill/>
+                </a:ln>
+                <a:solidFill>
+                  <a:srgbClr val="FFFFFF"/>
+                </a:solidFill>
+                <a:effectLst/>
+                <a:uLnTx/>
+                <a:uFillTx/>
+                <a:latin typeface="+mj-lt"/>
+                <a:ea typeface="+mj-ea"/>
+                <a:cs typeface="+mj-cs"/>
+              </a:rPr>
+              <a:t> chart was created using </a:t>
+            </a:r>
+            <a:r>
+              <a:rPr lang="en-US" b="1" spc="-50" dirty="0">
+                <a:solidFill>
+                  <a:srgbClr val="FFFFFF"/>
+                </a:solidFill>
+                <a:latin typeface="+mj-lt"/>
+                <a:ea typeface="+mj-ea"/>
+                <a:cs typeface="+mj-cs"/>
+              </a:rPr>
+              <a:t> </a:t>
+            </a:r>
+            <a:r>
+              <a:rPr lang="en-US" b="1" spc="-50" dirty="0" err="1">
+                <a:solidFill>
+                  <a:srgbClr val="FFFFFF"/>
+                </a:solidFill>
+                <a:latin typeface="+mj-lt"/>
+                <a:ea typeface="+mj-ea"/>
+                <a:cs typeface="+mj-cs"/>
+              </a:rPr>
+              <a:t>chartjs</a:t>
+            </a:r>
+            <a:r>
+              <a:rPr kumimoji="0" lang="en-US" b="1" i="0" u="none" strike="noStrike" kern="1200" cap="none" spc="-50" normalizeH="0" baseline="0" noProof="0" dirty="0">
+                <a:ln>
+                  <a:noFill/>
+                </a:ln>
+                <a:solidFill>
+                  <a:srgbClr val="FFFFFF"/>
+                </a:solidFill>
+                <a:effectLst/>
+                <a:uLnTx/>
+                <a:uFillTx/>
+                <a:latin typeface="+mj-lt"/>
+                <a:ea typeface="+mj-ea"/>
+                <a:cs typeface="+mj-cs"/>
+              </a:rPr>
+              <a:t>, one of </a:t>
+            </a:r>
+            <a:r>
+              <a:rPr kumimoji="0" lang="en-US" b="1" i="0" u="none" strike="noStrike" kern="1200" cap="none" spc="-50" normalizeH="0" baseline="0" noProof="0" dirty="0" err="1">
+                <a:ln>
+                  <a:noFill/>
+                </a:ln>
+                <a:solidFill>
+                  <a:srgbClr val="FFFFFF"/>
+                </a:solidFill>
+                <a:effectLst/>
+                <a:uLnTx/>
+                <a:uFillTx/>
+                <a:latin typeface="+mj-lt"/>
+                <a:ea typeface="+mj-ea"/>
+                <a:cs typeface="+mj-cs"/>
+              </a:rPr>
+              <a:t>javascript’s</a:t>
+            </a:r>
+            <a:r>
+              <a:rPr kumimoji="0" lang="en-US" b="1" i="0" u="none" strike="noStrike" kern="1200" cap="none" spc="-50" normalizeH="0" baseline="0" noProof="0" dirty="0">
+                <a:ln>
+                  <a:noFill/>
+                </a:ln>
+                <a:solidFill>
+                  <a:srgbClr val="FFFFFF"/>
+                </a:solidFill>
+                <a:effectLst/>
+                <a:uLnTx/>
+                <a:uFillTx/>
+                <a:latin typeface="+mj-lt"/>
+                <a:ea typeface="+mj-ea"/>
+                <a:cs typeface="+mj-cs"/>
+              </a:rPr>
+              <a:t> libraries. </a:t>
+            </a:r>
+            <a:br>
+              <a:rPr kumimoji="0" lang="en-US" b="1" i="0" u="none" strike="noStrike" kern="1200" cap="none" spc="-50" normalizeH="0" baseline="0" noProof="0" dirty="0">
+                <a:ln>
+                  <a:noFill/>
+                </a:ln>
+                <a:solidFill>
+                  <a:srgbClr val="FFFFFF"/>
+                </a:solidFill>
+                <a:effectLst/>
+                <a:uLnTx/>
+                <a:uFillTx/>
+                <a:latin typeface="+mj-lt"/>
+                <a:ea typeface="+mj-ea"/>
+                <a:cs typeface="+mj-cs"/>
+              </a:rPr>
+            </a:br>
+            <a:br>
+              <a:rPr kumimoji="0" lang="en-US" b="1" i="0" u="none" strike="noStrike" kern="1200" cap="none" spc="-50" normalizeH="0" baseline="0" noProof="0" dirty="0">
+                <a:ln>
+                  <a:noFill/>
+                </a:ln>
+                <a:solidFill>
+                  <a:srgbClr val="FFFFFF"/>
+                </a:solidFill>
+                <a:effectLst/>
+                <a:uLnTx/>
+                <a:uFillTx/>
+                <a:latin typeface="+mj-lt"/>
+                <a:ea typeface="+mj-ea"/>
+                <a:cs typeface="+mj-cs"/>
+              </a:rPr>
+            </a:br>
+            <a:r>
+              <a:rPr kumimoji="0" lang="en-US" b="1" i="0" u="none" strike="noStrike" kern="1200" cap="none" spc="-50" normalizeH="0" baseline="0" noProof="0" dirty="0">
+                <a:ln>
+                  <a:noFill/>
+                </a:ln>
+                <a:solidFill>
+                  <a:srgbClr val="FFFFFF"/>
+                </a:solidFill>
+                <a:effectLst/>
+                <a:uLnTx/>
+                <a:uFillTx/>
+                <a:latin typeface="+mj-lt"/>
+                <a:ea typeface="+mj-ea"/>
+                <a:cs typeface="+mj-cs"/>
+              </a:rPr>
+              <a:t>When the chart first load, tension setting will the line soften, it has delay animation effect.</a:t>
+            </a:r>
+            <a:br>
+              <a:rPr kumimoji="0" lang="en-US" b="1" i="0" u="none" strike="noStrike" kern="1200" cap="none" spc="-50" normalizeH="0" baseline="0" noProof="0" dirty="0">
+                <a:ln>
+                  <a:noFill/>
+                </a:ln>
+                <a:solidFill>
+                  <a:srgbClr val="FFFFFF"/>
+                </a:solidFill>
+                <a:effectLst/>
+                <a:uLnTx/>
+                <a:uFillTx/>
+                <a:latin typeface="+mj-lt"/>
+                <a:ea typeface="+mj-ea"/>
+                <a:cs typeface="+mj-cs"/>
+              </a:rPr>
+            </a:br>
+            <a:br>
+              <a:rPr kumimoji="0" lang="en-US" b="1" i="0" u="none" strike="noStrike" kern="1200" cap="none" spc="-50" normalizeH="0" baseline="0" noProof="0" dirty="0">
+                <a:ln>
+                  <a:noFill/>
+                </a:ln>
+                <a:solidFill>
+                  <a:srgbClr val="FFFFFF"/>
+                </a:solidFill>
+                <a:effectLst/>
+                <a:uLnTx/>
+                <a:uFillTx/>
+                <a:latin typeface="+mj-lt"/>
+                <a:ea typeface="+mj-ea"/>
+                <a:cs typeface="+mj-cs"/>
+              </a:rPr>
+            </a:br>
+            <a:r>
+              <a:rPr kumimoji="0" lang="en-US" b="1" i="0" u="none" strike="noStrike" kern="1200" cap="none" spc="-50" normalizeH="0" baseline="0" noProof="0" dirty="0">
+                <a:ln>
+                  <a:noFill/>
+                </a:ln>
+                <a:solidFill>
+                  <a:srgbClr val="FFFFFF"/>
+                </a:solidFill>
+                <a:effectLst/>
+                <a:uLnTx/>
+                <a:uFillTx/>
+                <a:latin typeface="+mj-lt"/>
+                <a:ea typeface="+mj-ea"/>
+                <a:cs typeface="+mj-cs"/>
+              </a:rPr>
+              <a:t>Upon clicking on the year labels will toggle hide or show the line of that year.</a:t>
+            </a:r>
+          </a:p>
+          <a:p>
+            <a:r>
+              <a:rPr kumimoji="0" lang="en-US" b="1" i="0" u="none" strike="noStrike" kern="1200" cap="none" spc="-50" normalizeH="0" baseline="0" noProof="0" dirty="0">
+                <a:ln>
+                  <a:noFill/>
+                </a:ln>
+                <a:solidFill>
+                  <a:srgbClr val="FFFFFF"/>
+                </a:solidFill>
+                <a:effectLst/>
+                <a:uLnTx/>
+                <a:uFillTx/>
+                <a:latin typeface="+mj-lt"/>
+                <a:ea typeface="+mj-ea"/>
+                <a:cs typeface="+mj-cs"/>
+              </a:rPr>
+              <a:t> </a:t>
+            </a:r>
+          </a:p>
+          <a:p>
+            <a:r>
+              <a:rPr lang="en-US" b="1" dirty="0">
+                <a:solidFill>
+                  <a:srgbClr val="FFFFFF"/>
+                </a:solidFill>
+                <a:latin typeface="+mj-lt"/>
+              </a:rPr>
+              <a:t>Hover over a data point will show region’s name and offence count.</a:t>
+            </a:r>
+            <a:br>
+              <a:rPr lang="en-US" sz="1800" b="1" dirty="0">
+                <a:solidFill>
+                  <a:srgbClr val="FFFFFF"/>
+                </a:solidFill>
+              </a:rPr>
+            </a:br>
+            <a:r>
+              <a:rPr kumimoji="0" lang="en-US" sz="1900" b="1" i="0" u="none" strike="noStrike" kern="1200" cap="none" spc="-50" normalizeH="0" baseline="0" noProof="0" dirty="0">
+                <a:ln>
+                  <a:noFill/>
+                </a:ln>
+                <a:solidFill>
+                  <a:srgbClr val="FFFFFF"/>
+                </a:solidFill>
+                <a:effectLst/>
+                <a:uLnTx/>
+                <a:uFillTx/>
+                <a:latin typeface="Calibri Light" panose="020F0302020204030204"/>
+                <a:ea typeface="+mj-ea"/>
+                <a:cs typeface="+mj-cs"/>
+              </a:rPr>
+              <a:t> </a:t>
+            </a:r>
+            <a:br>
+              <a:rPr kumimoji="0" lang="en-US" sz="1900" b="1" i="0" u="none" strike="noStrike" kern="1200" cap="none" spc="-50" normalizeH="0" baseline="0" noProof="0" dirty="0">
+                <a:ln>
+                  <a:noFill/>
+                </a:ln>
+                <a:solidFill>
+                  <a:srgbClr val="FFFFFF"/>
+                </a:solidFill>
+                <a:effectLst/>
+                <a:uLnTx/>
+                <a:uFillTx/>
+                <a:latin typeface="Calibri Light" panose="020F0302020204030204"/>
+                <a:ea typeface="+mj-ea"/>
+                <a:cs typeface="+mj-cs"/>
+              </a:rPr>
+            </a:br>
+            <a:endParaRPr lang="en-US" sz="1900" b="1" dirty="0"/>
           </a:p>
         </p:txBody>
       </p:sp>
-      <p:pic>
-        <p:nvPicPr>
-          <p:cNvPr id="2054" name="Picture 6">
+      <p:sp>
+        <p:nvSpPr>
+          <p:cNvPr id="11" name="Title 10">
             <a:extLst>
               <a:ext uri="{FF2B5EF4-FFF2-40B4-BE49-F238E27FC236}">
-                <a16:creationId xmlns:a16="http://schemas.microsoft.com/office/drawing/2014/main" id="{D233FA9A-DE00-9774-B917-108F8334690D}"/>
+                <a16:creationId xmlns:a16="http://schemas.microsoft.com/office/drawing/2014/main" id="{F04EBEEC-E255-8C3D-0689-31533F3F233D}"/>
               </a:ext>
             </a:extLst>
           </p:cNvPr>
-          <p:cNvPicPr>
-            <a:picLocks noGrp="1" noChangeAspect="1" noChangeArrowheads="1"/>
-          </p:cNvPicPr>
-          <p:nvPr>
-            <p:ph idx="1"/>
-          </p:nvPr>
-        </p:nvPicPr>
-        <p:blipFill>
-          <a:blip r:embed="rId2">
-            <a:extLst>
-              <a:ext uri="{28A0092B-C50C-407E-A947-70E740481C1C}">
-                <a14:useLocalDpi xmlns:a14="http://schemas.microsoft.com/office/drawing/2010/main" val="0"/>
-              </a:ext>
-            </a:extLst>
-          </a:blip>
-          <a:srcRect/>
-          <a:stretch>
-            <a:fillRect/>
-          </a:stretch>
-        </p:blipFill>
-        <p:spPr bwMode="auto">
+          <p:cNvSpPr>
+            <a:spLocks noGrp="1"/>
+          </p:cNvSpPr>
+          <p:nvPr>
+            <p:ph type="title"/>
+          </p:nvPr>
+        </p:nvSpPr>
+        <p:spPr>
           <a:xfrm>
-            <a:off x="626724" y="2395013"/>
-            <a:ext cx="6711387" cy="3896773"/>
+            <a:off x="777882" y="286603"/>
+            <a:ext cx="6882223" cy="1750744"/>
           </a:xfrm>
-          <a:prstGeom prst="rect">
-            <a:avLst/>
-          </a:prstGeom>
-          <a:noFill/>
-          <a:extLst>
-            <a:ext uri="{909E8E84-426E-40DD-AFC4-6F175D3DCCD1}">
-              <a14:hiddenFill xmlns:a14="http://schemas.microsoft.com/office/drawing/2010/main">
-                <a:solidFill>
-                  <a:srgbClr val="FFFFFF"/>
-                </a:solidFill>
-              </a14:hiddenFill>
-            </a:ext>
-          </a:extLst>
         </p:spPr>
-      </p:pic>
+        <p:txBody>
+          <a:bodyPr/>
+          <a:lstStyle/>
+          <a:p>
+            <a:r>
+              <a:rPr lang="en-US" sz="3200" b="1" dirty="0">
+                <a:solidFill>
+                  <a:schemeClr val="accent2"/>
+                </a:solidFill>
+              </a:rPr>
+              <a:t>Regional Offences 2019-2022 </a:t>
+            </a:r>
+            <a:br>
+              <a:rPr lang="en-US" dirty="0"/>
+            </a:br>
+            <a:endParaRPr lang="en-US" dirty="0"/>
+          </a:p>
+        </p:txBody>
+      </p:sp>
     </p:spTree>
     <p:extLst>
       <p:ext uri="{BB962C8B-B14F-4D97-AF65-F5344CB8AC3E}">
-        <p14:creationId xmlns:p14="http://schemas.microsoft.com/office/powerpoint/2010/main" val="1114990967"/>
+        <p14:creationId xmlns:p14="http://schemas.microsoft.com/office/powerpoint/2010/main" val="1310571146"/>
       </p:ext>
     </p:extLst>
   </p:cSld>
@@ -7246,12 +7019,12 @@
           <a:chExt cx="0" cy="0"/>
         </a:xfrm>
       </p:grpSpPr>
-      <p:sp useBgFill="1">
-        <p:nvSpPr>
-          <p:cNvPr id="34" name="Rectangle 27">
+      <p:sp>
+        <p:nvSpPr>
+          <p:cNvPr id="9" name="Rectangle 8">
             <a:extLst>
               <a:ext uri="{FF2B5EF4-FFF2-40B4-BE49-F238E27FC236}">
-                <a16:creationId xmlns:a16="http://schemas.microsoft.com/office/drawing/2014/main" id="{44CC594A-A820-450F-B363-C19201FCFEC6}"/>
+                <a16:creationId xmlns:a16="http://schemas.microsoft.com/office/drawing/2014/main" id="{4E4490D0-3672-446A-AC12-B4830333BDDD}"/>
               </a:ext>
               <a:ext uri="{C183D7F6-B498-43B3-948B-1728B52AA6E4}">
                 <adec:decorative xmlns:adec="http://schemas.microsoft.com/office/drawing/2017/decorative" val="1"/>
@@ -7271,68 +7044,8 @@
         </p:nvSpPr>
         <p:spPr>
           <a:xfrm>
-            <a:off x="0" y="0"/>
-            <a:ext cx="12186315" cy="6858000"/>
-          </a:xfrm>
-          <a:prstGeom prst="rect">
-            <a:avLst/>
-          </a:prstGeom>
-          <a:ln>
-            <a:noFill/>
-          </a:ln>
-        </p:spPr>
-        <p:style>
-          <a:lnRef idx="2">
-            <a:schemeClr val="accent6">
-              <a:shade val="50000"/>
-            </a:schemeClr>
-          </a:lnRef>
-          <a:fillRef idx="1001">
-            <a:schemeClr val="lt1"/>
-          </a:fillRef>
-          <a:effectRef idx="0">
-            <a:schemeClr val="accent6"/>
-          </a:effectRef>
-          <a:fontRef idx="minor">
-            <a:schemeClr val="lt1"/>
-          </a:fontRef>
-        </p:style>
-        <p:txBody>
-          <a:bodyPr rtlCol="0" anchor="ctr"/>
-          <a:lstStyle/>
-          <a:p>
-            <a:pPr algn="ctr"/>
-            <a:endParaRPr lang="en-US"/>
-          </a:p>
-        </p:txBody>
-      </p:sp>
-      <p:sp>
-        <p:nvSpPr>
-          <p:cNvPr id="35" name="Rectangle 29">
-            <a:extLst>
-              <a:ext uri="{FF2B5EF4-FFF2-40B4-BE49-F238E27FC236}">
-                <a16:creationId xmlns:a16="http://schemas.microsoft.com/office/drawing/2014/main" id="{59FAB3DA-E9ED-4574-ABCC-378BC0FF1BBC}"/>
-              </a:ext>
-              <a:ext uri="{C183D7F6-B498-43B3-948B-1728B52AA6E4}">
-                <adec:decorative xmlns:adec="http://schemas.microsoft.com/office/drawing/2017/decorative" val="1"/>
-              </a:ext>
-            </a:extLst>
-          </p:cNvPr>
-          <p:cNvSpPr>
-            <a:spLocks noGrp="1" noRot="1" noChangeAspect="1" noMove="1" noResize="1" noEditPoints="1" noAdjustHandles="1" noChangeArrowheads="1" noChangeShapeType="1" noTextEdit="1"/>
-          </p:cNvSpPr>
-          <p:nvPr>
-            <p:extLst>
-              <p:ext uri="{386F3935-93C4-4BCD-93E2-E3B085C9AB24}">
-                <p16:designElem xmlns:p16="http://schemas.microsoft.com/office/powerpoint/2015/main" val="1"/>
-              </p:ext>
-            </p:extLst>
-          </p:nvPr>
-        </p:nvSpPr>
-        <p:spPr>
-          <a:xfrm>
-            <a:off x="16" y="0"/>
-            <a:ext cx="4050791" cy="6858000"/>
+            <a:off x="3175" y="6400800"/>
+            <a:ext cx="12188825" cy="457200"/>
           </a:xfrm>
           <a:prstGeom prst="rect">
             <a:avLst/>
@@ -7363,201 +7076,10 @@
       </p:sp>
       <p:sp>
         <p:nvSpPr>
-          <p:cNvPr id="4" name="Title 3">
+          <p:cNvPr id="11" name="Rectangle 10">
             <a:extLst>
               <a:ext uri="{FF2B5EF4-FFF2-40B4-BE49-F238E27FC236}">
-                <a16:creationId xmlns:a16="http://schemas.microsoft.com/office/drawing/2014/main" id="{33626372-42A7-F501-CD18-F3C48E2FD070}"/>
-              </a:ext>
-            </a:extLst>
-          </p:cNvPr>
-          <p:cNvSpPr>
-            <a:spLocks noGrp="1"/>
-          </p:cNvSpPr>
-          <p:nvPr>
-            <p:ph type="title"/>
-          </p:nvPr>
-        </p:nvSpPr>
-        <p:spPr>
-          <a:xfrm>
-            <a:off x="492370" y="516835"/>
-            <a:ext cx="3084844" cy="2103875"/>
-          </a:xfrm>
-        </p:spPr>
-        <p:txBody>
-          <a:bodyPr>
-            <a:normAutofit/>
-          </a:bodyPr>
-          <a:lstStyle/>
-          <a:p>
-            <a:r>
-              <a:rPr lang="en-US" sz="3600" dirty="0">
-                <a:solidFill>
-                  <a:srgbClr val="FFFFFF"/>
-                </a:solidFill>
-              </a:rPr>
-              <a:t>Offence Summary – Display and Filter</a:t>
-            </a:r>
-            <a:endParaRPr lang="en-AU" sz="3600" dirty="0">
-              <a:solidFill>
-                <a:srgbClr val="FFFFFF"/>
-              </a:solidFill>
-            </a:endParaRPr>
-          </a:p>
-        </p:txBody>
-      </p:sp>
-      <p:sp>
-        <p:nvSpPr>
-          <p:cNvPr id="5" name="Content Placeholder 4">
-            <a:extLst>
-              <a:ext uri="{FF2B5EF4-FFF2-40B4-BE49-F238E27FC236}">
-                <a16:creationId xmlns:a16="http://schemas.microsoft.com/office/drawing/2014/main" id="{2AB91FB6-8116-C465-F7A7-A77B58B7017C}"/>
-              </a:ext>
-            </a:extLst>
-          </p:cNvPr>
-          <p:cNvSpPr>
-            <a:spLocks noGrp="1"/>
-          </p:cNvSpPr>
-          <p:nvPr>
-            <p:ph idx="1"/>
-          </p:nvPr>
-        </p:nvSpPr>
-        <p:spPr>
-          <a:xfrm>
-            <a:off x="492371" y="2653800"/>
-            <a:ext cx="3084844" cy="4124505"/>
-          </a:xfrm>
-        </p:spPr>
-        <p:txBody>
-          <a:bodyPr>
-            <a:normAutofit/>
-          </a:bodyPr>
-          <a:lstStyle/>
-          <a:p>
-            <a:r>
-              <a:rPr lang="en-US" sz="1300" dirty="0">
-                <a:solidFill>
-                  <a:srgbClr val="FFFFFF"/>
-                </a:solidFill>
-                <a:latin typeface="+mj-lt"/>
-              </a:rPr>
-              <a:t>Using Offense Summary CSV (offence_summary_df.csv)</a:t>
-            </a:r>
-            <a:endParaRPr lang="en-US" sz="1300" dirty="0">
-              <a:solidFill>
-                <a:srgbClr val="FFFFFF"/>
-              </a:solidFill>
-              <a:highlight>
-                <a:srgbClr val="FFFF00"/>
-              </a:highlight>
-              <a:latin typeface="+mj-lt"/>
-            </a:endParaRPr>
-          </a:p>
-          <a:p>
-            <a:pPr lvl="1"/>
-            <a:r>
-              <a:rPr lang="en-US" sz="1300" dirty="0">
-                <a:solidFill>
-                  <a:srgbClr val="FFFFFF"/>
-                </a:solidFill>
-                <a:latin typeface="+mj-lt"/>
-              </a:rPr>
-              <a:t>Year</a:t>
-            </a:r>
-          </a:p>
-          <a:p>
-            <a:pPr lvl="1"/>
-            <a:r>
-              <a:rPr lang="en-US" sz="1300" dirty="0">
-                <a:solidFill>
-                  <a:srgbClr val="FFFFFF"/>
-                </a:solidFill>
-                <a:latin typeface="+mj-lt"/>
-              </a:rPr>
-              <a:t>Local Government Area</a:t>
-            </a:r>
-          </a:p>
-          <a:p>
-            <a:pPr lvl="1"/>
-            <a:r>
-              <a:rPr lang="en-US" sz="1300" dirty="0">
-                <a:solidFill>
-                  <a:srgbClr val="FFFFFF"/>
-                </a:solidFill>
-                <a:latin typeface="+mj-lt"/>
-              </a:rPr>
-              <a:t>Offence types (A-F)</a:t>
-            </a:r>
-          </a:p>
-          <a:p>
-            <a:r>
-              <a:rPr lang="en-US" sz="1300" b="1" dirty="0">
-                <a:solidFill>
-                  <a:srgbClr val="FFFFFF"/>
-                </a:solidFill>
-                <a:latin typeface="+mj-lt"/>
-              </a:rPr>
-              <a:t>Technical Background</a:t>
-            </a:r>
-          </a:p>
-          <a:p>
-            <a:r>
-              <a:rPr lang="en-US" sz="1300" dirty="0">
-                <a:solidFill>
-                  <a:srgbClr val="FFFFFF"/>
-                </a:solidFill>
-                <a:latin typeface="+mj-lt"/>
-              </a:rPr>
-              <a:t>Displaying the summary data loaded from CSV, using </a:t>
-            </a:r>
-            <a:r>
-              <a:rPr lang="en-US" sz="1300" dirty="0" err="1">
-                <a:solidFill>
-                  <a:srgbClr val="FFFFFF"/>
-                </a:solidFill>
-                <a:latin typeface="+mj-lt"/>
-              </a:rPr>
-              <a:t>Javascript</a:t>
-            </a:r>
-            <a:r>
-              <a:rPr lang="en-US" sz="1300" dirty="0">
-                <a:solidFill>
-                  <a:srgbClr val="FFFFFF"/>
-                </a:solidFill>
-                <a:latin typeface="+mj-lt"/>
-              </a:rPr>
-              <a:t>, HTML, CSS and d3 (policedata.html, policadata.js, policedata.css)</a:t>
-            </a:r>
-          </a:p>
-          <a:p>
-            <a:r>
-              <a:rPr lang="en-US" sz="1300" dirty="0">
-                <a:solidFill>
-                  <a:srgbClr val="FFFFFF"/>
-                </a:solidFill>
-                <a:latin typeface="+mj-lt"/>
-              </a:rPr>
-              <a:t>The LGA filter is populated from the data source as well (dropdown)</a:t>
-            </a:r>
-          </a:p>
-          <a:p>
-            <a:r>
-              <a:rPr lang="en-US" sz="1300" dirty="0">
-                <a:solidFill>
-                  <a:srgbClr val="FFFFFF"/>
-                </a:solidFill>
-                <a:latin typeface="+mj-lt"/>
-              </a:rPr>
-              <a:t>Filtering by different fields (Local Government Area and Year)</a:t>
-            </a:r>
-          </a:p>
-        </p:txBody>
-      </p:sp>
-      <p:sp>
-        <p:nvSpPr>
-          <p:cNvPr id="36" name="Rectangle 31">
-            <a:extLst>
-              <a:ext uri="{FF2B5EF4-FFF2-40B4-BE49-F238E27FC236}">
-                <a16:creationId xmlns:a16="http://schemas.microsoft.com/office/drawing/2014/main" id="{53B8D6B0-55D6-48DC-86D8-FD95D5F118AB}"/>
+                <a16:creationId xmlns:a16="http://schemas.microsoft.com/office/drawing/2014/main" id="{39CB82C2-DF65-4EC1-8280-F201D50F570B}"/>
               </a:ext>
               <a:ext uri="{C183D7F6-B498-43B3-948B-1728B52AA6E4}">
                 <adec:decorative xmlns:adec="http://schemas.microsoft.com/office/drawing/2017/decorative" val="1"/>
@@ -7577,8 +7099,8 @@
         </p:nvSpPr>
         <p:spPr>
           <a:xfrm>
-            <a:off x="4040071" y="0"/>
-            <a:ext cx="64008" cy="6858000"/>
+            <a:off x="15" y="6334316"/>
+            <a:ext cx="12188825" cy="64008"/>
           </a:xfrm>
           <a:prstGeom prst="rect">
             <a:avLst/>
@@ -7607,40 +7129,657 @@
           </a:fontRef>
         </p:style>
       </p:sp>
+      <p:cxnSp>
+        <p:nvCxnSpPr>
+          <p:cNvPr id="13" name="Straight Connector 12">
+            <a:extLst>
+              <a:ext uri="{FF2B5EF4-FFF2-40B4-BE49-F238E27FC236}">
+                <a16:creationId xmlns:a16="http://schemas.microsoft.com/office/drawing/2014/main" id="{7E1D4427-852B-4B37-8E76-0E9F1810BA2A}"/>
+              </a:ext>
+              <a:ext uri="{C183D7F6-B498-43B3-948B-1728B52AA6E4}">
+                <adec:decorative xmlns:adec="http://schemas.microsoft.com/office/drawing/2017/decorative" val="1"/>
+              </a:ext>
+            </a:extLst>
+          </p:cNvPr>
+          <p:cNvCxnSpPr>
+            <a:cxnSpLocks noGrp="1" noRot="1" noChangeAspect="1" noMove="1" noResize="1" noEditPoints="1" noAdjustHandles="1" noChangeArrowheads="1" noChangeShapeType="1"/>
+          </p:cNvCxnSpPr>
+          <p:nvPr>
+            <p:extLst>
+              <p:ext uri="{386F3935-93C4-4BCD-93E2-E3B085C9AB24}">
+                <p16:designElem xmlns:p16="http://schemas.microsoft.com/office/powerpoint/2015/main" val="1"/>
+              </p:ext>
+            </p:extLst>
+          </p:nvPr>
+        </p:nvCxnSpPr>
+        <p:spPr>
+          <a:xfrm>
+            <a:off x="1207658" y="4343400"/>
+            <a:ext cx="9875520" cy="0"/>
+          </a:xfrm>
+          <a:prstGeom prst="line">
+            <a:avLst/>
+          </a:prstGeom>
+          <a:ln w="6350">
+            <a:solidFill>
+              <a:schemeClr val="tx1">
+                <a:lumMod val="50000"/>
+                <a:lumOff val="50000"/>
+              </a:schemeClr>
+            </a:solidFill>
+          </a:ln>
+        </p:spPr>
+        <p:style>
+          <a:lnRef idx="1">
+            <a:schemeClr val="accent1"/>
+          </a:lnRef>
+          <a:fillRef idx="0">
+            <a:schemeClr val="accent1"/>
+          </a:fillRef>
+          <a:effectRef idx="0">
+            <a:schemeClr val="accent1"/>
+          </a:effectRef>
+          <a:fontRef idx="minor">
+            <a:schemeClr val="tx1"/>
+          </a:fontRef>
+        </p:style>
+      </p:cxnSp>
+      <p:sp useBgFill="1">
+        <p:nvSpPr>
+          <p:cNvPr id="15" name="Rectangle 14">
+            <a:extLst>
+              <a:ext uri="{FF2B5EF4-FFF2-40B4-BE49-F238E27FC236}">
+                <a16:creationId xmlns:a16="http://schemas.microsoft.com/office/drawing/2014/main" id="{5A1B47C8-47A0-4A88-8830-6DEA3B5DE392}"/>
+              </a:ext>
+              <a:ext uri="{C183D7F6-B498-43B3-948B-1728B52AA6E4}">
+                <adec:decorative xmlns:adec="http://schemas.microsoft.com/office/drawing/2017/decorative" val="1"/>
+              </a:ext>
+            </a:extLst>
+          </p:cNvPr>
+          <p:cNvSpPr>
+            <a:spLocks noGrp="1" noRot="1" noChangeAspect="1" noMove="1" noResize="1" noEditPoints="1" noAdjustHandles="1" noChangeArrowheads="1" noChangeShapeType="1" noTextEdit="1"/>
+          </p:cNvSpPr>
+          <p:nvPr>
+            <p:extLst>
+              <p:ext uri="{386F3935-93C4-4BCD-93E2-E3B085C9AB24}">
+                <p16:designElem xmlns:p16="http://schemas.microsoft.com/office/powerpoint/2015/main" val="1"/>
+              </p:ext>
+            </p:extLst>
+          </p:nvPr>
+        </p:nvSpPr>
+        <p:spPr>
+          <a:xfrm>
+            <a:off x="0" y="0"/>
+            <a:ext cx="12192000" cy="6858000"/>
+          </a:xfrm>
+          <a:prstGeom prst="rect">
+            <a:avLst/>
+          </a:prstGeom>
+          <a:ln>
+            <a:noFill/>
+          </a:ln>
+        </p:spPr>
+        <p:style>
+          <a:lnRef idx="2">
+            <a:schemeClr val="accent1">
+              <a:shade val="50000"/>
+            </a:schemeClr>
+          </a:lnRef>
+          <a:fillRef idx="1001">
+            <a:schemeClr val="lt1"/>
+          </a:fillRef>
+          <a:effectRef idx="0">
+            <a:schemeClr val="accent1"/>
+          </a:effectRef>
+          <a:fontRef idx="minor">
+            <a:schemeClr val="lt1"/>
+          </a:fontRef>
+        </p:style>
+        <p:txBody>
+          <a:bodyPr rtlCol="0" anchor="ctr"/>
+          <a:lstStyle/>
+          <a:p>
+            <a:pPr marL="0" marR="0" lvl="0" indent="0" algn="ctr" defTabSz="457200" rtl="0" eaLnBrk="1" fontAlgn="auto" latinLnBrk="0" hangingPunct="1">
+              <a:lnSpc>
+                <a:spcPct val="100000"/>
+              </a:lnSpc>
+              <a:spcBef>
+                <a:spcPts val="0"/>
+              </a:spcBef>
+              <a:spcAft>
+                <a:spcPts val="0"/>
+              </a:spcAft>
+              <a:buClrTx/>
+              <a:buSzTx/>
+              <a:buFontTx/>
+              <a:buNone/>
+              <a:tabLst/>
+              <a:defRPr/>
+            </a:pPr>
+            <a:endParaRPr kumimoji="0" lang="en-US" sz="1800" b="0" i="0" u="none" strike="noStrike" kern="1200" cap="none" spc="0" normalizeH="0" baseline="0" noProof="0">
+              <a:ln>
+                <a:noFill/>
+              </a:ln>
+              <a:solidFill>
+                <a:prstClr val="white"/>
+              </a:solidFill>
+              <a:effectLst/>
+              <a:uLnTx/>
+              <a:uFillTx/>
+              <a:latin typeface="Calibri" panose="020F0502020204030204"/>
+              <a:ea typeface="+mn-ea"/>
+              <a:cs typeface="+mn-cs"/>
+            </a:endParaRPr>
+          </a:p>
+        </p:txBody>
+      </p:sp>
+      <p:sp>
+        <p:nvSpPr>
+          <p:cNvPr id="17" name="Rectangle 16">
+            <a:extLst>
+              <a:ext uri="{FF2B5EF4-FFF2-40B4-BE49-F238E27FC236}">
+                <a16:creationId xmlns:a16="http://schemas.microsoft.com/office/drawing/2014/main" id="{984BBFDD-E720-4805-A9C8-129FBBF6DD70}"/>
+              </a:ext>
+              <a:ext uri="{C183D7F6-B498-43B3-948B-1728B52AA6E4}">
+                <adec:decorative xmlns:adec="http://schemas.microsoft.com/office/drawing/2017/decorative" val="1"/>
+              </a:ext>
+            </a:extLst>
+          </p:cNvPr>
+          <p:cNvSpPr>
+            <a:spLocks noGrp="1" noRot="1" noChangeAspect="1" noMove="1" noResize="1" noEditPoints="1" noAdjustHandles="1" noChangeArrowheads="1" noChangeShapeType="1" noTextEdit="1"/>
+          </p:cNvSpPr>
+          <p:nvPr>
+            <p:extLst>
+              <p:ext uri="{386F3935-93C4-4BCD-93E2-E3B085C9AB24}">
+                <p16:designElem xmlns:p16="http://schemas.microsoft.com/office/powerpoint/2015/main" val="1"/>
+              </p:ext>
+            </p:extLst>
+          </p:nvPr>
+        </p:nvSpPr>
+        <p:spPr bwMode="white">
+          <a:xfrm>
+            <a:off x="7613486" y="0"/>
+            <a:ext cx="4584734" cy="6858000"/>
+          </a:xfrm>
+          <a:prstGeom prst="rect">
+            <a:avLst/>
+          </a:prstGeom>
+          <a:solidFill>
+            <a:schemeClr val="accent2"/>
+          </a:solidFill>
+          <a:ln>
+            <a:noFill/>
+          </a:ln>
+        </p:spPr>
+        <p:style>
+          <a:lnRef idx="2">
+            <a:schemeClr val="accent1">
+              <a:shade val="50000"/>
+            </a:schemeClr>
+          </a:lnRef>
+          <a:fillRef idx="1">
+            <a:schemeClr val="accent1"/>
+          </a:fillRef>
+          <a:effectRef idx="0">
+            <a:schemeClr val="accent1"/>
+          </a:effectRef>
+          <a:fontRef idx="minor">
+            <a:schemeClr val="lt1"/>
+          </a:fontRef>
+        </p:style>
+      </p:sp>
+      <p:sp>
+        <p:nvSpPr>
+          <p:cNvPr id="2" name="Title 1">
+            <a:extLst>
+              <a:ext uri="{FF2B5EF4-FFF2-40B4-BE49-F238E27FC236}">
+                <a16:creationId xmlns:a16="http://schemas.microsoft.com/office/drawing/2014/main" id="{75A5A951-1B12-FC62-4875-59A74BDA964F}"/>
+              </a:ext>
+            </a:extLst>
+          </p:cNvPr>
+          <p:cNvSpPr>
+            <a:spLocks noGrp="1"/>
+          </p:cNvSpPr>
+          <p:nvPr>
+            <p:ph type="title"/>
+          </p:nvPr>
+        </p:nvSpPr>
+        <p:spPr>
+          <a:xfrm>
+            <a:off x="7829962" y="352765"/>
+            <a:ext cx="3959961" cy="7589090"/>
+          </a:xfrm>
+        </p:spPr>
+        <p:txBody>
+          <a:bodyPr vert="horz" lIns="91440" tIns="45720" rIns="91440" bIns="45720" rtlCol="0" anchor="b">
+            <a:noAutofit/>
+          </a:bodyPr>
+          <a:lstStyle/>
+          <a:p>
+            <a:br>
+              <a:rPr lang="en-US" sz="1800" b="1" dirty="0">
+                <a:solidFill>
+                  <a:srgbClr val="FFFFFF"/>
+                </a:solidFill>
+              </a:rPr>
+            </a:br>
+            <a:r>
+              <a:rPr lang="en-US" sz="1800" b="1" dirty="0">
+                <a:solidFill>
+                  <a:srgbClr val="FFFFFF"/>
+                </a:solidFill>
+              </a:rPr>
+              <a:t>Data  Analysis</a:t>
+            </a:r>
+            <a:br>
+              <a:rPr lang="en-US" sz="1800" b="1" dirty="0">
+                <a:solidFill>
+                  <a:srgbClr val="FFFFFF"/>
+                </a:solidFill>
+              </a:rPr>
+            </a:br>
+            <a:br>
+              <a:rPr lang="en-US" sz="1800" b="1" dirty="0">
+                <a:solidFill>
+                  <a:srgbClr val="FFFFFF"/>
+                </a:solidFill>
+              </a:rPr>
+            </a:br>
+            <a:r>
+              <a:rPr lang="en-US" sz="1800" b="1" dirty="0">
+                <a:solidFill>
+                  <a:srgbClr val="FFFFFF"/>
+                </a:solidFill>
+              </a:rPr>
+              <a:t>In 2022, Melbourne had the highest number of offences; next to it were </a:t>
+            </a:r>
+            <a:r>
+              <a:rPr lang="en-US" sz="1800" b="1" dirty="0" err="1">
+                <a:solidFill>
+                  <a:srgbClr val="FFFFFF"/>
+                </a:solidFill>
+              </a:rPr>
+              <a:t>Brimbank</a:t>
+            </a:r>
+            <a:r>
+              <a:rPr lang="en-US" sz="1800" b="1" dirty="0">
+                <a:solidFill>
+                  <a:srgbClr val="FFFFFF"/>
+                </a:solidFill>
+              </a:rPr>
+              <a:t> and Wyndham, though they had almost half of the number of crimes in </a:t>
+            </a:r>
+            <a:r>
+              <a:rPr lang="en-US" sz="1800" b="1" dirty="0" err="1">
+                <a:solidFill>
+                  <a:srgbClr val="FFFFFF"/>
+                </a:solidFill>
+              </a:rPr>
+              <a:t>Melbournce</a:t>
+            </a:r>
+            <a:r>
+              <a:rPr lang="en-US" sz="1800" b="1" dirty="0">
+                <a:solidFill>
+                  <a:srgbClr val="FFFFFF"/>
+                </a:solidFill>
+              </a:rPr>
+              <a:t>.</a:t>
+            </a:r>
+            <a:br>
+              <a:rPr lang="en-US" sz="1800" b="1" dirty="0">
+                <a:solidFill>
+                  <a:srgbClr val="FFFFFF"/>
+                </a:solidFill>
+              </a:rPr>
+            </a:br>
+            <a:br>
+              <a:rPr lang="en-US" sz="1800" b="1" dirty="0">
+                <a:solidFill>
+                  <a:srgbClr val="FFFFFF"/>
+                </a:solidFill>
+              </a:rPr>
+            </a:br>
+            <a:r>
+              <a:rPr lang="en-US" sz="1800" b="1" dirty="0">
+                <a:solidFill>
+                  <a:srgbClr val="FFFFFF"/>
+                </a:solidFill>
+              </a:rPr>
+              <a:t>The LGAs are under government of Police Region ‘1 North West Metro’ that has 14 LGAs.</a:t>
+            </a:r>
+            <a:br>
+              <a:rPr lang="en-US" sz="1800" b="1" dirty="0">
+                <a:solidFill>
+                  <a:srgbClr val="FFFFFF"/>
+                </a:solidFill>
+              </a:rPr>
+            </a:br>
+            <a:br>
+              <a:rPr lang="en-US" sz="1800" b="1" dirty="0">
+                <a:solidFill>
+                  <a:srgbClr val="FFFFFF"/>
+                </a:solidFill>
+              </a:rPr>
+            </a:br>
+            <a:r>
+              <a:rPr lang="en-US" sz="1800" b="1" dirty="0">
+                <a:solidFill>
+                  <a:srgbClr val="FFFFFF"/>
+                </a:solidFill>
+              </a:rPr>
+              <a:t>Technical  background</a:t>
+            </a:r>
+            <a:br>
+              <a:rPr lang="en-US" sz="1800" b="1" dirty="0">
+                <a:solidFill>
+                  <a:srgbClr val="FFFFFF"/>
+                </a:solidFill>
+              </a:rPr>
+            </a:br>
+            <a:br>
+              <a:rPr lang="en-US" sz="1800" b="1" dirty="0">
+                <a:solidFill>
+                  <a:srgbClr val="FFFFFF"/>
+                </a:solidFill>
+              </a:rPr>
+            </a:br>
+            <a:r>
+              <a:rPr lang="en-US" sz="1800" b="1" dirty="0">
+                <a:solidFill>
+                  <a:srgbClr val="FFFFFF"/>
+                </a:solidFill>
+              </a:rPr>
+              <a:t>This bar chart was created using chart </a:t>
+            </a:r>
+            <a:r>
+              <a:rPr lang="en-US" sz="1800" b="1" dirty="0" err="1">
+                <a:solidFill>
+                  <a:srgbClr val="FFFFFF"/>
+                </a:solidFill>
+              </a:rPr>
+              <a:t>js</a:t>
+            </a:r>
+            <a:r>
+              <a:rPr lang="en-US" sz="1800" b="1" dirty="0">
+                <a:solidFill>
+                  <a:srgbClr val="FFFFFF"/>
+                </a:solidFill>
+              </a:rPr>
+              <a:t>, one of the </a:t>
+            </a:r>
+            <a:r>
+              <a:rPr lang="en-US" sz="1800" b="1" dirty="0" err="1">
+                <a:solidFill>
+                  <a:srgbClr val="FFFFFF"/>
+                </a:solidFill>
+              </a:rPr>
+              <a:t>javascript</a:t>
+            </a:r>
+            <a:r>
+              <a:rPr lang="en-US" sz="1800" b="1" dirty="0">
+                <a:solidFill>
+                  <a:srgbClr val="FFFFFF"/>
+                </a:solidFill>
+              </a:rPr>
+              <a:t> library. </a:t>
+            </a:r>
+            <a:br>
+              <a:rPr lang="en-US" sz="1800" b="1" dirty="0">
+                <a:solidFill>
+                  <a:srgbClr val="FFFFFF"/>
+                </a:solidFill>
+              </a:rPr>
+            </a:br>
+            <a:br>
+              <a:rPr lang="en-US" sz="1800" b="1" dirty="0">
+                <a:solidFill>
+                  <a:srgbClr val="FFFFFF"/>
+                </a:solidFill>
+              </a:rPr>
+            </a:br>
+            <a:r>
+              <a:rPr lang="en-US" sz="1800" b="1" dirty="0">
+                <a:solidFill>
+                  <a:srgbClr val="FFFFFF"/>
+                </a:solidFill>
+              </a:rPr>
+              <a:t>When the chart first load, it has delay animation effect.</a:t>
+            </a:r>
+            <a:br>
+              <a:rPr lang="en-US" sz="1800" b="1" dirty="0">
+                <a:solidFill>
+                  <a:srgbClr val="FFFFFF"/>
+                </a:solidFill>
+              </a:rPr>
+            </a:br>
+            <a:br>
+              <a:rPr lang="en-US" sz="1800" b="1" dirty="0">
+                <a:solidFill>
+                  <a:srgbClr val="FFFFFF"/>
+                </a:solidFill>
+              </a:rPr>
+            </a:br>
+            <a:r>
+              <a:rPr lang="en-US" sz="1800" b="1" dirty="0">
+                <a:solidFill>
+                  <a:srgbClr val="FFFFFF"/>
+                </a:solidFill>
+              </a:rPr>
+              <a:t>Upon clicking on the label ‘Local Government Offence’ will toggle hide or show the chart.  </a:t>
+            </a:r>
+            <a:br>
+              <a:rPr lang="en-US" sz="1800" b="1" dirty="0">
+                <a:solidFill>
+                  <a:srgbClr val="FFFFFF"/>
+                </a:solidFill>
+              </a:rPr>
+            </a:br>
+            <a:br>
+              <a:rPr lang="en-US" sz="1800" b="1" dirty="0">
+                <a:solidFill>
+                  <a:srgbClr val="FFFFFF"/>
+                </a:solidFill>
+              </a:rPr>
+            </a:br>
+            <a:r>
+              <a:rPr lang="en-US" sz="1800" b="1" dirty="0">
+                <a:solidFill>
+                  <a:srgbClr val="FFFFFF"/>
+                </a:solidFill>
+              </a:rPr>
+              <a:t>Hover over a bar will show LGA’s name and its incident count.</a:t>
+            </a:r>
+            <a:br>
+              <a:rPr lang="en-US" sz="1800" b="1" dirty="0">
+                <a:solidFill>
+                  <a:srgbClr val="FFFFFF"/>
+                </a:solidFill>
+              </a:rPr>
+            </a:br>
+            <a:br>
+              <a:rPr lang="en-US" sz="1800" b="1" dirty="0">
+                <a:solidFill>
+                  <a:srgbClr val="FFFFFF"/>
+                </a:solidFill>
+              </a:rPr>
+            </a:br>
+            <a:br>
+              <a:rPr lang="en-US" sz="2000" dirty="0">
+                <a:solidFill>
+                  <a:srgbClr val="FFFFFF"/>
+                </a:solidFill>
+              </a:rPr>
+            </a:br>
+            <a:br>
+              <a:rPr lang="en-US" sz="2000" dirty="0">
+                <a:solidFill>
+                  <a:srgbClr val="FFFFFF"/>
+                </a:solidFill>
+              </a:rPr>
+            </a:br>
+            <a:br>
+              <a:rPr lang="en-US" sz="2100" dirty="0">
+                <a:solidFill>
+                  <a:srgbClr val="FFFFFF"/>
+                </a:solidFill>
+              </a:rPr>
+            </a:br>
+            <a:endParaRPr lang="en-US" sz="2100" dirty="0">
+              <a:solidFill>
+                <a:srgbClr val="FFFFFF"/>
+              </a:solidFill>
+            </a:endParaRPr>
+          </a:p>
+        </p:txBody>
+      </p:sp>
+      <p:sp>
+        <p:nvSpPr>
+          <p:cNvPr id="19" name="Rectangle 18">
+            <a:extLst>
+              <a:ext uri="{FF2B5EF4-FFF2-40B4-BE49-F238E27FC236}">
+                <a16:creationId xmlns:a16="http://schemas.microsoft.com/office/drawing/2014/main" id="{5AC4BE46-4A77-42FE-9D15-065CDB2F847C}"/>
+              </a:ext>
+              <a:ext uri="{C183D7F6-B498-43B3-948B-1728B52AA6E4}">
+                <adec:decorative xmlns:adec="http://schemas.microsoft.com/office/drawing/2017/decorative" val="1"/>
+              </a:ext>
+            </a:extLst>
+          </p:cNvPr>
+          <p:cNvSpPr>
+            <a:spLocks noGrp="1" noRot="1" noChangeAspect="1" noMove="1" noResize="1" noEditPoints="1" noAdjustHandles="1" noChangeArrowheads="1" noChangeShapeType="1" noTextEdit="1"/>
+          </p:cNvSpPr>
+          <p:nvPr>
+            <p:extLst>
+              <p:ext uri="{386F3935-93C4-4BCD-93E2-E3B085C9AB24}">
+                <p16:designElem xmlns:p16="http://schemas.microsoft.com/office/powerpoint/2015/main" val="1"/>
+              </p:ext>
+            </p:extLst>
+          </p:nvPr>
+        </p:nvSpPr>
+        <p:spPr>
+          <a:xfrm>
+            <a:off x="7556906" y="0"/>
+            <a:ext cx="64008" cy="6858000"/>
+          </a:xfrm>
+          <a:prstGeom prst="rect">
+            <a:avLst/>
+          </a:prstGeom>
+          <a:solidFill>
+            <a:schemeClr val="accent1"/>
+          </a:solidFill>
+          <a:ln>
+            <a:noFill/>
+          </a:ln>
+        </p:spPr>
+        <p:style>
+          <a:lnRef idx="2">
+            <a:schemeClr val="accent1">
+              <a:shade val="50000"/>
+            </a:schemeClr>
+          </a:lnRef>
+          <a:fillRef idx="1">
+            <a:schemeClr val="accent1"/>
+          </a:fillRef>
+          <a:effectRef idx="0">
+            <a:schemeClr val="accent1"/>
+          </a:effectRef>
+          <a:fontRef idx="minor">
+            <a:schemeClr val="lt1"/>
+          </a:fontRef>
+        </p:style>
+      </p:sp>
+      <p:sp>
+        <p:nvSpPr>
+          <p:cNvPr id="7" name="TextBox 6">
+            <a:extLst>
+              <a:ext uri="{FF2B5EF4-FFF2-40B4-BE49-F238E27FC236}">
+                <a16:creationId xmlns:a16="http://schemas.microsoft.com/office/drawing/2014/main" id="{BBD6697D-2431-035B-A37E-0089CFBE1ECA}"/>
+              </a:ext>
+            </a:extLst>
+          </p:cNvPr>
+          <p:cNvSpPr txBox="1"/>
+          <p:nvPr/>
+        </p:nvSpPr>
+        <p:spPr>
+          <a:xfrm>
+            <a:off x="626724" y="1006886"/>
+            <a:ext cx="6316243" cy="1077218"/>
+          </a:xfrm>
+          <a:prstGeom prst="rect">
+            <a:avLst/>
+          </a:prstGeom>
+          <a:noFill/>
+        </p:spPr>
+        <p:txBody>
+          <a:bodyPr wrap="square">
+            <a:spAutoFit/>
+          </a:bodyPr>
+          <a:lstStyle/>
+          <a:p>
+            <a:r>
+              <a:rPr lang="en-US" sz="3200" dirty="0">
+                <a:solidFill>
+                  <a:schemeClr val="accent2"/>
+                </a:solidFill>
+              </a:rPr>
+              <a:t>Local Government Area Offences base on Police Region</a:t>
+            </a:r>
+            <a:endParaRPr lang="en-US" sz="3200" dirty="0"/>
+          </a:p>
+        </p:txBody>
+      </p:sp>
       <p:pic>
         <p:nvPicPr>
-          <p:cNvPr id="6" name="Picture 5">
+          <p:cNvPr id="2054" name="Picture 6">
             <a:extLst>
               <a:ext uri="{FF2B5EF4-FFF2-40B4-BE49-F238E27FC236}">
-                <a16:creationId xmlns:a16="http://schemas.microsoft.com/office/drawing/2014/main" id="{FD651A7A-E8AC-A627-55D8-8A9687139159}"/>
+                <a16:creationId xmlns:a16="http://schemas.microsoft.com/office/drawing/2014/main" id="{D233FA9A-DE00-9774-B917-108F8334690D}"/>
               </a:ext>
             </a:extLst>
           </p:cNvPr>
           <p:cNvPicPr>
-            <a:picLocks noChangeAspect="1"/>
+            <a:picLocks noGrp="1" noChangeAspect="1" noChangeArrowheads="1"/>
           </p:cNvPicPr>
-          <p:nvPr/>
+          <p:nvPr>
+            <p:ph idx="1"/>
+          </p:nvPr>
         </p:nvPicPr>
         <p:blipFill>
-          <a:blip r:embed="rId2"/>
+          <a:blip r:embed="rId2">
+            <a:extLst>
+              <a:ext uri="{28A0092B-C50C-407E-A947-70E740481C1C}">
+                <a14:useLocalDpi xmlns:a14="http://schemas.microsoft.com/office/drawing/2010/main" val="0"/>
+              </a:ext>
+            </a:extLst>
+          </a:blip>
+          <a:srcRect/>
           <a:stretch>
             <a:fillRect/>
           </a:stretch>
         </p:blipFill>
-        <p:spPr>
+        <p:spPr bwMode="auto">
           <a:xfrm>
-            <a:off x="4103429" y="1568772"/>
-            <a:ext cx="8075532" cy="3957010"/>
+            <a:off x="626724" y="2395013"/>
+            <a:ext cx="6711387" cy="3896773"/>
           </a:xfrm>
           <a:prstGeom prst="rect">
             <a:avLst/>
           </a:prstGeom>
+          <a:noFill/>
+          <a:extLst>
+            <a:ext uri="{909E8E84-426E-40DD-AFC4-6F175D3DCCD1}">
+              <a14:hiddenFill xmlns:a14="http://schemas.microsoft.com/office/drawing/2010/main">
+                <a:solidFill>
+                  <a:srgbClr val="FFFFFF"/>
+                </a:solidFill>
+              </a14:hiddenFill>
+            </a:ext>
+          </a:extLst>
         </p:spPr>
       </p:pic>
     </p:spTree>
     <p:extLst>
       <p:ext uri="{BB962C8B-B14F-4D97-AF65-F5344CB8AC3E}">
-        <p14:creationId xmlns:p14="http://schemas.microsoft.com/office/powerpoint/2010/main" val="1446067743"/>
+        <p14:creationId xmlns:p14="http://schemas.microsoft.com/office/powerpoint/2010/main" val="1114990967"/>
       </p:ext>
     </p:extLst>
   </p:cSld>
@@ -7675,12 +7814,12 @@
           <a:chExt cx="0" cy="0"/>
         </a:xfrm>
       </p:grpSpPr>
-      <p:sp useBgFill="1">
-        <p:nvSpPr>
-          <p:cNvPr id="24" name="Rectangle 17">
+      <p:sp>
+        <p:nvSpPr>
+          <p:cNvPr id="9" name="Rectangle 8">
             <a:extLst>
               <a:ext uri="{FF2B5EF4-FFF2-40B4-BE49-F238E27FC236}">
-                <a16:creationId xmlns:a16="http://schemas.microsoft.com/office/drawing/2014/main" id="{44CC594A-A820-450F-B363-C19201FCFEC6}"/>
+                <a16:creationId xmlns:a16="http://schemas.microsoft.com/office/drawing/2014/main" id="{4E4490D0-3672-446A-AC12-B4830333BDDD}"/>
               </a:ext>
               <a:ext uri="{C183D7F6-B498-43B3-948B-1728B52AA6E4}">
                 <adec:decorative xmlns:adec="http://schemas.microsoft.com/office/drawing/2017/decorative" val="1"/>
@@ -7700,68 +7839,8 @@
         </p:nvSpPr>
         <p:spPr>
           <a:xfrm>
-            <a:off x="0" y="0"/>
-            <a:ext cx="12186315" cy="6858000"/>
-          </a:xfrm>
-          <a:prstGeom prst="rect">
-            <a:avLst/>
-          </a:prstGeom>
-          <a:ln>
-            <a:noFill/>
-          </a:ln>
-        </p:spPr>
-        <p:style>
-          <a:lnRef idx="2">
-            <a:schemeClr val="accent6">
-              <a:shade val="50000"/>
-            </a:schemeClr>
-          </a:lnRef>
-          <a:fillRef idx="1001">
-            <a:schemeClr val="lt1"/>
-          </a:fillRef>
-          <a:effectRef idx="0">
-            <a:schemeClr val="accent6"/>
-          </a:effectRef>
-          <a:fontRef idx="minor">
-            <a:schemeClr val="lt1"/>
-          </a:fontRef>
-        </p:style>
-        <p:txBody>
-          <a:bodyPr rtlCol="0" anchor="ctr"/>
-          <a:lstStyle/>
-          <a:p>
-            <a:pPr algn="ctr"/>
-            <a:endParaRPr lang="en-US"/>
-          </a:p>
-        </p:txBody>
-      </p:sp>
-      <p:sp>
-        <p:nvSpPr>
-          <p:cNvPr id="25" name="Rectangle 19">
-            <a:extLst>
-              <a:ext uri="{FF2B5EF4-FFF2-40B4-BE49-F238E27FC236}">
-                <a16:creationId xmlns:a16="http://schemas.microsoft.com/office/drawing/2014/main" id="{59FAB3DA-E9ED-4574-ABCC-378BC0FF1BBC}"/>
-              </a:ext>
-              <a:ext uri="{C183D7F6-B498-43B3-948B-1728B52AA6E4}">
-                <adec:decorative xmlns:adec="http://schemas.microsoft.com/office/drawing/2017/decorative" val="1"/>
-              </a:ext>
-            </a:extLst>
-          </p:cNvPr>
-          <p:cNvSpPr>
-            <a:spLocks noGrp="1" noRot="1" noChangeAspect="1" noMove="1" noResize="1" noEditPoints="1" noAdjustHandles="1" noChangeArrowheads="1" noChangeShapeType="1" noTextEdit="1"/>
-          </p:cNvSpPr>
-          <p:nvPr>
-            <p:extLst>
-              <p:ext uri="{386F3935-93C4-4BCD-93E2-E3B085C9AB24}">
-                <p16:designElem xmlns:p16="http://schemas.microsoft.com/office/powerpoint/2015/main" val="1"/>
-              </p:ext>
-            </p:extLst>
-          </p:nvPr>
-        </p:nvSpPr>
-        <p:spPr>
-          <a:xfrm>
-            <a:off x="16" y="0"/>
-            <a:ext cx="4050791" cy="6858000"/>
+            <a:off x="3175" y="6400800"/>
+            <a:ext cx="12188825" cy="457200"/>
           </a:xfrm>
           <a:prstGeom prst="rect">
             <a:avLst/>
@@ -7792,169 +7871,10 @@
       </p:sp>
       <p:sp>
         <p:nvSpPr>
-          <p:cNvPr id="2" name="Title 1">
+          <p:cNvPr id="11" name="Rectangle 10">
             <a:extLst>
               <a:ext uri="{FF2B5EF4-FFF2-40B4-BE49-F238E27FC236}">
-                <a16:creationId xmlns:a16="http://schemas.microsoft.com/office/drawing/2014/main" id="{A4890AAB-AD6E-4D0C-C387-EDC80BC6710E}"/>
-              </a:ext>
-            </a:extLst>
-          </p:cNvPr>
-          <p:cNvSpPr>
-            <a:spLocks noGrp="1"/>
-          </p:cNvSpPr>
-          <p:nvPr>
-            <p:ph type="title"/>
-          </p:nvPr>
-        </p:nvSpPr>
-        <p:spPr>
-          <a:xfrm>
-            <a:off x="492370" y="516835"/>
-            <a:ext cx="3084844" cy="2103875"/>
-          </a:xfrm>
-        </p:spPr>
-        <p:txBody>
-          <a:bodyPr>
-            <a:normAutofit/>
-          </a:bodyPr>
-          <a:lstStyle/>
-          <a:p>
-            <a:r>
-              <a:rPr lang="en-US" sz="3100">
-                <a:solidFill>
-                  <a:srgbClr val="FFFFFF"/>
-                </a:solidFill>
-              </a:rPr>
-              <a:t>Visualisation - Different offence types for the selected LGA and year</a:t>
-            </a:r>
-            <a:endParaRPr lang="en-AU" sz="3100">
-              <a:solidFill>
-                <a:srgbClr val="FFFFFF"/>
-              </a:solidFill>
-            </a:endParaRPr>
-          </a:p>
-        </p:txBody>
-      </p:sp>
-      <p:sp>
-        <p:nvSpPr>
-          <p:cNvPr id="3" name="Content Placeholder 2">
-            <a:extLst>
-              <a:ext uri="{FF2B5EF4-FFF2-40B4-BE49-F238E27FC236}">
-                <a16:creationId xmlns:a16="http://schemas.microsoft.com/office/drawing/2014/main" id="{A2747452-7799-79D9-1C74-222841D88F7A}"/>
-              </a:ext>
-            </a:extLst>
-          </p:cNvPr>
-          <p:cNvSpPr>
-            <a:spLocks noGrp="1"/>
-          </p:cNvSpPr>
-          <p:nvPr>
-            <p:ph idx="1"/>
-          </p:nvPr>
-        </p:nvSpPr>
-        <p:spPr>
-          <a:xfrm>
-            <a:off x="492371" y="2653800"/>
-            <a:ext cx="3084844" cy="3335519"/>
-          </a:xfrm>
-        </p:spPr>
-        <p:txBody>
-          <a:bodyPr>
-            <a:normAutofit/>
-          </a:bodyPr>
-          <a:lstStyle/>
-          <a:p>
-            <a:r>
-              <a:rPr lang="en-US" sz="1500" dirty="0">
-                <a:solidFill>
-                  <a:srgbClr val="FFFFFF"/>
-                </a:solidFill>
-                <a:latin typeface="+mj-lt"/>
-              </a:rPr>
-              <a:t>Using the filters on the same page and </a:t>
-            </a:r>
-            <a:r>
-              <a:rPr lang="en-US" sz="1500" dirty="0" err="1">
-                <a:solidFill>
-                  <a:srgbClr val="FFFFFF"/>
-                </a:solidFill>
-                <a:latin typeface="+mj-lt"/>
-              </a:rPr>
-              <a:t>Plotly</a:t>
-            </a:r>
-            <a:r>
-              <a:rPr lang="en-US" sz="1500" dirty="0">
-                <a:solidFill>
-                  <a:srgbClr val="FFFFFF"/>
-                </a:solidFill>
-                <a:latin typeface="+mj-lt"/>
-              </a:rPr>
-              <a:t>, we display a bar chart representing the different offence types for a specific Local Government area for a specific year. </a:t>
-            </a:r>
-          </a:p>
-          <a:p>
-            <a:r>
-              <a:rPr lang="en-US" sz="1500" b="1" dirty="0">
-                <a:solidFill>
-                  <a:srgbClr val="FFFFFF"/>
-                </a:solidFill>
-                <a:latin typeface="+mj-lt"/>
-              </a:rPr>
-              <a:t>Technical Background</a:t>
-            </a:r>
-          </a:p>
-          <a:p>
-            <a:r>
-              <a:rPr lang="en-US" sz="1500" dirty="0" err="1">
-                <a:solidFill>
-                  <a:srgbClr val="FFFFFF"/>
-                </a:solidFill>
-                <a:latin typeface="+mj-lt"/>
-              </a:rPr>
-              <a:t>Javascript</a:t>
-            </a:r>
-            <a:r>
-              <a:rPr lang="en-US" sz="1500" dirty="0">
-                <a:solidFill>
-                  <a:srgbClr val="FFFFFF"/>
-                </a:solidFill>
-                <a:latin typeface="+mj-lt"/>
-              </a:rPr>
-              <a:t>, </a:t>
-            </a:r>
-            <a:r>
-              <a:rPr lang="en-US" sz="1500" dirty="0" err="1">
-                <a:solidFill>
-                  <a:srgbClr val="FFFFFF"/>
-                </a:solidFill>
-                <a:latin typeface="+mj-lt"/>
-              </a:rPr>
-              <a:t>Plotly</a:t>
-            </a:r>
-            <a:r>
-              <a:rPr lang="en-US" sz="1500" dirty="0">
-                <a:solidFill>
-                  <a:srgbClr val="FFFFFF"/>
-                </a:solidFill>
-                <a:latin typeface="+mj-lt"/>
-              </a:rPr>
-              <a:t>, D3</a:t>
-            </a:r>
-          </a:p>
-          <a:p>
-            <a:endParaRPr lang="en-US" sz="1500" dirty="0">
-              <a:solidFill>
-                <a:srgbClr val="FFFFFF"/>
-              </a:solidFill>
-              <a:latin typeface="+mj-lt"/>
-            </a:endParaRPr>
-          </a:p>
-        </p:txBody>
-      </p:sp>
-      <p:sp>
-        <p:nvSpPr>
-          <p:cNvPr id="26" name="Rectangle 21">
-            <a:extLst>
-              <a:ext uri="{FF2B5EF4-FFF2-40B4-BE49-F238E27FC236}">
-                <a16:creationId xmlns:a16="http://schemas.microsoft.com/office/drawing/2014/main" id="{53B8D6B0-55D6-48DC-86D8-FD95D5F118AB}"/>
+                <a16:creationId xmlns:a16="http://schemas.microsoft.com/office/drawing/2014/main" id="{39CB82C2-DF65-4EC1-8280-F201D50F570B}"/>
               </a:ext>
               <a:ext uri="{C183D7F6-B498-43B3-948B-1728B52AA6E4}">
                 <adec:decorative xmlns:adec="http://schemas.microsoft.com/office/drawing/2017/decorative" val="1"/>
@@ -7974,8 +7894,8 @@
         </p:nvSpPr>
         <p:spPr>
           <a:xfrm>
-            <a:off x="4040071" y="0"/>
-            <a:ext cx="64008" cy="6858000"/>
+            <a:off x="15" y="6334316"/>
+            <a:ext cx="12188825" cy="64008"/>
           </a:xfrm>
           <a:prstGeom prst="rect">
             <a:avLst/>
@@ -8004,40 +7924,570 @@
           </a:fontRef>
         </p:style>
       </p:sp>
-      <p:graphicFrame>
-        <p:nvGraphicFramePr>
-          <p:cNvPr id="4" name="Chart 3">
+      <p:cxnSp>
+        <p:nvCxnSpPr>
+          <p:cNvPr id="13" name="Straight Connector 12">
             <a:extLst>
               <a:ext uri="{FF2B5EF4-FFF2-40B4-BE49-F238E27FC236}">
-                <a16:creationId xmlns:a16="http://schemas.microsoft.com/office/drawing/2014/main" id="{7A7D3E6D-BA77-35F4-4990-16CEA3386012}"/>
+                <a16:creationId xmlns:a16="http://schemas.microsoft.com/office/drawing/2014/main" id="{7E1D4427-852B-4B37-8E76-0E9F1810BA2A}"/>
+              </a:ext>
+              <a:ext uri="{C183D7F6-B498-43B3-948B-1728B52AA6E4}">
+                <adec:decorative xmlns:adec="http://schemas.microsoft.com/office/drawing/2017/decorative" val="1"/>
               </a:ext>
             </a:extLst>
           </p:cNvPr>
-          <p:cNvGraphicFramePr>
-            <a:graphicFrameLocks/>
-          </p:cNvGraphicFramePr>
+          <p:cNvCxnSpPr>
+            <a:cxnSpLocks noGrp="1" noRot="1" noChangeAspect="1" noMove="1" noResize="1" noEditPoints="1" noAdjustHandles="1" noChangeArrowheads="1" noChangeShapeType="1"/>
+          </p:cNvCxnSpPr>
           <p:nvPr>
             <p:extLst>
-              <p:ext uri="{D42A27DB-BD31-4B8C-83A1-F6EECF244321}">
-                <p14:modId xmlns:p14="http://schemas.microsoft.com/office/powerpoint/2010/main" val="468368191"/>
+              <p:ext uri="{386F3935-93C4-4BCD-93E2-E3B085C9AB24}">
+                <p16:designElem xmlns:p16="http://schemas.microsoft.com/office/powerpoint/2015/main" val="1"/>
               </p:ext>
             </p:extLst>
           </p:nvPr>
-        </p:nvGraphicFramePr>
-        <p:xfrm>
-          <a:off x="4742017" y="640080"/>
-          <a:ext cx="6798082" cy="5577840"/>
-        </p:xfrm>
-        <a:graphic>
-          <a:graphicData uri="http://schemas.openxmlformats.org/drawingml/2006/chart">
-            <c:chart xmlns:c="http://schemas.openxmlformats.org/drawingml/2006/chart" xmlns:r="http://schemas.openxmlformats.org/officeDocument/2006/relationships" r:id="rId2"/>
-          </a:graphicData>
-        </a:graphic>
-      </p:graphicFrame>
+        </p:nvCxnSpPr>
+        <p:spPr>
+          <a:xfrm>
+            <a:off x="1207658" y="4343400"/>
+            <a:ext cx="9875520" cy="0"/>
+          </a:xfrm>
+          <a:prstGeom prst="line">
+            <a:avLst/>
+          </a:prstGeom>
+          <a:ln w="6350">
+            <a:solidFill>
+              <a:schemeClr val="tx1">
+                <a:lumMod val="50000"/>
+                <a:lumOff val="50000"/>
+              </a:schemeClr>
+            </a:solidFill>
+          </a:ln>
+        </p:spPr>
+        <p:style>
+          <a:lnRef idx="1">
+            <a:schemeClr val="accent1"/>
+          </a:lnRef>
+          <a:fillRef idx="0">
+            <a:schemeClr val="accent1"/>
+          </a:fillRef>
+          <a:effectRef idx="0">
+            <a:schemeClr val="accent1"/>
+          </a:effectRef>
+          <a:fontRef idx="minor">
+            <a:schemeClr val="tx1"/>
+          </a:fontRef>
+        </p:style>
+      </p:cxnSp>
+      <p:sp useBgFill="1">
+        <p:nvSpPr>
+          <p:cNvPr id="15" name="Rectangle 14">
+            <a:extLst>
+              <a:ext uri="{FF2B5EF4-FFF2-40B4-BE49-F238E27FC236}">
+                <a16:creationId xmlns:a16="http://schemas.microsoft.com/office/drawing/2014/main" id="{5A1B47C8-47A0-4A88-8830-6DEA3B5DE392}"/>
+              </a:ext>
+              <a:ext uri="{C183D7F6-B498-43B3-948B-1728B52AA6E4}">
+                <adec:decorative xmlns:adec="http://schemas.microsoft.com/office/drawing/2017/decorative" val="1"/>
+              </a:ext>
+            </a:extLst>
+          </p:cNvPr>
+          <p:cNvSpPr>
+            <a:spLocks noGrp="1" noRot="1" noChangeAspect="1" noMove="1" noResize="1" noEditPoints="1" noAdjustHandles="1" noChangeArrowheads="1" noChangeShapeType="1" noTextEdit="1"/>
+          </p:cNvSpPr>
+          <p:nvPr>
+            <p:extLst>
+              <p:ext uri="{386F3935-93C4-4BCD-93E2-E3B085C9AB24}">
+                <p16:designElem xmlns:p16="http://schemas.microsoft.com/office/powerpoint/2015/main" val="1"/>
+              </p:ext>
+            </p:extLst>
+          </p:nvPr>
+        </p:nvSpPr>
+        <p:spPr>
+          <a:xfrm>
+            <a:off x="0" y="0"/>
+            <a:ext cx="12192000" cy="6858000"/>
+          </a:xfrm>
+          <a:prstGeom prst="rect">
+            <a:avLst/>
+          </a:prstGeom>
+          <a:ln>
+            <a:noFill/>
+          </a:ln>
+        </p:spPr>
+        <p:style>
+          <a:lnRef idx="2">
+            <a:schemeClr val="accent1">
+              <a:shade val="50000"/>
+            </a:schemeClr>
+          </a:lnRef>
+          <a:fillRef idx="1001">
+            <a:schemeClr val="lt1"/>
+          </a:fillRef>
+          <a:effectRef idx="0">
+            <a:schemeClr val="accent1"/>
+          </a:effectRef>
+          <a:fontRef idx="minor">
+            <a:schemeClr val="lt1"/>
+          </a:fontRef>
+        </p:style>
+        <p:txBody>
+          <a:bodyPr rtlCol="0" anchor="ctr"/>
+          <a:lstStyle/>
+          <a:p>
+            <a:pPr marL="0" marR="0" lvl="0" indent="0" algn="ctr" defTabSz="457200" rtl="0" eaLnBrk="1" fontAlgn="auto" latinLnBrk="0" hangingPunct="1">
+              <a:lnSpc>
+                <a:spcPct val="100000"/>
+              </a:lnSpc>
+              <a:spcBef>
+                <a:spcPts val="0"/>
+              </a:spcBef>
+              <a:spcAft>
+                <a:spcPts val="0"/>
+              </a:spcAft>
+              <a:buClrTx/>
+              <a:buSzTx/>
+              <a:buFontTx/>
+              <a:buNone/>
+              <a:tabLst/>
+              <a:defRPr/>
+            </a:pPr>
+            <a:endParaRPr kumimoji="0" lang="en-US" sz="1800" b="0" i="0" u="none" strike="noStrike" kern="1200" cap="none" spc="0" normalizeH="0" baseline="0" noProof="0">
+              <a:ln>
+                <a:noFill/>
+              </a:ln>
+              <a:solidFill>
+                <a:prstClr val="white"/>
+              </a:solidFill>
+              <a:effectLst/>
+              <a:uLnTx/>
+              <a:uFillTx/>
+              <a:latin typeface="Calibri" panose="020F0502020204030204"/>
+              <a:ea typeface="+mn-ea"/>
+              <a:cs typeface="+mn-cs"/>
+            </a:endParaRPr>
+          </a:p>
+        </p:txBody>
+      </p:sp>
+      <p:sp>
+        <p:nvSpPr>
+          <p:cNvPr id="17" name="Rectangle 16">
+            <a:extLst>
+              <a:ext uri="{FF2B5EF4-FFF2-40B4-BE49-F238E27FC236}">
+                <a16:creationId xmlns:a16="http://schemas.microsoft.com/office/drawing/2014/main" id="{984BBFDD-E720-4805-A9C8-129FBBF6DD70}"/>
+              </a:ext>
+              <a:ext uri="{C183D7F6-B498-43B3-948B-1728B52AA6E4}">
+                <adec:decorative xmlns:adec="http://schemas.microsoft.com/office/drawing/2017/decorative" val="1"/>
+              </a:ext>
+            </a:extLst>
+          </p:cNvPr>
+          <p:cNvSpPr>
+            <a:spLocks noGrp="1" noRot="1" noChangeAspect="1" noMove="1" noResize="1" noEditPoints="1" noAdjustHandles="1" noChangeArrowheads="1" noChangeShapeType="1" noTextEdit="1"/>
+          </p:cNvSpPr>
+          <p:nvPr>
+            <p:extLst>
+              <p:ext uri="{386F3935-93C4-4BCD-93E2-E3B085C9AB24}">
+                <p16:designElem xmlns:p16="http://schemas.microsoft.com/office/powerpoint/2015/main" val="1"/>
+              </p:ext>
+            </p:extLst>
+          </p:nvPr>
+        </p:nvSpPr>
+        <p:spPr bwMode="white">
+          <a:xfrm>
+            <a:off x="7613486" y="0"/>
+            <a:ext cx="4584734" cy="6858000"/>
+          </a:xfrm>
+          <a:prstGeom prst="rect">
+            <a:avLst/>
+          </a:prstGeom>
+          <a:solidFill>
+            <a:schemeClr val="accent2"/>
+          </a:solidFill>
+          <a:ln>
+            <a:noFill/>
+          </a:ln>
+        </p:spPr>
+        <p:style>
+          <a:lnRef idx="2">
+            <a:schemeClr val="accent1">
+              <a:shade val="50000"/>
+            </a:schemeClr>
+          </a:lnRef>
+          <a:fillRef idx="1">
+            <a:schemeClr val="accent1"/>
+          </a:fillRef>
+          <a:effectRef idx="0">
+            <a:schemeClr val="accent1"/>
+          </a:effectRef>
+          <a:fontRef idx="minor">
+            <a:schemeClr val="lt1"/>
+          </a:fontRef>
+        </p:style>
+      </p:sp>
+      <p:sp>
+        <p:nvSpPr>
+          <p:cNvPr id="2" name="Title 1">
+            <a:extLst>
+              <a:ext uri="{FF2B5EF4-FFF2-40B4-BE49-F238E27FC236}">
+                <a16:creationId xmlns:a16="http://schemas.microsoft.com/office/drawing/2014/main" id="{75A5A951-1B12-FC62-4875-59A74BDA964F}"/>
+              </a:ext>
+            </a:extLst>
+          </p:cNvPr>
+          <p:cNvSpPr>
+            <a:spLocks noGrp="1"/>
+          </p:cNvSpPr>
+          <p:nvPr>
+            <p:ph type="title"/>
+          </p:nvPr>
+        </p:nvSpPr>
+        <p:spPr>
+          <a:xfrm>
+            <a:off x="7829962" y="369869"/>
+            <a:ext cx="3189209" cy="5772422"/>
+          </a:xfrm>
+        </p:spPr>
+        <p:txBody>
+          <a:bodyPr vert="horz" lIns="91440" tIns="45720" rIns="91440" bIns="45720" rtlCol="0" anchor="b">
+            <a:noAutofit/>
+          </a:bodyPr>
+          <a:lstStyle/>
+          <a:p>
+            <a:br>
+              <a:rPr lang="en-US" sz="2400" dirty="0">
+                <a:solidFill>
+                  <a:srgbClr val="FFFFFF"/>
+                </a:solidFill>
+              </a:rPr>
+            </a:br>
+            <a:r>
+              <a:rPr lang="en-US" sz="2000" dirty="0">
+                <a:solidFill>
+                  <a:srgbClr val="FFFFFF"/>
+                </a:solidFill>
+              </a:rPr>
+              <a:t>Data  Analysis</a:t>
+            </a:r>
+            <a:br>
+              <a:rPr lang="en-US" sz="2000" dirty="0">
+                <a:solidFill>
+                  <a:srgbClr val="FFFFFF"/>
+                </a:solidFill>
+              </a:rPr>
+            </a:br>
+            <a:br>
+              <a:rPr lang="en-US" sz="2000" dirty="0">
+                <a:solidFill>
+                  <a:srgbClr val="FFFFFF"/>
+                </a:solidFill>
+              </a:rPr>
+            </a:br>
+            <a:r>
+              <a:rPr lang="en-US" sz="2000" dirty="0">
+                <a:solidFill>
+                  <a:srgbClr val="FFFFFF"/>
+                </a:solidFill>
+              </a:rPr>
+              <a:t>In 2022, Melbourne had the highest number of offences; next to it were </a:t>
+            </a:r>
+            <a:r>
+              <a:rPr lang="en-US" sz="2000" dirty="0" err="1">
+                <a:solidFill>
+                  <a:srgbClr val="FFFFFF"/>
+                </a:solidFill>
+              </a:rPr>
+              <a:t>Brimbank</a:t>
+            </a:r>
+            <a:r>
+              <a:rPr lang="en-US" sz="2000" dirty="0">
+                <a:solidFill>
+                  <a:srgbClr val="FFFFFF"/>
+                </a:solidFill>
+              </a:rPr>
+              <a:t> and Wyndham.  </a:t>
+            </a:r>
+            <a:br>
+              <a:rPr lang="en-US" sz="2000" dirty="0">
+                <a:solidFill>
+                  <a:srgbClr val="FFFFFF"/>
+                </a:solidFill>
+              </a:rPr>
+            </a:br>
+            <a:br>
+              <a:rPr lang="en-US" sz="2000" dirty="0">
+                <a:solidFill>
+                  <a:srgbClr val="FFFFFF"/>
+                </a:solidFill>
+              </a:rPr>
+            </a:br>
+            <a:br>
+              <a:rPr lang="en-US" sz="2000" dirty="0">
+                <a:solidFill>
+                  <a:srgbClr val="FFFFFF"/>
+                </a:solidFill>
+              </a:rPr>
+            </a:br>
+            <a:br>
+              <a:rPr lang="en-US" sz="2000" dirty="0">
+                <a:solidFill>
+                  <a:srgbClr val="FFFFFF"/>
+                </a:solidFill>
+              </a:rPr>
+            </a:br>
+            <a:r>
+              <a:rPr lang="en-US" sz="2000" dirty="0">
+                <a:solidFill>
+                  <a:srgbClr val="FFFFFF"/>
+                </a:solidFill>
+              </a:rPr>
+              <a:t>Technical  background</a:t>
+            </a:r>
+            <a:br>
+              <a:rPr lang="en-US" sz="2000" dirty="0">
+                <a:solidFill>
+                  <a:srgbClr val="FFFFFF"/>
+                </a:solidFill>
+              </a:rPr>
+            </a:br>
+            <a:br>
+              <a:rPr lang="en-US" sz="2000" dirty="0">
+                <a:solidFill>
+                  <a:srgbClr val="FFFFFF"/>
+                </a:solidFill>
+              </a:rPr>
+            </a:br>
+            <a:r>
+              <a:rPr lang="en-US" sz="2000" dirty="0">
+                <a:solidFill>
+                  <a:srgbClr val="FFFFFF"/>
+                </a:solidFill>
+              </a:rPr>
+              <a:t>This bubble chart was created using </a:t>
+            </a:r>
+            <a:r>
+              <a:rPr lang="en-US" sz="2000" dirty="0" err="1">
+                <a:solidFill>
+                  <a:srgbClr val="FFFFFF"/>
+                </a:solidFill>
+              </a:rPr>
+              <a:t>plotly</a:t>
+            </a:r>
+            <a:r>
+              <a:rPr lang="en-US" sz="2000" dirty="0">
+                <a:solidFill>
+                  <a:srgbClr val="FFFFFF"/>
+                </a:solidFill>
+              </a:rPr>
+              <a:t>.</a:t>
+            </a:r>
+            <a:br>
+              <a:rPr lang="en-US" sz="2000" dirty="0">
+                <a:solidFill>
+                  <a:srgbClr val="FFFFFF"/>
+                </a:solidFill>
+              </a:rPr>
+            </a:br>
+            <a:br>
+              <a:rPr lang="en-US" sz="2000" dirty="0">
+                <a:solidFill>
+                  <a:srgbClr val="FFFFFF"/>
+                </a:solidFill>
+              </a:rPr>
+            </a:br>
+            <a:r>
+              <a:rPr lang="en-US" sz="2000" dirty="0">
+                <a:solidFill>
+                  <a:srgbClr val="FFFFFF"/>
+                </a:solidFill>
+              </a:rPr>
+              <a:t>Hover over a bubble will show LGA’s name and its incident count.</a:t>
+            </a:r>
+            <a:br>
+              <a:rPr lang="en-US" sz="2000" dirty="0">
+                <a:solidFill>
+                  <a:srgbClr val="FFFFFF"/>
+                </a:solidFill>
+              </a:rPr>
+            </a:br>
+            <a:br>
+              <a:rPr lang="en-US" sz="2000" dirty="0">
+                <a:solidFill>
+                  <a:srgbClr val="FFFFFF"/>
+                </a:solidFill>
+              </a:rPr>
+            </a:br>
+            <a:br>
+              <a:rPr lang="en-US" sz="2000" dirty="0">
+                <a:solidFill>
+                  <a:srgbClr val="FFFFFF"/>
+                </a:solidFill>
+              </a:rPr>
+            </a:br>
+            <a:endParaRPr lang="en-US" sz="2000" dirty="0">
+              <a:solidFill>
+                <a:srgbClr val="FFFFFF"/>
+              </a:solidFill>
+            </a:endParaRPr>
+          </a:p>
+        </p:txBody>
+      </p:sp>
+      <p:sp>
+        <p:nvSpPr>
+          <p:cNvPr id="19" name="Rectangle 18">
+            <a:extLst>
+              <a:ext uri="{FF2B5EF4-FFF2-40B4-BE49-F238E27FC236}">
+                <a16:creationId xmlns:a16="http://schemas.microsoft.com/office/drawing/2014/main" id="{5AC4BE46-4A77-42FE-9D15-065CDB2F847C}"/>
+              </a:ext>
+              <a:ext uri="{C183D7F6-B498-43B3-948B-1728B52AA6E4}">
+                <adec:decorative xmlns:adec="http://schemas.microsoft.com/office/drawing/2017/decorative" val="1"/>
+              </a:ext>
+            </a:extLst>
+          </p:cNvPr>
+          <p:cNvSpPr>
+            <a:spLocks noGrp="1" noRot="1" noChangeAspect="1" noMove="1" noResize="1" noEditPoints="1" noAdjustHandles="1" noChangeArrowheads="1" noChangeShapeType="1" noTextEdit="1"/>
+          </p:cNvSpPr>
+          <p:nvPr>
+            <p:extLst>
+              <p:ext uri="{386F3935-93C4-4BCD-93E2-E3B085C9AB24}">
+                <p16:designElem xmlns:p16="http://schemas.microsoft.com/office/powerpoint/2015/main" val="1"/>
+              </p:ext>
+            </p:extLst>
+          </p:nvPr>
+        </p:nvSpPr>
+        <p:spPr>
+          <a:xfrm>
+            <a:off x="7556906" y="0"/>
+            <a:ext cx="64008" cy="6858000"/>
+          </a:xfrm>
+          <a:prstGeom prst="rect">
+            <a:avLst/>
+          </a:prstGeom>
+          <a:solidFill>
+            <a:schemeClr val="accent1"/>
+          </a:solidFill>
+          <a:ln>
+            <a:noFill/>
+          </a:ln>
+        </p:spPr>
+        <p:style>
+          <a:lnRef idx="2">
+            <a:schemeClr val="accent1">
+              <a:shade val="50000"/>
+            </a:schemeClr>
+          </a:lnRef>
+          <a:fillRef idx="1">
+            <a:schemeClr val="accent1"/>
+          </a:fillRef>
+          <a:effectRef idx="0">
+            <a:schemeClr val="accent1"/>
+          </a:effectRef>
+          <a:fontRef idx="minor">
+            <a:schemeClr val="lt1"/>
+          </a:fontRef>
+        </p:style>
+      </p:sp>
+      <p:sp>
+        <p:nvSpPr>
+          <p:cNvPr id="7" name="TextBox 6">
+            <a:extLst>
+              <a:ext uri="{FF2B5EF4-FFF2-40B4-BE49-F238E27FC236}">
+                <a16:creationId xmlns:a16="http://schemas.microsoft.com/office/drawing/2014/main" id="{BBD6697D-2431-035B-A37E-0089CFBE1ECA}"/>
+              </a:ext>
+            </a:extLst>
+          </p:cNvPr>
+          <p:cNvSpPr txBox="1"/>
+          <p:nvPr/>
+        </p:nvSpPr>
+        <p:spPr>
+          <a:xfrm>
+            <a:off x="540384" y="883855"/>
+            <a:ext cx="6609446" cy="584775"/>
+          </a:xfrm>
+          <a:prstGeom prst="rect">
+            <a:avLst/>
+          </a:prstGeom>
+          <a:noFill/>
+        </p:spPr>
+        <p:txBody>
+          <a:bodyPr wrap="square">
+            <a:spAutoFit/>
+          </a:bodyPr>
+          <a:lstStyle/>
+          <a:p>
+            <a:pPr marL="0" marR="0" lvl="0" indent="0" algn="l" defTabSz="457200" rtl="0" eaLnBrk="1" fontAlgn="auto" latinLnBrk="0" hangingPunct="1">
+              <a:lnSpc>
+                <a:spcPct val="100000"/>
+              </a:lnSpc>
+              <a:spcBef>
+                <a:spcPts val="0"/>
+              </a:spcBef>
+              <a:spcAft>
+                <a:spcPts val="0"/>
+              </a:spcAft>
+              <a:buClrTx/>
+              <a:buSzTx/>
+              <a:buFontTx/>
+              <a:buNone/>
+              <a:tabLst/>
+              <a:defRPr/>
+            </a:pPr>
+            <a:r>
+              <a:rPr kumimoji="0" lang="en-US" sz="3200" b="1" i="0" u="none" strike="noStrike" kern="1200" cap="none" spc="0" normalizeH="0" baseline="0" noProof="0" dirty="0">
+                <a:ln>
+                  <a:noFill/>
+                </a:ln>
+                <a:solidFill>
+                  <a:schemeClr val="accent2"/>
+                </a:solidFill>
+                <a:effectLst/>
+                <a:uLnTx/>
+                <a:uFillTx/>
+                <a:latin typeface="Calibri" panose="020F0502020204030204"/>
+                <a:ea typeface="+mn-ea"/>
+                <a:cs typeface="+mn-cs"/>
+              </a:rPr>
+              <a:t>Regional Local Government Offences</a:t>
+            </a:r>
+          </a:p>
+        </p:txBody>
+      </p:sp>
+      <p:pic>
+        <p:nvPicPr>
+          <p:cNvPr id="5" name="Content Placeholder 4" descr="Chart, bubble chart&#10;&#10;Description automatically generated">
+            <a:extLst>
+              <a:ext uri="{FF2B5EF4-FFF2-40B4-BE49-F238E27FC236}">
+                <a16:creationId xmlns:a16="http://schemas.microsoft.com/office/drawing/2014/main" id="{E2845C4B-AF88-B49D-1DFC-01D409619B1F}"/>
+              </a:ext>
+            </a:extLst>
+          </p:cNvPr>
+          <p:cNvPicPr>
+            <a:picLocks noGrp="1" noChangeAspect="1"/>
+          </p:cNvPicPr>
+          <p:nvPr>
+            <p:ph idx="1"/>
+          </p:nvPr>
+        </p:nvPicPr>
+        <p:blipFill>
+          <a:blip r:embed="rId2">
+            <a:extLst>
+              <a:ext uri="{28A0092B-C50C-407E-A947-70E740481C1C}">
+                <a14:useLocalDpi xmlns:a14="http://schemas.microsoft.com/office/drawing/2010/main" val="0"/>
+              </a:ext>
+            </a:extLst>
+          </a:blip>
+          <a:stretch>
+            <a:fillRect/>
+          </a:stretch>
+        </p:blipFill>
+        <p:spPr>
+          <a:xfrm>
+            <a:off x="241531" y="2354095"/>
+            <a:ext cx="7315376" cy="4045468"/>
+          </a:xfrm>
+        </p:spPr>
+      </p:pic>
     </p:spTree>
     <p:extLst>
       <p:ext uri="{BB962C8B-B14F-4D97-AF65-F5344CB8AC3E}">
-        <p14:creationId xmlns:p14="http://schemas.microsoft.com/office/powerpoint/2010/main" val="2516570333"/>
+        <p14:creationId xmlns:p14="http://schemas.microsoft.com/office/powerpoint/2010/main" val="226462623"/>
       </p:ext>
     </p:extLst>
   </p:cSld>
@@ -8074,10 +8524,10 @@
       </p:grpSpPr>
       <p:sp useBgFill="1">
         <p:nvSpPr>
-          <p:cNvPr id="8" name="Rectangle 7">
+          <p:cNvPr id="34" name="Rectangle 27">
             <a:extLst>
               <a:ext uri="{FF2B5EF4-FFF2-40B4-BE49-F238E27FC236}">
-                <a16:creationId xmlns:a16="http://schemas.microsoft.com/office/drawing/2014/main" id="{3741B58E-3B65-4A01-A276-975AB2CF8A08}"/>
+                <a16:creationId xmlns:a16="http://schemas.microsoft.com/office/drawing/2014/main" id="{44CC594A-A820-450F-B363-C19201FCFEC6}"/>
               </a:ext>
               <a:ext uri="{C183D7F6-B498-43B3-948B-1728B52AA6E4}">
                 <adec:decorative xmlns:adec="http://schemas.microsoft.com/office/drawing/2017/decorative" val="1"/>
@@ -8134,10 +8584,10 @@
       </p:sp>
       <p:sp>
         <p:nvSpPr>
-          <p:cNvPr id="10" name="Rectangle 9">
+          <p:cNvPr id="35" name="Rectangle 29">
             <a:extLst>
               <a:ext uri="{FF2B5EF4-FFF2-40B4-BE49-F238E27FC236}">
-                <a16:creationId xmlns:a16="http://schemas.microsoft.com/office/drawing/2014/main" id="{7AAC67C3-831B-4AB1-A259-DFB839CAFAFC}"/>
+                <a16:creationId xmlns:a16="http://schemas.microsoft.com/office/drawing/2014/main" id="{59FAB3DA-E9ED-4574-ABCC-378BC0FF1BBC}"/>
               </a:ext>
               <a:ext uri="{C183D7F6-B498-43B3-948B-1728B52AA6E4}">
                 <adec:decorative xmlns:adec="http://schemas.microsoft.com/office/drawing/2017/decorative" val="1"/>
@@ -8189,10 +8639,10 @@
       </p:sp>
       <p:sp>
         <p:nvSpPr>
-          <p:cNvPr id="2" name="Title 1">
+          <p:cNvPr id="4" name="Title 3">
             <a:extLst>
               <a:ext uri="{FF2B5EF4-FFF2-40B4-BE49-F238E27FC236}">
-                <a16:creationId xmlns:a16="http://schemas.microsoft.com/office/drawing/2014/main" id="{62048B59-CA8D-9F7B-C05E-2D0D8376C67C}"/>
+                <a16:creationId xmlns:a16="http://schemas.microsoft.com/office/drawing/2014/main" id="{33626372-42A7-F501-CD18-F3C48E2FD070}"/>
               </a:ext>
             </a:extLst>
           </p:cNvPr>
@@ -8205,38 +8655,203 @@
         </p:nvSpPr>
         <p:spPr>
           <a:xfrm>
-            <a:off x="492370" y="605896"/>
-            <a:ext cx="3084844" cy="5646208"/>
+            <a:off x="4395537" y="778044"/>
+            <a:ext cx="7010400" cy="978568"/>
           </a:xfrm>
         </p:spPr>
         <p:txBody>
-          <a:bodyPr anchor="ctr">
+          <a:bodyPr>
             <a:normAutofit/>
           </a:bodyPr>
           <a:lstStyle/>
           <a:p>
             <a:r>
-              <a:rPr lang="en-US" sz="3100">
-                <a:solidFill>
-                  <a:srgbClr val="FFFFFF"/>
-                </a:solidFill>
-              </a:rPr>
-              <a:t>Findings and recommendations</a:t>
-            </a:r>
-            <a:endParaRPr lang="en-AU" sz="3100">
+              <a:rPr lang="en-US" sz="3600" b="1" dirty="0">
+                <a:solidFill>
+                  <a:schemeClr val="accent2"/>
+                </a:solidFill>
+              </a:rPr>
+              <a:t>Offence Summary – Display and Filter</a:t>
+            </a:r>
+            <a:endParaRPr lang="en-AU" sz="3600" b="1" dirty="0">
+              <a:solidFill>
+                <a:schemeClr val="accent2"/>
+              </a:solidFill>
+            </a:endParaRPr>
+          </a:p>
+        </p:txBody>
+      </p:sp>
+      <p:sp>
+        <p:nvSpPr>
+          <p:cNvPr id="5" name="Content Placeholder 4">
+            <a:extLst>
+              <a:ext uri="{FF2B5EF4-FFF2-40B4-BE49-F238E27FC236}">
+                <a16:creationId xmlns:a16="http://schemas.microsoft.com/office/drawing/2014/main" id="{2AB91FB6-8116-C465-F7A7-A77B58B7017C}"/>
+              </a:ext>
+            </a:extLst>
+          </p:cNvPr>
+          <p:cNvSpPr>
+            <a:spLocks noGrp="1"/>
+          </p:cNvSpPr>
+          <p:nvPr>
+            <p:ph idx="1"/>
+          </p:nvPr>
+        </p:nvSpPr>
+        <p:spPr>
+          <a:xfrm>
+            <a:off x="492371" y="866274"/>
+            <a:ext cx="3084844" cy="5912031"/>
+          </a:xfrm>
+        </p:spPr>
+        <p:txBody>
+          <a:bodyPr>
+            <a:normAutofit lnSpcReduction="10000"/>
+          </a:bodyPr>
+          <a:lstStyle/>
+          <a:p>
+            <a:r>
+              <a:rPr lang="en-US" dirty="0">
+                <a:solidFill>
+                  <a:srgbClr val="FFFFFF"/>
+                </a:solidFill>
+                <a:latin typeface="+mj-lt"/>
+              </a:rPr>
+              <a:t>Using Offense Summary CSV (offence_summary_df.csv)</a:t>
+            </a:r>
+            <a:endParaRPr lang="en-US" dirty="0">
               <a:solidFill>
                 <a:srgbClr val="FFFFFF"/>
               </a:solidFill>
+              <a:highlight>
+                <a:srgbClr val="FFFF00"/>
+              </a:highlight>
+              <a:latin typeface="+mj-lt"/>
             </a:endParaRPr>
           </a:p>
+          <a:p>
+            <a:pPr lvl="1">
+              <a:buFont typeface="Wingdings" panose="05000000000000000000" pitchFamily="2" charset="2"/>
+              <a:buChar char="q"/>
+            </a:pPr>
+            <a:r>
+              <a:rPr lang="en-US" sz="2000" dirty="0">
+                <a:solidFill>
+                  <a:srgbClr val="FFFFFF"/>
+                </a:solidFill>
+                <a:latin typeface="+mj-lt"/>
+              </a:rPr>
+              <a:t>Year</a:t>
+            </a:r>
+          </a:p>
+          <a:p>
+            <a:pPr lvl="1">
+              <a:buFont typeface="Wingdings" panose="05000000000000000000" pitchFamily="2" charset="2"/>
+              <a:buChar char="q"/>
+            </a:pPr>
+            <a:r>
+              <a:rPr lang="en-US" sz="2000" dirty="0">
+                <a:solidFill>
+                  <a:srgbClr val="FFFFFF"/>
+                </a:solidFill>
+                <a:latin typeface="+mj-lt"/>
+              </a:rPr>
+              <a:t>Local Government Area</a:t>
+            </a:r>
+          </a:p>
+          <a:p>
+            <a:pPr lvl="1">
+              <a:buFont typeface="Wingdings" panose="05000000000000000000" pitchFamily="2" charset="2"/>
+              <a:buChar char="q"/>
+            </a:pPr>
+            <a:r>
+              <a:rPr lang="en-US" sz="2000" dirty="0">
+                <a:solidFill>
+                  <a:srgbClr val="FFFFFF"/>
+                </a:solidFill>
+                <a:latin typeface="+mj-lt"/>
+              </a:rPr>
+              <a:t>Offence types (A-F)</a:t>
+            </a:r>
+          </a:p>
+          <a:p>
+            <a:pPr lvl="1"/>
+            <a:endParaRPr lang="en-US" sz="2000" dirty="0">
+              <a:solidFill>
+                <a:srgbClr val="FFFFFF"/>
+              </a:solidFill>
+              <a:latin typeface="+mj-lt"/>
+            </a:endParaRPr>
+          </a:p>
+          <a:p>
+            <a:r>
+              <a:rPr lang="en-US" b="1" dirty="0">
+                <a:solidFill>
+                  <a:srgbClr val="FFFFFF"/>
+                </a:solidFill>
+                <a:latin typeface="+mj-lt"/>
+              </a:rPr>
+              <a:t>Technical Background</a:t>
+            </a:r>
+          </a:p>
+          <a:p>
+            <a:r>
+              <a:rPr lang="en-US" dirty="0">
+                <a:solidFill>
+                  <a:srgbClr val="FFFFFF"/>
+                </a:solidFill>
+                <a:latin typeface="+mj-lt"/>
+              </a:rPr>
+              <a:t>Displaying the summary data loaded from CSV, using </a:t>
+            </a:r>
+            <a:r>
+              <a:rPr lang="en-US" dirty="0" err="1">
+                <a:solidFill>
+                  <a:srgbClr val="FFFFFF"/>
+                </a:solidFill>
+                <a:latin typeface="+mj-lt"/>
+              </a:rPr>
+              <a:t>Javascript</a:t>
+            </a:r>
+            <a:r>
+              <a:rPr lang="en-US" dirty="0">
+                <a:solidFill>
+                  <a:srgbClr val="FFFFFF"/>
+                </a:solidFill>
+                <a:latin typeface="+mj-lt"/>
+              </a:rPr>
+              <a:t>, HTML, CSS and d3 (policedata.html, policadata.js, policedata.css)</a:t>
+            </a:r>
+          </a:p>
+          <a:p>
+            <a:r>
+              <a:rPr lang="en-US" dirty="0">
+                <a:solidFill>
+                  <a:srgbClr val="FFFFFF"/>
+                </a:solidFill>
+                <a:latin typeface="+mj-lt"/>
+              </a:rPr>
+              <a:t>The LGA filter is populated from the data source as well (dropdown)</a:t>
+            </a:r>
+          </a:p>
+          <a:p>
+            <a:r>
+              <a:rPr lang="en-US" dirty="0">
+                <a:solidFill>
+                  <a:srgbClr val="FFFFFF"/>
+                </a:solidFill>
+                <a:latin typeface="+mj-lt"/>
+              </a:rPr>
+              <a:t>Filtering by different fields (Local Government Area and Year)</a:t>
+            </a:r>
+          </a:p>
         </p:txBody>
       </p:sp>
       <p:sp>
         <p:nvSpPr>
-          <p:cNvPr id="12" name="Rectangle 11">
+          <p:cNvPr id="36" name="Rectangle 31">
             <a:extLst>
               <a:ext uri="{FF2B5EF4-FFF2-40B4-BE49-F238E27FC236}">
-                <a16:creationId xmlns:a16="http://schemas.microsoft.com/office/drawing/2014/main" id="{054B3F04-9EAC-45C0-B3CE-0387EEA10A0C}"/>
+                <a16:creationId xmlns:a16="http://schemas.microsoft.com/office/drawing/2014/main" id="{53B8D6B0-55D6-48DC-86D8-FD95D5F118AB}"/>
               </a:ext>
               <a:ext uri="{C183D7F6-B498-43B3-948B-1728B52AA6E4}">
                 <adec:decorative xmlns:adec="http://schemas.microsoft.com/office/drawing/2017/decorative" val="1"/>
@@ -8286,12 +8901,247 @@
           </a:fontRef>
         </p:style>
       </p:sp>
+      <p:pic>
+        <p:nvPicPr>
+          <p:cNvPr id="6" name="Picture 5">
+            <a:extLst>
+              <a:ext uri="{FF2B5EF4-FFF2-40B4-BE49-F238E27FC236}">
+                <a16:creationId xmlns:a16="http://schemas.microsoft.com/office/drawing/2014/main" id="{FD651A7A-E8AC-A627-55D8-8A9687139159}"/>
+              </a:ext>
+            </a:extLst>
+          </p:cNvPr>
+          <p:cNvPicPr>
+            <a:picLocks noChangeAspect="1"/>
+          </p:cNvPicPr>
+          <p:nvPr/>
+        </p:nvPicPr>
+        <p:blipFill>
+          <a:blip r:embed="rId2"/>
+          <a:stretch>
+            <a:fillRect/>
+          </a:stretch>
+        </p:blipFill>
+        <p:spPr>
+          <a:xfrm>
+            <a:off x="4069570" y="2122946"/>
+            <a:ext cx="8075532" cy="3957010"/>
+          </a:xfrm>
+          <a:prstGeom prst="rect">
+            <a:avLst/>
+          </a:prstGeom>
+        </p:spPr>
+      </p:pic>
+    </p:spTree>
+    <p:extLst>
+      <p:ext uri="{BB962C8B-B14F-4D97-AF65-F5344CB8AC3E}">
+        <p14:creationId xmlns:p14="http://schemas.microsoft.com/office/powerpoint/2010/main" val="1446067743"/>
+      </p:ext>
+    </p:extLst>
+  </p:cSld>
+  <p:clrMapOvr>
+    <a:masterClrMapping/>
+  </p:clrMapOvr>
+</p:sld>
+</file>
+
+<file path=ppt/slides/slide9.xml><?xml version="1.0" encoding="utf-8"?>
+<p:sld xmlns:a="http://schemas.openxmlformats.org/drawingml/2006/main" xmlns:r="http://schemas.openxmlformats.org/officeDocument/2006/relationships" xmlns:p="http://schemas.openxmlformats.org/presentationml/2006/main">
+  <p:cSld>
+    <p:bg>
+      <p:bgPr>
+        <a:solidFill>
+          <a:schemeClr val="bg1"/>
+        </a:solidFill>
+        <a:effectLst/>
+      </p:bgPr>
+    </p:bg>
+    <p:spTree>
+      <p:nvGrpSpPr>
+        <p:cNvPr id="1" name=""/>
+        <p:cNvGrpSpPr/>
+        <p:nvPr/>
+      </p:nvGrpSpPr>
+      <p:grpSpPr>
+        <a:xfrm>
+          <a:off x="0" y="0"/>
+          <a:ext cx="0" cy="0"/>
+          <a:chOff x="0" y="0"/>
+          <a:chExt cx="0" cy="0"/>
+        </a:xfrm>
+      </p:grpSpPr>
+      <p:sp useBgFill="1">
+        <p:nvSpPr>
+          <p:cNvPr id="24" name="Rectangle 17">
+            <a:extLst>
+              <a:ext uri="{FF2B5EF4-FFF2-40B4-BE49-F238E27FC236}">
+                <a16:creationId xmlns:a16="http://schemas.microsoft.com/office/drawing/2014/main" id="{44CC594A-A820-450F-B363-C19201FCFEC6}"/>
+              </a:ext>
+              <a:ext uri="{C183D7F6-B498-43B3-948B-1728B52AA6E4}">
+                <adec:decorative xmlns:adec="http://schemas.microsoft.com/office/drawing/2017/decorative" val="1"/>
+              </a:ext>
+            </a:extLst>
+          </p:cNvPr>
+          <p:cNvSpPr>
+            <a:spLocks noGrp="1" noRot="1" noChangeAspect="1" noMove="1" noResize="1" noEditPoints="1" noAdjustHandles="1" noChangeArrowheads="1" noChangeShapeType="1" noTextEdit="1"/>
+          </p:cNvSpPr>
+          <p:nvPr>
+            <p:extLst>
+              <p:ext uri="{386F3935-93C4-4BCD-93E2-E3B085C9AB24}">
+                <p16:designElem xmlns:p16="http://schemas.microsoft.com/office/powerpoint/2015/main" val="1"/>
+              </p:ext>
+            </p:extLst>
+          </p:nvPr>
+        </p:nvSpPr>
+        <p:spPr>
+          <a:xfrm>
+            <a:off x="0" y="0"/>
+            <a:ext cx="12186315" cy="6858000"/>
+          </a:xfrm>
+          <a:prstGeom prst="rect">
+            <a:avLst/>
+          </a:prstGeom>
+          <a:ln>
+            <a:noFill/>
+          </a:ln>
+        </p:spPr>
+        <p:style>
+          <a:lnRef idx="2">
+            <a:schemeClr val="accent6">
+              <a:shade val="50000"/>
+            </a:schemeClr>
+          </a:lnRef>
+          <a:fillRef idx="1001">
+            <a:schemeClr val="lt1"/>
+          </a:fillRef>
+          <a:effectRef idx="0">
+            <a:schemeClr val="accent6"/>
+          </a:effectRef>
+          <a:fontRef idx="minor">
+            <a:schemeClr val="lt1"/>
+          </a:fontRef>
+        </p:style>
+        <p:txBody>
+          <a:bodyPr rtlCol="0" anchor="ctr"/>
+          <a:lstStyle/>
+          <a:p>
+            <a:pPr algn="ctr"/>
+            <a:endParaRPr lang="en-US"/>
+          </a:p>
+        </p:txBody>
+      </p:sp>
+      <p:sp>
+        <p:nvSpPr>
+          <p:cNvPr id="25" name="Rectangle 19">
+            <a:extLst>
+              <a:ext uri="{FF2B5EF4-FFF2-40B4-BE49-F238E27FC236}">
+                <a16:creationId xmlns:a16="http://schemas.microsoft.com/office/drawing/2014/main" id="{59FAB3DA-E9ED-4574-ABCC-378BC0FF1BBC}"/>
+              </a:ext>
+              <a:ext uri="{C183D7F6-B498-43B3-948B-1728B52AA6E4}">
+                <adec:decorative xmlns:adec="http://schemas.microsoft.com/office/drawing/2017/decorative" val="1"/>
+              </a:ext>
+            </a:extLst>
+          </p:cNvPr>
+          <p:cNvSpPr>
+            <a:spLocks noGrp="1" noRot="1" noChangeAspect="1" noMove="1" noResize="1" noEditPoints="1" noAdjustHandles="1" noChangeArrowheads="1" noChangeShapeType="1" noTextEdit="1"/>
+          </p:cNvSpPr>
+          <p:nvPr>
+            <p:extLst>
+              <p:ext uri="{386F3935-93C4-4BCD-93E2-E3B085C9AB24}">
+                <p16:designElem xmlns:p16="http://schemas.microsoft.com/office/powerpoint/2015/main" val="1"/>
+              </p:ext>
+            </p:extLst>
+          </p:nvPr>
+        </p:nvSpPr>
+        <p:spPr>
+          <a:xfrm>
+            <a:off x="16" y="0"/>
+            <a:ext cx="4050791" cy="6858000"/>
+          </a:xfrm>
+          <a:prstGeom prst="rect">
+            <a:avLst/>
+          </a:prstGeom>
+          <a:solidFill>
+            <a:schemeClr val="accent2"/>
+          </a:solidFill>
+          <a:ln>
+            <a:noFill/>
+          </a:ln>
+        </p:spPr>
+        <p:style>
+          <a:lnRef idx="2">
+            <a:schemeClr val="accent1">
+              <a:shade val="50000"/>
+            </a:schemeClr>
+          </a:lnRef>
+          <a:fillRef idx="1">
+            <a:schemeClr val="accent1"/>
+          </a:fillRef>
+          <a:effectRef idx="0">
+            <a:schemeClr val="accent1"/>
+          </a:effectRef>
+          <a:fontRef idx="minor">
+            <a:schemeClr val="lt1"/>
+          </a:fontRef>
+        </p:style>
+      </p:sp>
+      <p:sp>
+        <p:nvSpPr>
+          <p:cNvPr id="2" name="Title 1">
+            <a:extLst>
+              <a:ext uri="{FF2B5EF4-FFF2-40B4-BE49-F238E27FC236}">
+                <a16:creationId xmlns:a16="http://schemas.microsoft.com/office/drawing/2014/main" id="{A4890AAB-AD6E-4D0C-C387-EDC80BC6710E}"/>
+              </a:ext>
+            </a:extLst>
+          </p:cNvPr>
+          <p:cNvSpPr>
+            <a:spLocks noGrp="1"/>
+          </p:cNvSpPr>
+          <p:nvPr>
+            <p:ph type="title"/>
+          </p:nvPr>
+        </p:nvSpPr>
+        <p:spPr>
+          <a:xfrm>
+            <a:off x="4566934" y="516836"/>
+            <a:ext cx="6550245" cy="1303944"/>
+          </a:xfrm>
+        </p:spPr>
+        <p:txBody>
+          <a:bodyPr>
+            <a:normAutofit/>
+          </a:bodyPr>
+          <a:lstStyle/>
+          <a:p>
+            <a:r>
+              <a:rPr lang="en-US" sz="3100" b="1" dirty="0" err="1">
+                <a:solidFill>
+                  <a:schemeClr val="accent2"/>
+                </a:solidFill>
+              </a:rPr>
+              <a:t>Visualisation</a:t>
+            </a:r>
+            <a:r>
+              <a:rPr lang="en-US" sz="3100" b="1" dirty="0">
+                <a:solidFill>
+                  <a:schemeClr val="accent2"/>
+                </a:solidFill>
+              </a:rPr>
+              <a:t> - Different offence types for the selected LGA and year</a:t>
+            </a:r>
+            <a:endParaRPr lang="en-AU" sz="3100" b="1" dirty="0">
+              <a:solidFill>
+                <a:schemeClr val="accent2"/>
+              </a:solidFill>
+            </a:endParaRPr>
+          </a:p>
+        </p:txBody>
+      </p:sp>
       <p:sp>
         <p:nvSpPr>
           <p:cNvPr id="3" name="Content Placeholder 2">
             <a:extLst>
               <a:ext uri="{FF2B5EF4-FFF2-40B4-BE49-F238E27FC236}">
-                <a16:creationId xmlns:a16="http://schemas.microsoft.com/office/drawing/2014/main" id="{269556EF-8199-C759-595A-3DFA7EA78684}"/>
+                <a16:creationId xmlns:a16="http://schemas.microsoft.com/office/drawing/2014/main" id="{A2747452-7799-79D9-1C74-222841D88F7A}"/>
               </a:ext>
             </a:extLst>
           </p:cNvPr>
@@ -8304,24 +9154,200 @@
         </p:nvSpPr>
         <p:spPr>
           <a:xfrm>
-            <a:off x="4742016" y="605896"/>
-            <a:ext cx="6413663" cy="5646208"/>
+            <a:off x="492371" y="609600"/>
+            <a:ext cx="3084844" cy="5379719"/>
           </a:xfrm>
         </p:spPr>
         <p:txBody>
-          <a:bodyPr anchor="ctr">
-            <a:normAutofit/>
+          <a:bodyPr>
+            <a:noAutofit/>
           </a:bodyPr>
           <a:lstStyle/>
           <a:p>
-            <a:endParaRPr lang="en-AU" dirty="0"/>
+            <a:r>
+              <a:rPr lang="en-US" sz="2400" dirty="0">
+                <a:solidFill>
+                  <a:srgbClr val="FFFFFF"/>
+                </a:solidFill>
+                <a:latin typeface="+mj-lt"/>
+              </a:rPr>
+              <a:t>Using the filters on the same page and </a:t>
+            </a:r>
+            <a:r>
+              <a:rPr lang="en-US" sz="2400" dirty="0" err="1">
+                <a:solidFill>
+                  <a:srgbClr val="FFFFFF"/>
+                </a:solidFill>
+                <a:latin typeface="+mj-lt"/>
+              </a:rPr>
+              <a:t>Plotly</a:t>
+            </a:r>
+            <a:r>
+              <a:rPr lang="en-US" sz="2400" dirty="0">
+                <a:solidFill>
+                  <a:srgbClr val="FFFFFF"/>
+                </a:solidFill>
+                <a:latin typeface="+mj-lt"/>
+              </a:rPr>
+              <a:t>, we display a bar chart representing the different offence types for a specific Local Government area for a specific year. </a:t>
+            </a:r>
+          </a:p>
+          <a:p>
+            <a:endParaRPr lang="en-US" sz="2400" dirty="0">
+              <a:solidFill>
+                <a:srgbClr val="FFFFFF"/>
+              </a:solidFill>
+              <a:latin typeface="+mj-lt"/>
+            </a:endParaRPr>
+          </a:p>
+          <a:p>
+            <a:r>
+              <a:rPr lang="en-US" sz="2400" b="1" dirty="0">
+                <a:solidFill>
+                  <a:srgbClr val="FFFFFF"/>
+                </a:solidFill>
+                <a:latin typeface="+mj-lt"/>
+              </a:rPr>
+              <a:t>Technical Background</a:t>
+            </a:r>
+          </a:p>
+          <a:p>
+            <a:r>
+              <a:rPr lang="en-US" sz="2400" dirty="0" err="1">
+                <a:solidFill>
+                  <a:srgbClr val="FFFFFF"/>
+                </a:solidFill>
+                <a:latin typeface="+mj-lt"/>
+              </a:rPr>
+              <a:t>Javascript</a:t>
+            </a:r>
+            <a:r>
+              <a:rPr lang="en-US" sz="2400" dirty="0">
+                <a:solidFill>
+                  <a:srgbClr val="FFFFFF"/>
+                </a:solidFill>
+                <a:latin typeface="+mj-lt"/>
+              </a:rPr>
+              <a:t>, </a:t>
+            </a:r>
+            <a:r>
+              <a:rPr lang="en-US" sz="2400" dirty="0" err="1">
+                <a:solidFill>
+                  <a:srgbClr val="FFFFFF"/>
+                </a:solidFill>
+                <a:latin typeface="+mj-lt"/>
+              </a:rPr>
+              <a:t>Plotly</a:t>
+            </a:r>
+            <a:r>
+              <a:rPr lang="en-US" sz="2400" dirty="0">
+                <a:solidFill>
+                  <a:srgbClr val="FFFFFF"/>
+                </a:solidFill>
+                <a:latin typeface="+mj-lt"/>
+              </a:rPr>
+              <a:t>, D3</a:t>
+            </a:r>
+          </a:p>
+          <a:p>
+            <a:endParaRPr lang="en-US" sz="2400" dirty="0">
+              <a:solidFill>
+                <a:srgbClr val="FFFFFF"/>
+              </a:solidFill>
+              <a:latin typeface="+mj-lt"/>
+            </a:endParaRPr>
           </a:p>
         </p:txBody>
       </p:sp>
+      <p:sp>
+        <p:nvSpPr>
+          <p:cNvPr id="26" name="Rectangle 21">
+            <a:extLst>
+              <a:ext uri="{FF2B5EF4-FFF2-40B4-BE49-F238E27FC236}">
+                <a16:creationId xmlns:a16="http://schemas.microsoft.com/office/drawing/2014/main" id="{53B8D6B0-55D6-48DC-86D8-FD95D5F118AB}"/>
+              </a:ext>
+              <a:ext uri="{C183D7F6-B498-43B3-948B-1728B52AA6E4}">
+                <adec:decorative xmlns:adec="http://schemas.microsoft.com/office/drawing/2017/decorative" val="1"/>
+              </a:ext>
+            </a:extLst>
+          </p:cNvPr>
+          <p:cNvSpPr>
+            <a:spLocks noGrp="1" noRot="1" noChangeAspect="1" noMove="1" noResize="1" noEditPoints="1" noAdjustHandles="1" noChangeArrowheads="1" noChangeShapeType="1" noTextEdit="1"/>
+          </p:cNvSpPr>
+          <p:nvPr>
+            <p:extLst>
+              <p:ext uri="{386F3935-93C4-4BCD-93E2-E3B085C9AB24}">
+                <p16:designElem xmlns:p16="http://schemas.microsoft.com/office/powerpoint/2015/main" val="1"/>
+              </p:ext>
+            </p:extLst>
+          </p:nvPr>
+        </p:nvSpPr>
+        <p:spPr>
+          <a:xfrm>
+            <a:off x="4040071" y="0"/>
+            <a:ext cx="64008" cy="6858000"/>
+          </a:xfrm>
+          <a:prstGeom prst="rect">
+            <a:avLst/>
+          </a:prstGeom>
+          <a:solidFill>
+            <a:schemeClr val="accent1"/>
+          </a:solidFill>
+          <a:ln>
+            <a:noFill/>
+          </a:ln>
+        </p:spPr>
+        <p:style>
+          <a:lnRef idx="2">
+            <a:schemeClr val="accent1">
+              <a:shade val="50000"/>
+            </a:schemeClr>
+          </a:lnRef>
+          <a:fillRef idx="1">
+            <a:schemeClr val="accent1"/>
+          </a:fillRef>
+          <a:effectRef idx="0">
+            <a:schemeClr val="accent1"/>
+          </a:effectRef>
+          <a:fontRef idx="minor">
+            <a:schemeClr val="lt1"/>
+          </a:fontRef>
+        </p:style>
+      </p:sp>
+      <p:graphicFrame>
+        <p:nvGraphicFramePr>
+          <p:cNvPr id="4" name="Chart 3">
+            <a:extLst>
+              <a:ext uri="{FF2B5EF4-FFF2-40B4-BE49-F238E27FC236}">
+                <a16:creationId xmlns:a16="http://schemas.microsoft.com/office/drawing/2014/main" id="{7A7D3E6D-BA77-35F4-4990-16CEA3386012}"/>
+              </a:ext>
+            </a:extLst>
+          </p:cNvPr>
+          <p:cNvGraphicFramePr>
+            <a:graphicFrameLocks/>
+          </p:cNvGraphicFramePr>
+          <p:nvPr>
+            <p:extLst>
+              <p:ext uri="{D42A27DB-BD31-4B8C-83A1-F6EECF244321}">
+                <p14:modId xmlns:p14="http://schemas.microsoft.com/office/powerpoint/2010/main" val="2969453393"/>
+              </p:ext>
+            </p:extLst>
+          </p:nvPr>
+        </p:nvGraphicFramePr>
+        <p:xfrm>
+          <a:off x="4742017" y="1892968"/>
+          <a:ext cx="6798082" cy="4324951"/>
+        </p:xfrm>
+        <a:graphic>
+          <a:graphicData uri="http://schemas.openxmlformats.org/drawingml/2006/chart">
+            <c:chart xmlns:c="http://schemas.openxmlformats.org/drawingml/2006/chart" xmlns:r="http://schemas.openxmlformats.org/officeDocument/2006/relationships" r:id="rId2"/>
+          </a:graphicData>
+        </a:graphic>
+      </p:graphicFrame>
     </p:spTree>
     <p:extLst>
       <p:ext uri="{BB962C8B-B14F-4D97-AF65-F5344CB8AC3E}">
-        <p14:creationId xmlns:p14="http://schemas.microsoft.com/office/powerpoint/2010/main" val="2843435938"/>
+        <p14:creationId xmlns:p14="http://schemas.microsoft.com/office/powerpoint/2010/main" val="2516570333"/>
       </p:ext>
     </p:extLst>
   </p:cSld>

</xml_diff>

<commit_message>
added app.py, template folder
</commit_message>
<xml_diff>
--- a/Victoria Crime Data Visualization3.pptx
+++ b/Victoria Crime Data Visualization3.pptx
@@ -5756,23 +5756,7 @@
                   <a:schemeClr val="accent2"/>
                 </a:solidFill>
               </a:rPr>
-              <a:t>Local </a:t>
-            </a:r>
-            <a:r>
-              <a:rPr lang="en-US" sz="3200" dirty="0" err="1">
-                <a:solidFill>
-                  <a:schemeClr val="accent2"/>
-                </a:solidFill>
-              </a:rPr>
-              <a:t>Gornment</a:t>
-            </a:r>
-            <a:r>
-              <a:rPr lang="en-US" sz="3200" dirty="0">
-                <a:solidFill>
-                  <a:schemeClr val="accent2"/>
-                </a:solidFill>
-              </a:rPr>
-              <a:t> Area Offences base on Police Region</a:t>
+              <a:t>Local Government Area Offences base on Police Region</a:t>
             </a:r>
             <a:endParaRPr lang="en-US" sz="3200" dirty="0"/>
           </a:p>

</xml_diff>